<commit_message>
Uploaded 221101 Symbol is added
</commit_message>
<xml_diff>
--- a/00_Documents/Proposal_RockCLimber.pptx
+++ b/00_Documents/Proposal_RockCLimber.pptx
@@ -8,9 +8,10 @@
     <p:sldId id="257" r:id="rId2"/>
     <p:sldId id="256" r:id="rId3"/>
     <p:sldId id="261" r:id="rId4"/>
-    <p:sldId id="258" r:id="rId5"/>
-    <p:sldId id="260" r:id="rId6"/>
-    <p:sldId id="259" r:id="rId7"/>
+    <p:sldId id="262" r:id="rId5"/>
+    <p:sldId id="258" r:id="rId6"/>
+    <p:sldId id="260" r:id="rId7"/>
+    <p:sldId id="259" r:id="rId8"/>
   </p:sldIdLst>
   <p:sldSz cx="9906000" cy="6858000" type="A4"/>
   <p:notesSz cx="6858000" cy="9144000"/>
@@ -248,7 +249,7 @@
           <a:p>
             <a:fld id="{78E082FD-8515-42F4-9814-5D20EC5E8E6B}" type="datetimeFigureOut">
               <a:rPr lang="ko-KR" altLang="en-US" smtClean="0"/>
-              <a:t>2022-10-22</a:t>
+              <a:t>2022-11-01</a:t>
             </a:fld>
             <a:endParaRPr lang="ko-KR" altLang="en-US"/>
           </a:p>
@@ -418,7 +419,7 @@
           <a:p>
             <a:fld id="{78E082FD-8515-42F4-9814-5D20EC5E8E6B}" type="datetimeFigureOut">
               <a:rPr lang="ko-KR" altLang="en-US" smtClean="0"/>
-              <a:t>2022-10-22</a:t>
+              <a:t>2022-11-01</a:t>
             </a:fld>
             <a:endParaRPr lang="ko-KR" altLang="en-US"/>
           </a:p>
@@ -598,7 +599,7 @@
           <a:p>
             <a:fld id="{78E082FD-8515-42F4-9814-5D20EC5E8E6B}" type="datetimeFigureOut">
               <a:rPr lang="ko-KR" altLang="en-US" smtClean="0"/>
-              <a:t>2022-10-22</a:t>
+              <a:t>2022-11-01</a:t>
             </a:fld>
             <a:endParaRPr lang="ko-KR" altLang="en-US"/>
           </a:p>
@@ -768,7 +769,7 @@
           <a:p>
             <a:fld id="{78E082FD-8515-42F4-9814-5D20EC5E8E6B}" type="datetimeFigureOut">
               <a:rPr lang="ko-KR" altLang="en-US" smtClean="0"/>
-              <a:t>2022-10-22</a:t>
+              <a:t>2022-11-01</a:t>
             </a:fld>
             <a:endParaRPr lang="ko-KR" altLang="en-US"/>
           </a:p>
@@ -1012,7 +1013,7 @@
           <a:p>
             <a:fld id="{78E082FD-8515-42F4-9814-5D20EC5E8E6B}" type="datetimeFigureOut">
               <a:rPr lang="ko-KR" altLang="en-US" smtClean="0"/>
-              <a:t>2022-10-22</a:t>
+              <a:t>2022-11-01</a:t>
             </a:fld>
             <a:endParaRPr lang="ko-KR" altLang="en-US"/>
           </a:p>
@@ -1244,7 +1245,7 @@
           <a:p>
             <a:fld id="{78E082FD-8515-42F4-9814-5D20EC5E8E6B}" type="datetimeFigureOut">
               <a:rPr lang="ko-KR" altLang="en-US" smtClean="0"/>
-              <a:t>2022-10-22</a:t>
+              <a:t>2022-11-01</a:t>
             </a:fld>
             <a:endParaRPr lang="ko-KR" altLang="en-US"/>
           </a:p>
@@ -1611,7 +1612,7 @@
           <a:p>
             <a:fld id="{78E082FD-8515-42F4-9814-5D20EC5E8E6B}" type="datetimeFigureOut">
               <a:rPr lang="ko-KR" altLang="en-US" smtClean="0"/>
-              <a:t>2022-10-22</a:t>
+              <a:t>2022-11-01</a:t>
             </a:fld>
             <a:endParaRPr lang="ko-KR" altLang="en-US"/>
           </a:p>
@@ -1729,7 +1730,7 @@
           <a:p>
             <a:fld id="{78E082FD-8515-42F4-9814-5D20EC5E8E6B}" type="datetimeFigureOut">
               <a:rPr lang="ko-KR" altLang="en-US" smtClean="0"/>
-              <a:t>2022-10-22</a:t>
+              <a:t>2022-11-01</a:t>
             </a:fld>
             <a:endParaRPr lang="ko-KR" altLang="en-US"/>
           </a:p>
@@ -1824,7 +1825,7 @@
           <a:p>
             <a:fld id="{78E082FD-8515-42F4-9814-5D20EC5E8E6B}" type="datetimeFigureOut">
               <a:rPr lang="ko-KR" altLang="en-US" smtClean="0"/>
-              <a:t>2022-10-22</a:t>
+              <a:t>2022-11-01</a:t>
             </a:fld>
             <a:endParaRPr lang="ko-KR" altLang="en-US"/>
           </a:p>
@@ -2101,7 +2102,7 @@
           <a:p>
             <a:fld id="{78E082FD-8515-42F4-9814-5D20EC5E8E6B}" type="datetimeFigureOut">
               <a:rPr lang="ko-KR" altLang="en-US" smtClean="0"/>
-              <a:t>2022-10-22</a:t>
+              <a:t>2022-11-01</a:t>
             </a:fld>
             <a:endParaRPr lang="ko-KR" altLang="en-US"/>
           </a:p>
@@ -2358,7 +2359,7 @@
           <a:p>
             <a:fld id="{78E082FD-8515-42F4-9814-5D20EC5E8E6B}" type="datetimeFigureOut">
               <a:rPr lang="ko-KR" altLang="en-US" smtClean="0"/>
-              <a:t>2022-10-22</a:t>
+              <a:t>2022-11-01</a:t>
             </a:fld>
             <a:endParaRPr lang="ko-KR" altLang="en-US"/>
           </a:p>
@@ -2571,7 +2572,7 @@
           <a:p>
             <a:fld id="{78E082FD-8515-42F4-9814-5D20EC5E8E6B}" type="datetimeFigureOut">
               <a:rPr lang="ko-KR" altLang="en-US" smtClean="0"/>
-              <a:t>2022-10-22</a:t>
+              <a:t>2022-11-01</a:t>
             </a:fld>
             <a:endParaRPr lang="ko-KR" altLang="en-US"/>
           </a:p>
@@ -6143,7 +6144,7 @@
           <p:cNvPr id="4" name="TextBox 3">
             <a:extLst>
               <a:ext uri="{FF2B5EF4-FFF2-40B4-BE49-F238E27FC236}">
-                <a16:creationId xmlns:a16="http://schemas.microsoft.com/office/drawing/2014/main" id="{2918DE10-3477-03EB-94D2-1708911DBF39}"/>
+                <a16:creationId xmlns:a16="http://schemas.microsoft.com/office/drawing/2014/main" id="{B02CAF8C-1182-3D18-DA2E-BB6105D4F363}"/>
               </a:ext>
             </a:extLst>
           </p:cNvPr>
@@ -6153,7 +6154,7 @@
         <p:spPr>
           <a:xfrm>
             <a:off x="135685" y="147483"/>
-            <a:ext cx="9389412" cy="461665"/>
+            <a:ext cx="9389412" cy="1569660"/>
           </a:xfrm>
           <a:prstGeom prst="rect">
             <a:avLst/>
@@ -6168,944 +6169,83 @@
           <a:p>
             <a:r>
               <a:rPr lang="en-US" altLang="ko-KR" sz="1200" dirty="0"/>
-              <a:t>[ Rock Climber Slot Main UI ]</a:t>
+              <a:t>[ Rock Climber Info ]</a:t>
             </a:r>
           </a:p>
           <a:p>
             <a:endParaRPr lang="en-US" altLang="ko-KR" sz="1200" dirty="0"/>
           </a:p>
-        </p:txBody>
-      </p:sp>
-      <p:sp>
-        <p:nvSpPr>
-          <p:cNvPr id="2" name="직사각형 1">
-            <a:extLst>
-              <a:ext uri="{FF2B5EF4-FFF2-40B4-BE49-F238E27FC236}">
-                <a16:creationId xmlns:a16="http://schemas.microsoft.com/office/drawing/2014/main" id="{2732B4F0-AAB9-10F5-AB6B-33308FB2803B}"/>
-              </a:ext>
-            </a:extLst>
-          </p:cNvPr>
-          <p:cNvSpPr/>
-          <p:nvPr/>
-        </p:nvSpPr>
-        <p:spPr>
-          <a:xfrm>
-            <a:off x="784614" y="932098"/>
-            <a:ext cx="7940532" cy="4377321"/>
-          </a:xfrm>
-          <a:prstGeom prst="rect">
-            <a:avLst/>
-          </a:prstGeom>
-        </p:spPr>
-        <p:style>
-          <a:lnRef idx="2">
-            <a:schemeClr val="accent3">
-              <a:shade val="50000"/>
-            </a:schemeClr>
-          </a:lnRef>
-          <a:fillRef idx="1">
-            <a:schemeClr val="accent3"/>
-          </a:fillRef>
-          <a:effectRef idx="0">
-            <a:schemeClr val="accent3"/>
-          </a:effectRef>
-          <a:fontRef idx="minor">
-            <a:schemeClr val="lt1"/>
-          </a:fontRef>
-        </p:style>
-        <p:txBody>
-          <a:bodyPr rtlCol="0" anchor="ctr"/>
-          <a:lstStyle/>
-          <a:p>
-            <a:pPr algn="ctr"/>
-            <a:endParaRPr lang="ko-KR" altLang="en-US"/>
-          </a:p>
-        </p:txBody>
-      </p:sp>
-      <p:sp>
-        <p:nvSpPr>
-          <p:cNvPr id="3" name="타원 2">
-            <a:extLst>
-              <a:ext uri="{FF2B5EF4-FFF2-40B4-BE49-F238E27FC236}">
-                <a16:creationId xmlns:a16="http://schemas.microsoft.com/office/drawing/2014/main" id="{E274E6D6-66F5-0021-7A97-2C6459077D16}"/>
-              </a:ext>
-            </a:extLst>
-          </p:cNvPr>
-          <p:cNvSpPr/>
-          <p:nvPr/>
-        </p:nvSpPr>
-        <p:spPr>
-          <a:xfrm>
-            <a:off x="7801897" y="4471711"/>
-            <a:ext cx="820010" cy="820010"/>
-          </a:xfrm>
-          <a:prstGeom prst="ellipse">
-            <a:avLst/>
-          </a:prstGeom>
-        </p:spPr>
-        <p:style>
-          <a:lnRef idx="2">
-            <a:schemeClr val="accent1">
-              <a:shade val="50000"/>
-            </a:schemeClr>
-          </a:lnRef>
-          <a:fillRef idx="1">
-            <a:schemeClr val="accent1"/>
-          </a:fillRef>
-          <a:effectRef idx="0">
-            <a:schemeClr val="accent1"/>
-          </a:effectRef>
-          <a:fontRef idx="minor">
-            <a:schemeClr val="lt1"/>
-          </a:fontRef>
-        </p:style>
-        <p:txBody>
-          <a:bodyPr rtlCol="0" anchor="ctr"/>
-          <a:lstStyle/>
-          <a:p>
-            <a:pPr algn="ctr"/>
-            <a:r>
-              <a:rPr lang="en-US" altLang="ko-KR" sz="1600" dirty="0"/>
-              <a:t>Spin</a:t>
-            </a:r>
-            <a:endParaRPr lang="ko-KR" altLang="en-US" sz="1600" dirty="0"/>
-          </a:p>
-        </p:txBody>
-      </p:sp>
-      <p:sp>
-        <p:nvSpPr>
-          <p:cNvPr id="5" name="직사각형 4">
-            <a:extLst>
-              <a:ext uri="{FF2B5EF4-FFF2-40B4-BE49-F238E27FC236}">
-                <a16:creationId xmlns:a16="http://schemas.microsoft.com/office/drawing/2014/main" id="{C328220F-A5C7-8AFA-F86E-E3BEEA75B6CA}"/>
-              </a:ext>
-            </a:extLst>
-          </p:cNvPr>
-          <p:cNvSpPr/>
-          <p:nvPr/>
-        </p:nvSpPr>
-        <p:spPr>
-          <a:xfrm>
-            <a:off x="1758008" y="1531863"/>
-            <a:ext cx="6046838" cy="2867087"/>
-          </a:xfrm>
-          <a:prstGeom prst="rect">
-            <a:avLst/>
-          </a:prstGeom>
-        </p:spPr>
-        <p:style>
-          <a:lnRef idx="2">
-            <a:schemeClr val="accent1">
-              <a:shade val="50000"/>
-            </a:schemeClr>
-          </a:lnRef>
-          <a:fillRef idx="1">
-            <a:schemeClr val="accent1"/>
-          </a:fillRef>
-          <a:effectRef idx="0">
-            <a:schemeClr val="accent1"/>
-          </a:effectRef>
-          <a:fontRef idx="minor">
-            <a:schemeClr val="lt1"/>
-          </a:fontRef>
-        </p:style>
-        <p:txBody>
-          <a:bodyPr rtlCol="0" anchor="ctr"/>
-          <a:lstStyle/>
-          <a:p>
-            <a:pPr algn="ctr"/>
-            <a:r>
-              <a:rPr lang="en-US" altLang="ko-KR" dirty="0"/>
-              <a:t>3 X 5 Reel</a:t>
-            </a:r>
-            <a:endParaRPr lang="ko-KR" altLang="en-US" dirty="0"/>
-          </a:p>
-        </p:txBody>
-      </p:sp>
-      <p:sp>
-        <p:nvSpPr>
-          <p:cNvPr id="6" name="직사각형 5">
-            <a:extLst>
-              <a:ext uri="{FF2B5EF4-FFF2-40B4-BE49-F238E27FC236}">
-                <a16:creationId xmlns:a16="http://schemas.microsoft.com/office/drawing/2014/main" id="{401A1B05-35E7-C0AB-D041-CAE41E665691}"/>
-              </a:ext>
-            </a:extLst>
-          </p:cNvPr>
-          <p:cNvSpPr/>
-          <p:nvPr/>
-        </p:nvSpPr>
-        <p:spPr>
-          <a:xfrm>
-            <a:off x="949796" y="4623580"/>
-            <a:ext cx="1404047" cy="556054"/>
-          </a:xfrm>
-          <a:prstGeom prst="rect">
-            <a:avLst/>
-          </a:prstGeom>
-        </p:spPr>
-        <p:style>
-          <a:lnRef idx="2">
-            <a:schemeClr val="accent1">
-              <a:shade val="50000"/>
-            </a:schemeClr>
-          </a:lnRef>
-          <a:fillRef idx="1">
-            <a:schemeClr val="accent1"/>
-          </a:fillRef>
-          <a:effectRef idx="0">
-            <a:schemeClr val="accent1"/>
-          </a:effectRef>
-          <a:fontRef idx="minor">
-            <a:schemeClr val="lt1"/>
-          </a:fontRef>
-        </p:style>
-        <p:txBody>
-          <a:bodyPr rtlCol="0" anchor="ctr"/>
-          <a:lstStyle/>
-          <a:p>
-            <a:pPr algn="ctr"/>
-            <a:r>
-              <a:rPr lang="en-US" altLang="ko-KR" dirty="0"/>
-              <a:t>Total Bet</a:t>
-            </a:r>
-            <a:endParaRPr lang="ko-KR" altLang="en-US" dirty="0"/>
-          </a:p>
-        </p:txBody>
-      </p:sp>
-      <p:sp>
-        <p:nvSpPr>
-          <p:cNvPr id="7" name="이등변 삼각형 6">
-            <a:extLst>
-              <a:ext uri="{FF2B5EF4-FFF2-40B4-BE49-F238E27FC236}">
-                <a16:creationId xmlns:a16="http://schemas.microsoft.com/office/drawing/2014/main" id="{62F1089D-9BE5-D27B-67F2-818CE9BF388E}"/>
-              </a:ext>
-            </a:extLst>
-          </p:cNvPr>
-          <p:cNvSpPr/>
-          <p:nvPr/>
-        </p:nvSpPr>
-        <p:spPr>
-          <a:xfrm rot="16200000">
-            <a:off x="771872" y="4748223"/>
-            <a:ext cx="355849" cy="306766"/>
-          </a:xfrm>
-          <a:prstGeom prst="triangle">
-            <a:avLst/>
-          </a:prstGeom>
-        </p:spPr>
-        <p:style>
-          <a:lnRef idx="2">
-            <a:schemeClr val="accent2">
-              <a:shade val="50000"/>
-            </a:schemeClr>
-          </a:lnRef>
-          <a:fillRef idx="1">
-            <a:schemeClr val="accent2"/>
-          </a:fillRef>
-          <a:effectRef idx="0">
-            <a:schemeClr val="accent2"/>
-          </a:effectRef>
-          <a:fontRef idx="minor">
-            <a:schemeClr val="lt1"/>
-          </a:fontRef>
-        </p:style>
-        <p:txBody>
-          <a:bodyPr rtlCol="0" anchor="ctr"/>
-          <a:lstStyle/>
-          <a:p>
-            <a:pPr algn="ctr"/>
-            <a:endParaRPr lang="ko-KR" altLang="en-US"/>
-          </a:p>
-        </p:txBody>
-      </p:sp>
-      <p:sp>
-        <p:nvSpPr>
-          <p:cNvPr id="8" name="이등변 삼각형 7">
-            <a:extLst>
-              <a:ext uri="{FF2B5EF4-FFF2-40B4-BE49-F238E27FC236}">
-                <a16:creationId xmlns:a16="http://schemas.microsoft.com/office/drawing/2014/main" id="{DCC09CCB-B009-766F-39CA-9BEE85349E82}"/>
-              </a:ext>
-            </a:extLst>
-          </p:cNvPr>
-          <p:cNvSpPr/>
-          <p:nvPr/>
-        </p:nvSpPr>
-        <p:spPr>
-          <a:xfrm rot="5400000">
-            <a:off x="2175919" y="4753365"/>
-            <a:ext cx="355849" cy="306766"/>
-          </a:xfrm>
-          <a:prstGeom prst="triangle">
-            <a:avLst/>
-          </a:prstGeom>
-        </p:spPr>
-        <p:style>
-          <a:lnRef idx="2">
-            <a:schemeClr val="accent2">
-              <a:shade val="50000"/>
-            </a:schemeClr>
-          </a:lnRef>
-          <a:fillRef idx="1">
-            <a:schemeClr val="accent2"/>
-          </a:fillRef>
-          <a:effectRef idx="0">
-            <a:schemeClr val="accent2"/>
-          </a:effectRef>
-          <a:fontRef idx="minor">
-            <a:schemeClr val="lt1"/>
-          </a:fontRef>
-        </p:style>
-        <p:txBody>
-          <a:bodyPr rtlCol="0" anchor="ctr"/>
-          <a:lstStyle/>
-          <a:p>
-            <a:pPr algn="ctr"/>
-            <a:endParaRPr lang="ko-KR" altLang="en-US"/>
-          </a:p>
-        </p:txBody>
-      </p:sp>
-      <p:sp>
-        <p:nvSpPr>
-          <p:cNvPr id="9" name="타원 8">
-            <a:extLst>
-              <a:ext uri="{FF2B5EF4-FFF2-40B4-BE49-F238E27FC236}">
-                <a16:creationId xmlns:a16="http://schemas.microsoft.com/office/drawing/2014/main" id="{A08F8E11-14F2-1716-E9D3-96FED3BC1945}"/>
-              </a:ext>
-            </a:extLst>
-          </p:cNvPr>
-          <p:cNvSpPr/>
-          <p:nvPr/>
-        </p:nvSpPr>
-        <p:spPr>
-          <a:xfrm>
-            <a:off x="1103180" y="2687379"/>
-            <a:ext cx="606198" cy="556054"/>
-          </a:xfrm>
-          <a:prstGeom prst="ellipse">
-            <a:avLst/>
-          </a:prstGeom>
-        </p:spPr>
-        <p:style>
-          <a:lnRef idx="2">
-            <a:schemeClr val="accent6">
-              <a:shade val="50000"/>
-            </a:schemeClr>
-          </a:lnRef>
-          <a:fillRef idx="1">
-            <a:schemeClr val="accent6"/>
-          </a:fillRef>
-          <a:effectRef idx="0">
-            <a:schemeClr val="accent6"/>
-          </a:effectRef>
-          <a:fontRef idx="minor">
-            <a:schemeClr val="lt1"/>
-          </a:fontRef>
-        </p:style>
-        <p:txBody>
-          <a:bodyPr rtlCol="0" anchor="ctr"/>
-          <a:lstStyle/>
-          <a:p>
-            <a:pPr algn="ctr"/>
-            <a:r>
-              <a:rPr lang="en-US" altLang="ko-KR" sz="900" dirty="0"/>
-              <a:t>50</a:t>
-            </a:r>
-          </a:p>
-          <a:p>
-            <a:pPr algn="ctr"/>
-            <a:r>
-              <a:rPr lang="en-US" altLang="ko-KR" sz="900" dirty="0"/>
-              <a:t>Lines</a:t>
-            </a:r>
-            <a:endParaRPr lang="ko-KR" altLang="en-US" sz="900" dirty="0"/>
-          </a:p>
-        </p:txBody>
-      </p:sp>
-      <p:sp>
-        <p:nvSpPr>
-          <p:cNvPr id="12" name="직사각형 11">
-            <a:extLst>
-              <a:ext uri="{FF2B5EF4-FFF2-40B4-BE49-F238E27FC236}">
-                <a16:creationId xmlns:a16="http://schemas.microsoft.com/office/drawing/2014/main" id="{DB134231-B133-4846-F5B1-C72D37AB5766}"/>
-              </a:ext>
-            </a:extLst>
-          </p:cNvPr>
-          <p:cNvSpPr/>
-          <p:nvPr/>
-        </p:nvSpPr>
-        <p:spPr>
-          <a:xfrm>
-            <a:off x="8436078" y="1442392"/>
-            <a:ext cx="1215267" cy="1911391"/>
-          </a:xfrm>
-          <a:prstGeom prst="rect">
-            <a:avLst/>
-          </a:prstGeom>
-        </p:spPr>
-        <p:style>
-          <a:lnRef idx="2">
-            <a:schemeClr val="accent4">
-              <a:shade val="50000"/>
-            </a:schemeClr>
-          </a:lnRef>
-          <a:fillRef idx="1">
-            <a:schemeClr val="accent4"/>
-          </a:fillRef>
-          <a:effectRef idx="0">
-            <a:schemeClr val="accent4"/>
-          </a:effectRef>
-          <a:fontRef idx="minor">
-            <a:schemeClr val="lt1"/>
-          </a:fontRef>
-        </p:style>
-        <p:txBody>
-          <a:bodyPr rtlCol="0" anchor="ctr"/>
-          <a:lstStyle/>
-          <a:p>
-            <a:pPr algn="ctr"/>
-            <a:r>
-              <a:rPr lang="en-US" altLang="ko-KR" dirty="0"/>
-              <a:t>Pay Table</a:t>
-            </a:r>
-          </a:p>
-          <a:p>
-            <a:pPr algn="ctr"/>
-            <a:r>
-              <a:rPr lang="en-US" altLang="ko-KR" dirty="0"/>
-              <a:t>Setting</a:t>
-            </a:r>
-          </a:p>
-          <a:p>
-            <a:pPr algn="ctr"/>
-            <a:r>
-              <a:rPr lang="en-US" altLang="ko-KR" dirty="0"/>
-              <a:t>About</a:t>
-            </a:r>
-          </a:p>
-          <a:p>
-            <a:pPr algn="ctr"/>
-            <a:r>
-              <a:rPr lang="en-US" altLang="ko-KR" dirty="0"/>
-              <a:t>Support</a:t>
-            </a:r>
-            <a:endParaRPr lang="ko-KR" altLang="en-US" dirty="0"/>
-          </a:p>
-        </p:txBody>
-      </p:sp>
-      <p:sp>
-        <p:nvSpPr>
-          <p:cNvPr id="13" name="TextBox 12">
-            <a:extLst>
-              <a:ext uri="{FF2B5EF4-FFF2-40B4-BE49-F238E27FC236}">
-                <a16:creationId xmlns:a16="http://schemas.microsoft.com/office/drawing/2014/main" id="{D52A112A-AD62-6A81-B022-79A6B6FDC86E}"/>
-              </a:ext>
-            </a:extLst>
-          </p:cNvPr>
-          <p:cNvSpPr txBox="1"/>
-          <p:nvPr/>
-        </p:nvSpPr>
-        <p:spPr>
-          <a:xfrm>
-            <a:off x="8466405" y="478343"/>
-            <a:ext cx="1184940" cy="261610"/>
-          </a:xfrm>
-          <a:prstGeom prst="rect">
-            <a:avLst/>
-          </a:prstGeom>
-          <a:noFill/>
-        </p:spPr>
-        <p:txBody>
-          <a:bodyPr wrap="none" rtlCol="0">
-            <a:spAutoFit/>
-          </a:bodyPr>
-          <a:lstStyle/>
-          <a:p>
-            <a:r>
-              <a:rPr lang="en-US" altLang="ko-KR" sz="1100" dirty="0"/>
-              <a:t>Drop down menu</a:t>
-            </a:r>
-            <a:endParaRPr lang="ko-KR" altLang="en-US" sz="1100" dirty="0"/>
-          </a:p>
-        </p:txBody>
-      </p:sp>
-      <p:cxnSp>
-        <p:nvCxnSpPr>
-          <p:cNvPr id="15" name="직선 화살표 연결선 14">
-            <a:extLst>
-              <a:ext uri="{FF2B5EF4-FFF2-40B4-BE49-F238E27FC236}">
-                <a16:creationId xmlns:a16="http://schemas.microsoft.com/office/drawing/2014/main" id="{D70E6A1D-F71F-2D18-EC78-C0427E6F36FC}"/>
-              </a:ext>
-            </a:extLst>
-          </p:cNvPr>
-          <p:cNvCxnSpPr>
-            <a:stCxn id="13" idx="2"/>
-          </p:cNvCxnSpPr>
-          <p:nvPr/>
-        </p:nvCxnSpPr>
-        <p:spPr>
-          <a:xfrm flipH="1">
-            <a:off x="8937523" y="739953"/>
-            <a:ext cx="121352" cy="808628"/>
-          </a:xfrm>
-          <a:prstGeom prst="straightConnector1">
-            <a:avLst/>
-          </a:prstGeom>
-          <a:ln>
-            <a:tailEnd type="triangle"/>
-          </a:ln>
-        </p:spPr>
-        <p:style>
-          <a:lnRef idx="1">
-            <a:schemeClr val="accent2"/>
-          </a:lnRef>
-          <a:fillRef idx="0">
-            <a:schemeClr val="accent2"/>
-          </a:fillRef>
-          <a:effectRef idx="0">
-            <a:schemeClr val="accent2"/>
-          </a:effectRef>
-          <a:fontRef idx="minor">
-            <a:schemeClr val="tx1"/>
-          </a:fontRef>
-        </p:style>
-      </p:cxnSp>
-      <p:sp>
-        <p:nvSpPr>
-          <p:cNvPr id="17" name="TextBox 16">
-            <a:extLst>
-              <a:ext uri="{FF2B5EF4-FFF2-40B4-BE49-F238E27FC236}">
-                <a16:creationId xmlns:a16="http://schemas.microsoft.com/office/drawing/2014/main" id="{B8C5B148-A15C-D760-3FAB-6CB6ADBC2D21}"/>
-              </a:ext>
-            </a:extLst>
-          </p:cNvPr>
-          <p:cNvSpPr txBox="1"/>
-          <p:nvPr/>
-        </p:nvSpPr>
-        <p:spPr>
-          <a:xfrm>
-            <a:off x="228284" y="5437739"/>
-            <a:ext cx="1443024" cy="261610"/>
-          </a:xfrm>
-          <a:prstGeom prst="rect">
-            <a:avLst/>
-          </a:prstGeom>
-          <a:noFill/>
-        </p:spPr>
-        <p:txBody>
-          <a:bodyPr wrap="none" rtlCol="0">
-            <a:spAutoFit/>
-          </a:bodyPr>
-          <a:lstStyle/>
-          <a:p>
-            <a:r>
-              <a:rPr lang="en-US" altLang="ko-KR" sz="1100" dirty="0"/>
-              <a:t>Lines x Bet = Total Bet</a:t>
-            </a:r>
-            <a:endParaRPr lang="ko-KR" altLang="en-US" sz="1100" dirty="0"/>
-          </a:p>
-        </p:txBody>
-      </p:sp>
-      <p:cxnSp>
-        <p:nvCxnSpPr>
-          <p:cNvPr id="19" name="직선 화살표 연결선 18">
-            <a:extLst>
-              <a:ext uri="{FF2B5EF4-FFF2-40B4-BE49-F238E27FC236}">
-                <a16:creationId xmlns:a16="http://schemas.microsoft.com/office/drawing/2014/main" id="{569557D0-8E34-9802-C2A8-0D83C454977E}"/>
-              </a:ext>
-            </a:extLst>
-          </p:cNvPr>
-          <p:cNvCxnSpPr>
-            <a:stCxn id="17" idx="0"/>
-          </p:cNvCxnSpPr>
-          <p:nvPr/>
-        </p:nvCxnSpPr>
-        <p:spPr>
-          <a:xfrm flipV="1">
-            <a:off x="949796" y="5079531"/>
-            <a:ext cx="541058" cy="358208"/>
-          </a:xfrm>
-          <a:prstGeom prst="straightConnector1">
-            <a:avLst/>
-          </a:prstGeom>
-          <a:ln>
-            <a:tailEnd type="triangle"/>
-          </a:ln>
-        </p:spPr>
-        <p:style>
-          <a:lnRef idx="1">
-            <a:schemeClr val="accent2"/>
-          </a:lnRef>
-          <a:fillRef idx="0">
-            <a:schemeClr val="accent2"/>
-          </a:fillRef>
-          <a:effectRef idx="0">
-            <a:schemeClr val="accent2"/>
-          </a:effectRef>
-          <a:fontRef idx="minor">
-            <a:schemeClr val="tx1"/>
-          </a:fontRef>
-        </p:style>
-      </p:cxnSp>
-      <p:sp>
-        <p:nvSpPr>
-          <p:cNvPr id="20" name="직사각형 19">
-            <a:extLst>
-              <a:ext uri="{FF2B5EF4-FFF2-40B4-BE49-F238E27FC236}">
-                <a16:creationId xmlns:a16="http://schemas.microsoft.com/office/drawing/2014/main" id="{0214A0E9-EC51-9DC8-1FCC-B01E579FFDA6}"/>
-              </a:ext>
-            </a:extLst>
-          </p:cNvPr>
-          <p:cNvSpPr/>
-          <p:nvPr/>
-        </p:nvSpPr>
-        <p:spPr>
-          <a:xfrm>
-            <a:off x="3821552" y="4452330"/>
-            <a:ext cx="2262895" cy="803708"/>
-          </a:xfrm>
-          <a:prstGeom prst="rect">
-            <a:avLst/>
-          </a:prstGeom>
-        </p:spPr>
-        <p:style>
-          <a:lnRef idx="2">
-            <a:schemeClr val="accent1">
-              <a:shade val="50000"/>
-            </a:schemeClr>
-          </a:lnRef>
-          <a:fillRef idx="1">
-            <a:schemeClr val="accent1"/>
-          </a:fillRef>
-          <a:effectRef idx="0">
-            <a:schemeClr val="accent1"/>
-          </a:effectRef>
-          <a:fontRef idx="minor">
-            <a:schemeClr val="lt1"/>
-          </a:fontRef>
-        </p:style>
-        <p:txBody>
-          <a:bodyPr rtlCol="0" anchor="ctr"/>
-          <a:lstStyle/>
-          <a:p>
-            <a:r>
-              <a:rPr lang="en-US" altLang="ko-KR" dirty="0"/>
-              <a:t>   Win</a:t>
-            </a:r>
-          </a:p>
-          <a:p>
-            <a:r>
-              <a:rPr lang="en-US" altLang="ko-KR" dirty="0"/>
-              <a:t>   Total Win</a:t>
-            </a:r>
-            <a:endParaRPr lang="ko-KR" altLang="en-US" dirty="0"/>
-          </a:p>
-        </p:txBody>
-      </p:sp>
-      <p:sp>
-        <p:nvSpPr>
-          <p:cNvPr id="21" name="타원 20">
-            <a:extLst>
-              <a:ext uri="{FF2B5EF4-FFF2-40B4-BE49-F238E27FC236}">
-                <a16:creationId xmlns:a16="http://schemas.microsoft.com/office/drawing/2014/main" id="{ED41398F-0776-D0EA-9D9E-7770C2CD8784}"/>
-              </a:ext>
-            </a:extLst>
-          </p:cNvPr>
-          <p:cNvSpPr/>
-          <p:nvPr/>
-        </p:nvSpPr>
-        <p:spPr>
-          <a:xfrm>
-            <a:off x="7853476" y="2687379"/>
-            <a:ext cx="606198" cy="556054"/>
-          </a:xfrm>
-          <a:prstGeom prst="ellipse">
-            <a:avLst/>
-          </a:prstGeom>
-        </p:spPr>
-        <p:style>
-          <a:lnRef idx="2">
-            <a:schemeClr val="accent6">
-              <a:shade val="50000"/>
-            </a:schemeClr>
-          </a:lnRef>
-          <a:fillRef idx="1">
-            <a:schemeClr val="accent6"/>
-          </a:fillRef>
-          <a:effectRef idx="0">
-            <a:schemeClr val="accent6"/>
-          </a:effectRef>
-          <a:fontRef idx="minor">
-            <a:schemeClr val="lt1"/>
-          </a:fontRef>
-        </p:style>
-        <p:txBody>
-          <a:bodyPr rtlCol="0" anchor="ctr"/>
-          <a:lstStyle/>
-          <a:p>
-            <a:pPr algn="ctr"/>
-            <a:r>
-              <a:rPr lang="en-US" altLang="ko-KR" sz="900" dirty="0"/>
-              <a:t>50</a:t>
-            </a:r>
-          </a:p>
-          <a:p>
-            <a:pPr algn="ctr"/>
-            <a:r>
-              <a:rPr lang="en-US" altLang="ko-KR" sz="900" dirty="0"/>
-              <a:t>Lines</a:t>
-            </a:r>
-            <a:endParaRPr lang="ko-KR" altLang="en-US" sz="900" dirty="0"/>
-          </a:p>
-        </p:txBody>
-      </p:sp>
-      <p:sp>
-        <p:nvSpPr>
-          <p:cNvPr id="22" name="직사각형 21">
-            <a:extLst>
-              <a:ext uri="{FF2B5EF4-FFF2-40B4-BE49-F238E27FC236}">
-                <a16:creationId xmlns:a16="http://schemas.microsoft.com/office/drawing/2014/main" id="{A740D4CE-1CE9-9FFC-EF1D-BD6C7F9395ED}"/>
-              </a:ext>
-            </a:extLst>
-          </p:cNvPr>
-          <p:cNvSpPr/>
-          <p:nvPr/>
-        </p:nvSpPr>
-        <p:spPr>
-          <a:xfrm>
-            <a:off x="774780" y="932097"/>
-            <a:ext cx="7940531" cy="461665"/>
-          </a:xfrm>
-          <a:prstGeom prst="rect">
-            <a:avLst/>
-          </a:prstGeom>
-        </p:spPr>
-        <p:style>
-          <a:lnRef idx="2">
-            <a:schemeClr val="accent5">
-              <a:shade val="50000"/>
-            </a:schemeClr>
-          </a:lnRef>
-          <a:fillRef idx="1">
-            <a:schemeClr val="accent5"/>
-          </a:fillRef>
-          <a:effectRef idx="0">
-            <a:schemeClr val="accent5"/>
-          </a:effectRef>
-          <a:fontRef idx="minor">
-            <a:schemeClr val="lt1"/>
-          </a:fontRef>
-        </p:style>
-        <p:txBody>
-          <a:bodyPr rtlCol="0" anchor="ctr"/>
-          <a:lstStyle/>
-          <a:p>
-            <a:pPr algn="ctr"/>
-            <a:endParaRPr lang="ko-KR" altLang="en-US"/>
-          </a:p>
-        </p:txBody>
-      </p:sp>
-      <p:sp>
-        <p:nvSpPr>
-          <p:cNvPr id="23" name="직사각형 22">
-            <a:extLst>
-              <a:ext uri="{FF2B5EF4-FFF2-40B4-BE49-F238E27FC236}">
-                <a16:creationId xmlns:a16="http://schemas.microsoft.com/office/drawing/2014/main" id="{6DA6F8EF-9107-331E-2651-7DD4D8A58B4E}"/>
-              </a:ext>
-            </a:extLst>
-          </p:cNvPr>
-          <p:cNvSpPr/>
-          <p:nvPr/>
-        </p:nvSpPr>
-        <p:spPr>
-          <a:xfrm>
-            <a:off x="3938554" y="925499"/>
-            <a:ext cx="1612982" cy="478096"/>
-          </a:xfrm>
-          <a:prstGeom prst="rect">
-            <a:avLst/>
-          </a:prstGeom>
-        </p:spPr>
-        <p:style>
-          <a:lnRef idx="2">
-            <a:schemeClr val="accent4">
-              <a:shade val="50000"/>
-            </a:schemeClr>
-          </a:lnRef>
-          <a:fillRef idx="1">
-            <a:schemeClr val="accent4"/>
-          </a:fillRef>
-          <a:effectRef idx="0">
-            <a:schemeClr val="accent4"/>
-          </a:effectRef>
-          <a:fontRef idx="minor">
-            <a:schemeClr val="lt1"/>
-          </a:fontRef>
-        </p:style>
-        <p:txBody>
-          <a:bodyPr rtlCol="0" anchor="ctr"/>
-          <a:lstStyle/>
-          <a:p>
-            <a:pPr algn="ctr"/>
-            <a:r>
-              <a:rPr lang="en-US" altLang="ko-KR" dirty="0"/>
-              <a:t>Casino Logo</a:t>
-            </a:r>
-            <a:endParaRPr lang="ko-KR" altLang="en-US" dirty="0"/>
-          </a:p>
-        </p:txBody>
-      </p:sp>
-      <p:sp>
-        <p:nvSpPr>
-          <p:cNvPr id="24" name="타원 23">
-            <a:extLst>
-              <a:ext uri="{FF2B5EF4-FFF2-40B4-BE49-F238E27FC236}">
-                <a16:creationId xmlns:a16="http://schemas.microsoft.com/office/drawing/2014/main" id="{7A1E4098-CD2A-2B55-0937-62E62314FFA9}"/>
-              </a:ext>
-            </a:extLst>
-          </p:cNvPr>
-          <p:cNvSpPr/>
-          <p:nvPr/>
-        </p:nvSpPr>
-        <p:spPr>
-          <a:xfrm>
-            <a:off x="8032956" y="935766"/>
-            <a:ext cx="702024" cy="547922"/>
-          </a:xfrm>
-          <a:prstGeom prst="ellipse">
-            <a:avLst/>
-          </a:prstGeom>
-        </p:spPr>
-        <p:style>
-          <a:lnRef idx="2">
-            <a:schemeClr val="accent4">
-              <a:shade val="50000"/>
-            </a:schemeClr>
-          </a:lnRef>
-          <a:fillRef idx="1">
-            <a:schemeClr val="accent4"/>
-          </a:fillRef>
-          <a:effectRef idx="0">
-            <a:schemeClr val="accent4"/>
-          </a:effectRef>
-          <a:fontRef idx="minor">
-            <a:schemeClr val="lt1"/>
-          </a:fontRef>
-        </p:style>
-        <p:txBody>
-          <a:bodyPr rtlCol="0" anchor="ctr"/>
-          <a:lstStyle/>
-          <a:p>
-            <a:pPr algn="ctr"/>
-            <a:r>
-              <a:rPr lang="en-US" altLang="ko-KR" sz="900" dirty="0"/>
-              <a:t>Menu</a:t>
-            </a:r>
-          </a:p>
-        </p:txBody>
-      </p:sp>
-      <p:sp>
-        <p:nvSpPr>
-          <p:cNvPr id="25" name="직사각형 24">
-            <a:extLst>
-              <a:ext uri="{FF2B5EF4-FFF2-40B4-BE49-F238E27FC236}">
-                <a16:creationId xmlns:a16="http://schemas.microsoft.com/office/drawing/2014/main" id="{9C588235-B3DB-FBE7-601A-16258454C23D}"/>
-              </a:ext>
-            </a:extLst>
-          </p:cNvPr>
-          <p:cNvSpPr/>
-          <p:nvPr/>
-        </p:nvSpPr>
-        <p:spPr>
-          <a:xfrm>
-            <a:off x="1616740" y="925981"/>
-            <a:ext cx="1978250" cy="476097"/>
-          </a:xfrm>
-          <a:prstGeom prst="rect">
-            <a:avLst/>
-          </a:prstGeom>
-        </p:spPr>
-        <p:style>
-          <a:lnRef idx="2">
-            <a:schemeClr val="accent4">
-              <a:shade val="50000"/>
-            </a:schemeClr>
-          </a:lnRef>
-          <a:fillRef idx="1">
-            <a:schemeClr val="accent4"/>
-          </a:fillRef>
-          <a:effectRef idx="0">
-            <a:schemeClr val="accent4"/>
-          </a:effectRef>
-          <a:fontRef idx="minor">
-            <a:schemeClr val="lt1"/>
-          </a:fontRef>
-        </p:style>
-        <p:txBody>
-          <a:bodyPr rtlCol="0" anchor="ctr"/>
-          <a:lstStyle/>
-          <a:p>
-            <a:pPr algn="ctr"/>
-            <a:r>
-              <a:rPr lang="en-US" altLang="ko-KR" dirty="0"/>
-              <a:t>My Money</a:t>
-            </a:r>
-            <a:endParaRPr lang="ko-KR" altLang="en-US" dirty="0"/>
-          </a:p>
-        </p:txBody>
-      </p:sp>
-      <p:sp>
-        <p:nvSpPr>
-          <p:cNvPr id="26" name="타원 25">
-            <a:extLst>
-              <a:ext uri="{FF2B5EF4-FFF2-40B4-BE49-F238E27FC236}">
-                <a16:creationId xmlns:a16="http://schemas.microsoft.com/office/drawing/2014/main" id="{3CFC3D86-72D3-5D4E-FC5A-67EC8D01B851}"/>
-              </a:ext>
-            </a:extLst>
-          </p:cNvPr>
-          <p:cNvSpPr/>
-          <p:nvPr/>
-        </p:nvSpPr>
-        <p:spPr>
-          <a:xfrm>
-            <a:off x="796413" y="925499"/>
-            <a:ext cx="505699" cy="547922"/>
-          </a:xfrm>
-          <a:prstGeom prst="ellipse">
-            <a:avLst/>
-          </a:prstGeom>
-        </p:spPr>
-        <p:style>
-          <a:lnRef idx="2">
-            <a:schemeClr val="accent4">
-              <a:shade val="50000"/>
-            </a:schemeClr>
-          </a:lnRef>
-          <a:fillRef idx="1">
-            <a:schemeClr val="accent4"/>
-          </a:fillRef>
-          <a:effectRef idx="0">
-            <a:schemeClr val="accent4"/>
-          </a:effectRef>
-          <a:fontRef idx="minor">
-            <a:schemeClr val="lt1"/>
-          </a:fontRef>
-        </p:style>
-        <p:txBody>
-          <a:bodyPr rtlCol="0" anchor="ctr"/>
-          <a:lstStyle/>
-          <a:p>
-            <a:pPr algn="ctr"/>
-            <a:r>
-              <a:rPr lang="en-US" altLang="ko-KR" sz="900" dirty="0"/>
-              <a:t>Home</a:t>
-            </a:r>
+          <a:p>
+            <a:pPr marL="228600" indent="-228600">
+              <a:buFont typeface="+mj-lt"/>
+              <a:buAutoNum type="arabicPeriod"/>
+            </a:pPr>
+            <a:r>
+              <a:rPr lang="en-US" altLang="ko-KR" sz="1200" dirty="0"/>
+              <a:t>Reel Pos</a:t>
+            </a:r>
+          </a:p>
+          <a:p>
+            <a:pPr marL="685800" lvl="1" indent="-228600">
+              <a:buFont typeface="+mj-lt"/>
+              <a:buAutoNum type="arabicPeriod"/>
+            </a:pPr>
+            <a:r>
+              <a:rPr lang="en-US" altLang="ko-KR" sz="1200" dirty="0"/>
+              <a:t>X : 240</a:t>
+            </a:r>
+          </a:p>
+          <a:p>
+            <a:pPr marL="228600" indent="-228600">
+              <a:buFont typeface="+mj-lt"/>
+              <a:buAutoNum type="arabicPeriod"/>
+            </a:pPr>
+            <a:r>
+              <a:rPr lang="en-US" altLang="ko-KR" sz="1200" dirty="0"/>
+              <a:t>Symbol Pos</a:t>
+            </a:r>
+          </a:p>
+          <a:p>
+            <a:pPr marL="685800" lvl="1" indent="-228600">
+              <a:buFont typeface="+mj-lt"/>
+              <a:buAutoNum type="arabicPeriod"/>
+            </a:pPr>
+            <a:r>
+              <a:rPr lang="en-US" altLang="ko-KR" sz="1200" dirty="0"/>
+              <a:t>Y : 240</a:t>
+            </a:r>
+          </a:p>
+          <a:p>
+            <a:pPr marL="228600" indent="-228600">
+              <a:buFont typeface="+mj-lt"/>
+              <a:buAutoNum type="arabicPeriod"/>
+            </a:pPr>
+            <a:r>
+              <a:rPr lang="en-US" altLang="ko-KR" sz="1200" dirty="0"/>
+              <a:t>Symbol Width, Height</a:t>
+            </a:r>
+          </a:p>
+          <a:p>
+            <a:pPr marL="685800" lvl="1" indent="-228600">
+              <a:buFont typeface="+mj-lt"/>
+              <a:buAutoNum type="arabicPeriod"/>
+            </a:pPr>
+            <a:r>
+              <a:rPr lang="en-US" altLang="ko-KR" sz="1200" dirty="0"/>
+              <a:t>220 </a:t>
+            </a:r>
+            <a:r>
+              <a:rPr lang="en-US" altLang="ko-KR" sz="1200"/>
+              <a:t>X 220</a:t>
+            </a:r>
+            <a:endParaRPr lang="en-US" altLang="ko-KR" sz="1200" dirty="0"/>
           </a:p>
         </p:txBody>
       </p:sp>
     </p:spTree>
     <p:extLst>
       <p:ext uri="{BB962C8B-B14F-4D97-AF65-F5344CB8AC3E}">
-        <p14:creationId xmlns:p14="http://schemas.microsoft.com/office/powerpoint/2010/main" val="4032292214"/>
+        <p14:creationId xmlns:p14="http://schemas.microsoft.com/office/powerpoint/2010/main" val="1558144073"/>
       </p:ext>
     </p:extLst>
   </p:cSld>
@@ -7162,7 +6302,7 @@
           <a:p>
             <a:r>
               <a:rPr lang="en-US" altLang="ko-KR" sz="1200" dirty="0"/>
-              <a:t>[ Rock Climber Slot Bonus UI ]</a:t>
+              <a:t>[ Rock Climber Slot Main UI ]</a:t>
             </a:r>
           </a:p>
           <a:p>
@@ -7175,7 +6315,7 @@
           <p:cNvPr id="2" name="직사각형 1">
             <a:extLst>
               <a:ext uri="{FF2B5EF4-FFF2-40B4-BE49-F238E27FC236}">
-                <a16:creationId xmlns:a16="http://schemas.microsoft.com/office/drawing/2014/main" id="{38D97D2C-275D-1C4D-58F2-E66F4CCF6390}"/>
+                <a16:creationId xmlns:a16="http://schemas.microsoft.com/office/drawing/2014/main" id="{2732B4F0-AAB9-10F5-AB6B-33308FB2803B}"/>
               </a:ext>
             </a:extLst>
           </p:cNvPr>
@@ -7221,7 +6361,7 @@
           <p:cNvPr id="3" name="타원 2">
             <a:extLst>
               <a:ext uri="{FF2B5EF4-FFF2-40B4-BE49-F238E27FC236}">
-                <a16:creationId xmlns:a16="http://schemas.microsoft.com/office/drawing/2014/main" id="{69CBE109-A39E-B0FB-A345-71142350EE85}"/>
+                <a16:creationId xmlns:a16="http://schemas.microsoft.com/office/drawing/2014/main" id="{E274E6D6-66F5-0021-7A97-2C6459077D16}"/>
               </a:ext>
             </a:extLst>
           </p:cNvPr>
@@ -7230,10 +6370,646 @@
         </p:nvSpPr>
         <p:spPr>
           <a:xfrm>
-            <a:off x="7610168" y="4279982"/>
-            <a:ext cx="1011739" cy="1011739"/>
+            <a:off x="7801897" y="4471711"/>
+            <a:ext cx="820010" cy="820010"/>
           </a:xfrm>
           <a:prstGeom prst="ellipse">
+            <a:avLst/>
+          </a:prstGeom>
+        </p:spPr>
+        <p:style>
+          <a:lnRef idx="2">
+            <a:schemeClr val="accent1">
+              <a:shade val="50000"/>
+            </a:schemeClr>
+          </a:lnRef>
+          <a:fillRef idx="1">
+            <a:schemeClr val="accent1"/>
+          </a:fillRef>
+          <a:effectRef idx="0">
+            <a:schemeClr val="accent1"/>
+          </a:effectRef>
+          <a:fontRef idx="minor">
+            <a:schemeClr val="lt1"/>
+          </a:fontRef>
+        </p:style>
+        <p:txBody>
+          <a:bodyPr rtlCol="0" anchor="ctr"/>
+          <a:lstStyle/>
+          <a:p>
+            <a:pPr algn="ctr"/>
+            <a:r>
+              <a:rPr lang="en-US" altLang="ko-KR" sz="1600" dirty="0"/>
+              <a:t>Spin</a:t>
+            </a:r>
+            <a:endParaRPr lang="ko-KR" altLang="en-US" sz="1600" dirty="0"/>
+          </a:p>
+        </p:txBody>
+      </p:sp>
+      <p:sp>
+        <p:nvSpPr>
+          <p:cNvPr id="5" name="직사각형 4">
+            <a:extLst>
+              <a:ext uri="{FF2B5EF4-FFF2-40B4-BE49-F238E27FC236}">
+                <a16:creationId xmlns:a16="http://schemas.microsoft.com/office/drawing/2014/main" id="{C328220F-A5C7-8AFA-F86E-E3BEEA75B6CA}"/>
+              </a:ext>
+            </a:extLst>
+          </p:cNvPr>
+          <p:cNvSpPr/>
+          <p:nvPr/>
+        </p:nvSpPr>
+        <p:spPr>
+          <a:xfrm>
+            <a:off x="1758008" y="1531863"/>
+            <a:ext cx="6046838" cy="2867087"/>
+          </a:xfrm>
+          <a:prstGeom prst="rect">
+            <a:avLst/>
+          </a:prstGeom>
+        </p:spPr>
+        <p:style>
+          <a:lnRef idx="2">
+            <a:schemeClr val="accent1">
+              <a:shade val="50000"/>
+            </a:schemeClr>
+          </a:lnRef>
+          <a:fillRef idx="1">
+            <a:schemeClr val="accent1"/>
+          </a:fillRef>
+          <a:effectRef idx="0">
+            <a:schemeClr val="accent1"/>
+          </a:effectRef>
+          <a:fontRef idx="minor">
+            <a:schemeClr val="lt1"/>
+          </a:fontRef>
+        </p:style>
+        <p:txBody>
+          <a:bodyPr rtlCol="0" anchor="ctr"/>
+          <a:lstStyle/>
+          <a:p>
+            <a:pPr algn="ctr"/>
+            <a:r>
+              <a:rPr lang="en-US" altLang="ko-KR" dirty="0"/>
+              <a:t>3 X 5 Reel</a:t>
+            </a:r>
+            <a:endParaRPr lang="ko-KR" altLang="en-US" dirty="0"/>
+          </a:p>
+        </p:txBody>
+      </p:sp>
+      <p:sp>
+        <p:nvSpPr>
+          <p:cNvPr id="6" name="직사각형 5">
+            <a:extLst>
+              <a:ext uri="{FF2B5EF4-FFF2-40B4-BE49-F238E27FC236}">
+                <a16:creationId xmlns:a16="http://schemas.microsoft.com/office/drawing/2014/main" id="{401A1B05-35E7-C0AB-D041-CAE41E665691}"/>
+              </a:ext>
+            </a:extLst>
+          </p:cNvPr>
+          <p:cNvSpPr/>
+          <p:nvPr/>
+        </p:nvSpPr>
+        <p:spPr>
+          <a:xfrm>
+            <a:off x="949796" y="4623580"/>
+            <a:ext cx="1404047" cy="556054"/>
+          </a:xfrm>
+          <a:prstGeom prst="rect">
+            <a:avLst/>
+          </a:prstGeom>
+        </p:spPr>
+        <p:style>
+          <a:lnRef idx="2">
+            <a:schemeClr val="accent1">
+              <a:shade val="50000"/>
+            </a:schemeClr>
+          </a:lnRef>
+          <a:fillRef idx="1">
+            <a:schemeClr val="accent1"/>
+          </a:fillRef>
+          <a:effectRef idx="0">
+            <a:schemeClr val="accent1"/>
+          </a:effectRef>
+          <a:fontRef idx="minor">
+            <a:schemeClr val="lt1"/>
+          </a:fontRef>
+        </p:style>
+        <p:txBody>
+          <a:bodyPr rtlCol="0" anchor="ctr"/>
+          <a:lstStyle/>
+          <a:p>
+            <a:pPr algn="ctr"/>
+            <a:r>
+              <a:rPr lang="en-US" altLang="ko-KR" dirty="0"/>
+              <a:t>Total Bet</a:t>
+            </a:r>
+            <a:endParaRPr lang="ko-KR" altLang="en-US" dirty="0"/>
+          </a:p>
+        </p:txBody>
+      </p:sp>
+      <p:sp>
+        <p:nvSpPr>
+          <p:cNvPr id="7" name="이등변 삼각형 6">
+            <a:extLst>
+              <a:ext uri="{FF2B5EF4-FFF2-40B4-BE49-F238E27FC236}">
+                <a16:creationId xmlns:a16="http://schemas.microsoft.com/office/drawing/2014/main" id="{62F1089D-9BE5-D27B-67F2-818CE9BF388E}"/>
+              </a:ext>
+            </a:extLst>
+          </p:cNvPr>
+          <p:cNvSpPr/>
+          <p:nvPr/>
+        </p:nvSpPr>
+        <p:spPr>
+          <a:xfrm rot="16200000">
+            <a:off x="771872" y="4748223"/>
+            <a:ext cx="355849" cy="306766"/>
+          </a:xfrm>
+          <a:prstGeom prst="triangle">
+            <a:avLst/>
+          </a:prstGeom>
+        </p:spPr>
+        <p:style>
+          <a:lnRef idx="2">
+            <a:schemeClr val="accent2">
+              <a:shade val="50000"/>
+            </a:schemeClr>
+          </a:lnRef>
+          <a:fillRef idx="1">
+            <a:schemeClr val="accent2"/>
+          </a:fillRef>
+          <a:effectRef idx="0">
+            <a:schemeClr val="accent2"/>
+          </a:effectRef>
+          <a:fontRef idx="minor">
+            <a:schemeClr val="lt1"/>
+          </a:fontRef>
+        </p:style>
+        <p:txBody>
+          <a:bodyPr rtlCol="0" anchor="ctr"/>
+          <a:lstStyle/>
+          <a:p>
+            <a:pPr algn="ctr"/>
+            <a:endParaRPr lang="ko-KR" altLang="en-US"/>
+          </a:p>
+        </p:txBody>
+      </p:sp>
+      <p:sp>
+        <p:nvSpPr>
+          <p:cNvPr id="8" name="이등변 삼각형 7">
+            <a:extLst>
+              <a:ext uri="{FF2B5EF4-FFF2-40B4-BE49-F238E27FC236}">
+                <a16:creationId xmlns:a16="http://schemas.microsoft.com/office/drawing/2014/main" id="{DCC09CCB-B009-766F-39CA-9BEE85349E82}"/>
+              </a:ext>
+            </a:extLst>
+          </p:cNvPr>
+          <p:cNvSpPr/>
+          <p:nvPr/>
+        </p:nvSpPr>
+        <p:spPr>
+          <a:xfrm rot="5400000">
+            <a:off x="2175919" y="4753365"/>
+            <a:ext cx="355849" cy="306766"/>
+          </a:xfrm>
+          <a:prstGeom prst="triangle">
+            <a:avLst/>
+          </a:prstGeom>
+        </p:spPr>
+        <p:style>
+          <a:lnRef idx="2">
+            <a:schemeClr val="accent2">
+              <a:shade val="50000"/>
+            </a:schemeClr>
+          </a:lnRef>
+          <a:fillRef idx="1">
+            <a:schemeClr val="accent2"/>
+          </a:fillRef>
+          <a:effectRef idx="0">
+            <a:schemeClr val="accent2"/>
+          </a:effectRef>
+          <a:fontRef idx="minor">
+            <a:schemeClr val="lt1"/>
+          </a:fontRef>
+        </p:style>
+        <p:txBody>
+          <a:bodyPr rtlCol="0" anchor="ctr"/>
+          <a:lstStyle/>
+          <a:p>
+            <a:pPr algn="ctr"/>
+            <a:endParaRPr lang="ko-KR" altLang="en-US"/>
+          </a:p>
+        </p:txBody>
+      </p:sp>
+      <p:sp>
+        <p:nvSpPr>
+          <p:cNvPr id="9" name="타원 8">
+            <a:extLst>
+              <a:ext uri="{FF2B5EF4-FFF2-40B4-BE49-F238E27FC236}">
+                <a16:creationId xmlns:a16="http://schemas.microsoft.com/office/drawing/2014/main" id="{A08F8E11-14F2-1716-E9D3-96FED3BC1945}"/>
+              </a:ext>
+            </a:extLst>
+          </p:cNvPr>
+          <p:cNvSpPr/>
+          <p:nvPr/>
+        </p:nvSpPr>
+        <p:spPr>
+          <a:xfrm>
+            <a:off x="1103180" y="2687379"/>
+            <a:ext cx="606198" cy="556054"/>
+          </a:xfrm>
+          <a:prstGeom prst="ellipse">
+            <a:avLst/>
+          </a:prstGeom>
+        </p:spPr>
+        <p:style>
+          <a:lnRef idx="2">
+            <a:schemeClr val="accent6">
+              <a:shade val="50000"/>
+            </a:schemeClr>
+          </a:lnRef>
+          <a:fillRef idx="1">
+            <a:schemeClr val="accent6"/>
+          </a:fillRef>
+          <a:effectRef idx="0">
+            <a:schemeClr val="accent6"/>
+          </a:effectRef>
+          <a:fontRef idx="minor">
+            <a:schemeClr val="lt1"/>
+          </a:fontRef>
+        </p:style>
+        <p:txBody>
+          <a:bodyPr rtlCol="0" anchor="ctr"/>
+          <a:lstStyle/>
+          <a:p>
+            <a:pPr algn="ctr"/>
+            <a:r>
+              <a:rPr lang="en-US" altLang="ko-KR" sz="900" dirty="0"/>
+              <a:t>50</a:t>
+            </a:r>
+          </a:p>
+          <a:p>
+            <a:pPr algn="ctr"/>
+            <a:r>
+              <a:rPr lang="en-US" altLang="ko-KR" sz="900" dirty="0"/>
+              <a:t>Lines</a:t>
+            </a:r>
+            <a:endParaRPr lang="ko-KR" altLang="en-US" sz="900" dirty="0"/>
+          </a:p>
+        </p:txBody>
+      </p:sp>
+      <p:sp>
+        <p:nvSpPr>
+          <p:cNvPr id="12" name="직사각형 11">
+            <a:extLst>
+              <a:ext uri="{FF2B5EF4-FFF2-40B4-BE49-F238E27FC236}">
+                <a16:creationId xmlns:a16="http://schemas.microsoft.com/office/drawing/2014/main" id="{DB134231-B133-4846-F5B1-C72D37AB5766}"/>
+              </a:ext>
+            </a:extLst>
+          </p:cNvPr>
+          <p:cNvSpPr/>
+          <p:nvPr/>
+        </p:nvSpPr>
+        <p:spPr>
+          <a:xfrm>
+            <a:off x="8436078" y="1442392"/>
+            <a:ext cx="1215267" cy="1911391"/>
+          </a:xfrm>
+          <a:prstGeom prst="rect">
+            <a:avLst/>
+          </a:prstGeom>
+        </p:spPr>
+        <p:style>
+          <a:lnRef idx="2">
+            <a:schemeClr val="accent4">
+              <a:shade val="50000"/>
+            </a:schemeClr>
+          </a:lnRef>
+          <a:fillRef idx="1">
+            <a:schemeClr val="accent4"/>
+          </a:fillRef>
+          <a:effectRef idx="0">
+            <a:schemeClr val="accent4"/>
+          </a:effectRef>
+          <a:fontRef idx="minor">
+            <a:schemeClr val="lt1"/>
+          </a:fontRef>
+        </p:style>
+        <p:txBody>
+          <a:bodyPr rtlCol="0" anchor="ctr"/>
+          <a:lstStyle/>
+          <a:p>
+            <a:pPr algn="ctr"/>
+            <a:r>
+              <a:rPr lang="en-US" altLang="ko-KR" dirty="0"/>
+              <a:t>Pay Table</a:t>
+            </a:r>
+          </a:p>
+          <a:p>
+            <a:pPr algn="ctr"/>
+            <a:r>
+              <a:rPr lang="en-US" altLang="ko-KR" dirty="0"/>
+              <a:t>Setting</a:t>
+            </a:r>
+          </a:p>
+          <a:p>
+            <a:pPr algn="ctr"/>
+            <a:r>
+              <a:rPr lang="en-US" altLang="ko-KR" dirty="0"/>
+              <a:t>About</a:t>
+            </a:r>
+          </a:p>
+          <a:p>
+            <a:pPr algn="ctr"/>
+            <a:r>
+              <a:rPr lang="en-US" altLang="ko-KR" dirty="0"/>
+              <a:t>Support</a:t>
+            </a:r>
+            <a:endParaRPr lang="ko-KR" altLang="en-US" dirty="0"/>
+          </a:p>
+        </p:txBody>
+      </p:sp>
+      <p:sp>
+        <p:nvSpPr>
+          <p:cNvPr id="13" name="TextBox 12">
+            <a:extLst>
+              <a:ext uri="{FF2B5EF4-FFF2-40B4-BE49-F238E27FC236}">
+                <a16:creationId xmlns:a16="http://schemas.microsoft.com/office/drawing/2014/main" id="{D52A112A-AD62-6A81-B022-79A6B6FDC86E}"/>
+              </a:ext>
+            </a:extLst>
+          </p:cNvPr>
+          <p:cNvSpPr txBox="1"/>
+          <p:nvPr/>
+        </p:nvSpPr>
+        <p:spPr>
+          <a:xfrm>
+            <a:off x="8466405" y="478343"/>
+            <a:ext cx="1184940" cy="261610"/>
+          </a:xfrm>
+          <a:prstGeom prst="rect">
+            <a:avLst/>
+          </a:prstGeom>
+          <a:noFill/>
+        </p:spPr>
+        <p:txBody>
+          <a:bodyPr wrap="none" rtlCol="0">
+            <a:spAutoFit/>
+          </a:bodyPr>
+          <a:lstStyle/>
+          <a:p>
+            <a:r>
+              <a:rPr lang="en-US" altLang="ko-KR" sz="1100" dirty="0"/>
+              <a:t>Drop down menu</a:t>
+            </a:r>
+            <a:endParaRPr lang="ko-KR" altLang="en-US" sz="1100" dirty="0"/>
+          </a:p>
+        </p:txBody>
+      </p:sp>
+      <p:cxnSp>
+        <p:nvCxnSpPr>
+          <p:cNvPr id="15" name="직선 화살표 연결선 14">
+            <a:extLst>
+              <a:ext uri="{FF2B5EF4-FFF2-40B4-BE49-F238E27FC236}">
+                <a16:creationId xmlns:a16="http://schemas.microsoft.com/office/drawing/2014/main" id="{D70E6A1D-F71F-2D18-EC78-C0427E6F36FC}"/>
+              </a:ext>
+            </a:extLst>
+          </p:cNvPr>
+          <p:cNvCxnSpPr>
+            <a:stCxn id="13" idx="2"/>
+          </p:cNvCxnSpPr>
+          <p:nvPr/>
+        </p:nvCxnSpPr>
+        <p:spPr>
+          <a:xfrm flipH="1">
+            <a:off x="8937523" y="739953"/>
+            <a:ext cx="121352" cy="808628"/>
+          </a:xfrm>
+          <a:prstGeom prst="straightConnector1">
+            <a:avLst/>
+          </a:prstGeom>
+          <a:ln>
+            <a:tailEnd type="triangle"/>
+          </a:ln>
+        </p:spPr>
+        <p:style>
+          <a:lnRef idx="1">
+            <a:schemeClr val="accent2"/>
+          </a:lnRef>
+          <a:fillRef idx="0">
+            <a:schemeClr val="accent2"/>
+          </a:fillRef>
+          <a:effectRef idx="0">
+            <a:schemeClr val="accent2"/>
+          </a:effectRef>
+          <a:fontRef idx="minor">
+            <a:schemeClr val="tx1"/>
+          </a:fontRef>
+        </p:style>
+      </p:cxnSp>
+      <p:sp>
+        <p:nvSpPr>
+          <p:cNvPr id="17" name="TextBox 16">
+            <a:extLst>
+              <a:ext uri="{FF2B5EF4-FFF2-40B4-BE49-F238E27FC236}">
+                <a16:creationId xmlns:a16="http://schemas.microsoft.com/office/drawing/2014/main" id="{B8C5B148-A15C-D760-3FAB-6CB6ADBC2D21}"/>
+              </a:ext>
+            </a:extLst>
+          </p:cNvPr>
+          <p:cNvSpPr txBox="1"/>
+          <p:nvPr/>
+        </p:nvSpPr>
+        <p:spPr>
+          <a:xfrm>
+            <a:off x="228284" y="5437739"/>
+            <a:ext cx="1443024" cy="261610"/>
+          </a:xfrm>
+          <a:prstGeom prst="rect">
+            <a:avLst/>
+          </a:prstGeom>
+          <a:noFill/>
+        </p:spPr>
+        <p:txBody>
+          <a:bodyPr wrap="none" rtlCol="0">
+            <a:spAutoFit/>
+          </a:bodyPr>
+          <a:lstStyle/>
+          <a:p>
+            <a:r>
+              <a:rPr lang="en-US" altLang="ko-KR" sz="1100" dirty="0"/>
+              <a:t>Lines x Bet = Total Bet</a:t>
+            </a:r>
+            <a:endParaRPr lang="ko-KR" altLang="en-US" sz="1100" dirty="0"/>
+          </a:p>
+        </p:txBody>
+      </p:sp>
+      <p:cxnSp>
+        <p:nvCxnSpPr>
+          <p:cNvPr id="19" name="직선 화살표 연결선 18">
+            <a:extLst>
+              <a:ext uri="{FF2B5EF4-FFF2-40B4-BE49-F238E27FC236}">
+                <a16:creationId xmlns:a16="http://schemas.microsoft.com/office/drawing/2014/main" id="{569557D0-8E34-9802-C2A8-0D83C454977E}"/>
+              </a:ext>
+            </a:extLst>
+          </p:cNvPr>
+          <p:cNvCxnSpPr>
+            <a:stCxn id="17" idx="0"/>
+          </p:cNvCxnSpPr>
+          <p:nvPr/>
+        </p:nvCxnSpPr>
+        <p:spPr>
+          <a:xfrm flipV="1">
+            <a:off x="949796" y="5079531"/>
+            <a:ext cx="541058" cy="358208"/>
+          </a:xfrm>
+          <a:prstGeom prst="straightConnector1">
+            <a:avLst/>
+          </a:prstGeom>
+          <a:ln>
+            <a:tailEnd type="triangle"/>
+          </a:ln>
+        </p:spPr>
+        <p:style>
+          <a:lnRef idx="1">
+            <a:schemeClr val="accent2"/>
+          </a:lnRef>
+          <a:fillRef idx="0">
+            <a:schemeClr val="accent2"/>
+          </a:fillRef>
+          <a:effectRef idx="0">
+            <a:schemeClr val="accent2"/>
+          </a:effectRef>
+          <a:fontRef idx="minor">
+            <a:schemeClr val="tx1"/>
+          </a:fontRef>
+        </p:style>
+      </p:cxnSp>
+      <p:sp>
+        <p:nvSpPr>
+          <p:cNvPr id="20" name="직사각형 19">
+            <a:extLst>
+              <a:ext uri="{FF2B5EF4-FFF2-40B4-BE49-F238E27FC236}">
+                <a16:creationId xmlns:a16="http://schemas.microsoft.com/office/drawing/2014/main" id="{0214A0E9-EC51-9DC8-1FCC-B01E579FFDA6}"/>
+              </a:ext>
+            </a:extLst>
+          </p:cNvPr>
+          <p:cNvSpPr/>
+          <p:nvPr/>
+        </p:nvSpPr>
+        <p:spPr>
+          <a:xfrm>
+            <a:off x="3821552" y="4452330"/>
+            <a:ext cx="2262895" cy="803708"/>
+          </a:xfrm>
+          <a:prstGeom prst="rect">
+            <a:avLst/>
+          </a:prstGeom>
+        </p:spPr>
+        <p:style>
+          <a:lnRef idx="2">
+            <a:schemeClr val="accent1">
+              <a:shade val="50000"/>
+            </a:schemeClr>
+          </a:lnRef>
+          <a:fillRef idx="1">
+            <a:schemeClr val="accent1"/>
+          </a:fillRef>
+          <a:effectRef idx="0">
+            <a:schemeClr val="accent1"/>
+          </a:effectRef>
+          <a:fontRef idx="minor">
+            <a:schemeClr val="lt1"/>
+          </a:fontRef>
+        </p:style>
+        <p:txBody>
+          <a:bodyPr rtlCol="0" anchor="ctr"/>
+          <a:lstStyle/>
+          <a:p>
+            <a:r>
+              <a:rPr lang="en-US" altLang="ko-KR" dirty="0"/>
+              <a:t> Win</a:t>
+            </a:r>
+          </a:p>
+          <a:p>
+            <a:r>
+              <a:rPr lang="en-US" altLang="ko-KR"/>
+              <a:t>   Total Win</a:t>
+            </a:r>
+            <a:endParaRPr lang="ko-KR" altLang="en-US" dirty="0"/>
+          </a:p>
+        </p:txBody>
+      </p:sp>
+      <p:sp>
+        <p:nvSpPr>
+          <p:cNvPr id="21" name="타원 20">
+            <a:extLst>
+              <a:ext uri="{FF2B5EF4-FFF2-40B4-BE49-F238E27FC236}">
+                <a16:creationId xmlns:a16="http://schemas.microsoft.com/office/drawing/2014/main" id="{ED41398F-0776-D0EA-9D9E-7770C2CD8784}"/>
+              </a:ext>
+            </a:extLst>
+          </p:cNvPr>
+          <p:cNvSpPr/>
+          <p:nvPr/>
+        </p:nvSpPr>
+        <p:spPr>
+          <a:xfrm>
+            <a:off x="7853476" y="2687379"/>
+            <a:ext cx="606198" cy="556054"/>
+          </a:xfrm>
+          <a:prstGeom prst="ellipse">
+            <a:avLst/>
+          </a:prstGeom>
+        </p:spPr>
+        <p:style>
+          <a:lnRef idx="2">
+            <a:schemeClr val="accent6">
+              <a:shade val="50000"/>
+            </a:schemeClr>
+          </a:lnRef>
+          <a:fillRef idx="1">
+            <a:schemeClr val="accent6"/>
+          </a:fillRef>
+          <a:effectRef idx="0">
+            <a:schemeClr val="accent6"/>
+          </a:effectRef>
+          <a:fontRef idx="minor">
+            <a:schemeClr val="lt1"/>
+          </a:fontRef>
+        </p:style>
+        <p:txBody>
+          <a:bodyPr rtlCol="0" anchor="ctr"/>
+          <a:lstStyle/>
+          <a:p>
+            <a:pPr algn="ctr"/>
+            <a:r>
+              <a:rPr lang="en-US" altLang="ko-KR" sz="900" dirty="0"/>
+              <a:t>50</a:t>
+            </a:r>
+          </a:p>
+          <a:p>
+            <a:pPr algn="ctr"/>
+            <a:r>
+              <a:rPr lang="en-US" altLang="ko-KR" sz="900" dirty="0"/>
+              <a:t>Lines</a:t>
+            </a:r>
+            <a:endParaRPr lang="ko-KR" altLang="en-US" sz="900" dirty="0"/>
+          </a:p>
+        </p:txBody>
+      </p:sp>
+      <p:sp>
+        <p:nvSpPr>
+          <p:cNvPr id="22" name="직사각형 21">
+            <a:extLst>
+              <a:ext uri="{FF2B5EF4-FFF2-40B4-BE49-F238E27FC236}">
+                <a16:creationId xmlns:a16="http://schemas.microsoft.com/office/drawing/2014/main" id="{A740D4CE-1CE9-9FFC-EF1D-BD6C7F9395ED}"/>
+              </a:ext>
+            </a:extLst>
+          </p:cNvPr>
+          <p:cNvSpPr/>
+          <p:nvPr/>
+        </p:nvSpPr>
+        <p:spPr>
+          <a:xfrm>
+            <a:off x="774780" y="932097"/>
+            <a:ext cx="7940531" cy="461665"/>
+          </a:xfrm>
+          <a:prstGeom prst="rect">
             <a:avLst/>
           </a:prstGeom>
         </p:spPr>
@@ -7258,6 +7034,364 @@
           <a:lstStyle/>
           <a:p>
             <a:pPr algn="ctr"/>
+            <a:endParaRPr lang="ko-KR" altLang="en-US"/>
+          </a:p>
+        </p:txBody>
+      </p:sp>
+      <p:sp>
+        <p:nvSpPr>
+          <p:cNvPr id="23" name="직사각형 22">
+            <a:extLst>
+              <a:ext uri="{FF2B5EF4-FFF2-40B4-BE49-F238E27FC236}">
+                <a16:creationId xmlns:a16="http://schemas.microsoft.com/office/drawing/2014/main" id="{6DA6F8EF-9107-331E-2651-7DD4D8A58B4E}"/>
+              </a:ext>
+            </a:extLst>
+          </p:cNvPr>
+          <p:cNvSpPr/>
+          <p:nvPr/>
+        </p:nvSpPr>
+        <p:spPr>
+          <a:xfrm>
+            <a:off x="3938554" y="925499"/>
+            <a:ext cx="1612982" cy="478096"/>
+          </a:xfrm>
+          <a:prstGeom prst="rect">
+            <a:avLst/>
+          </a:prstGeom>
+        </p:spPr>
+        <p:style>
+          <a:lnRef idx="2">
+            <a:schemeClr val="accent4">
+              <a:shade val="50000"/>
+            </a:schemeClr>
+          </a:lnRef>
+          <a:fillRef idx="1">
+            <a:schemeClr val="accent4"/>
+          </a:fillRef>
+          <a:effectRef idx="0">
+            <a:schemeClr val="accent4"/>
+          </a:effectRef>
+          <a:fontRef idx="minor">
+            <a:schemeClr val="lt1"/>
+          </a:fontRef>
+        </p:style>
+        <p:txBody>
+          <a:bodyPr rtlCol="0" anchor="ctr"/>
+          <a:lstStyle/>
+          <a:p>
+            <a:pPr algn="ctr"/>
+            <a:r>
+              <a:rPr lang="en-US" altLang="ko-KR" dirty="0"/>
+              <a:t>Casino Logo</a:t>
+            </a:r>
+            <a:endParaRPr lang="ko-KR" altLang="en-US" dirty="0"/>
+          </a:p>
+        </p:txBody>
+      </p:sp>
+      <p:sp>
+        <p:nvSpPr>
+          <p:cNvPr id="24" name="타원 23">
+            <a:extLst>
+              <a:ext uri="{FF2B5EF4-FFF2-40B4-BE49-F238E27FC236}">
+                <a16:creationId xmlns:a16="http://schemas.microsoft.com/office/drawing/2014/main" id="{7A1E4098-CD2A-2B55-0937-62E62314FFA9}"/>
+              </a:ext>
+            </a:extLst>
+          </p:cNvPr>
+          <p:cNvSpPr/>
+          <p:nvPr/>
+        </p:nvSpPr>
+        <p:spPr>
+          <a:xfrm>
+            <a:off x="8032956" y="935766"/>
+            <a:ext cx="702024" cy="547922"/>
+          </a:xfrm>
+          <a:prstGeom prst="ellipse">
+            <a:avLst/>
+          </a:prstGeom>
+        </p:spPr>
+        <p:style>
+          <a:lnRef idx="2">
+            <a:schemeClr val="accent4">
+              <a:shade val="50000"/>
+            </a:schemeClr>
+          </a:lnRef>
+          <a:fillRef idx="1">
+            <a:schemeClr val="accent4"/>
+          </a:fillRef>
+          <a:effectRef idx="0">
+            <a:schemeClr val="accent4"/>
+          </a:effectRef>
+          <a:fontRef idx="minor">
+            <a:schemeClr val="lt1"/>
+          </a:fontRef>
+        </p:style>
+        <p:txBody>
+          <a:bodyPr rtlCol="0" anchor="ctr"/>
+          <a:lstStyle/>
+          <a:p>
+            <a:pPr algn="ctr"/>
+            <a:r>
+              <a:rPr lang="en-US" altLang="ko-KR" sz="900" dirty="0"/>
+              <a:t>Menu</a:t>
+            </a:r>
+          </a:p>
+        </p:txBody>
+      </p:sp>
+      <p:sp>
+        <p:nvSpPr>
+          <p:cNvPr id="25" name="직사각형 24">
+            <a:extLst>
+              <a:ext uri="{FF2B5EF4-FFF2-40B4-BE49-F238E27FC236}">
+                <a16:creationId xmlns:a16="http://schemas.microsoft.com/office/drawing/2014/main" id="{9C588235-B3DB-FBE7-601A-16258454C23D}"/>
+              </a:ext>
+            </a:extLst>
+          </p:cNvPr>
+          <p:cNvSpPr/>
+          <p:nvPr/>
+        </p:nvSpPr>
+        <p:spPr>
+          <a:xfrm>
+            <a:off x="1616740" y="925981"/>
+            <a:ext cx="1978250" cy="476097"/>
+          </a:xfrm>
+          <a:prstGeom prst="rect">
+            <a:avLst/>
+          </a:prstGeom>
+        </p:spPr>
+        <p:style>
+          <a:lnRef idx="2">
+            <a:schemeClr val="accent4">
+              <a:shade val="50000"/>
+            </a:schemeClr>
+          </a:lnRef>
+          <a:fillRef idx="1">
+            <a:schemeClr val="accent4"/>
+          </a:fillRef>
+          <a:effectRef idx="0">
+            <a:schemeClr val="accent4"/>
+          </a:effectRef>
+          <a:fontRef idx="minor">
+            <a:schemeClr val="lt1"/>
+          </a:fontRef>
+        </p:style>
+        <p:txBody>
+          <a:bodyPr rtlCol="0" anchor="ctr"/>
+          <a:lstStyle/>
+          <a:p>
+            <a:pPr algn="ctr"/>
+            <a:r>
+              <a:rPr lang="en-US" altLang="ko-KR" dirty="0"/>
+              <a:t>My Money</a:t>
+            </a:r>
+            <a:endParaRPr lang="ko-KR" altLang="en-US" dirty="0"/>
+          </a:p>
+        </p:txBody>
+      </p:sp>
+      <p:sp>
+        <p:nvSpPr>
+          <p:cNvPr id="26" name="타원 25">
+            <a:extLst>
+              <a:ext uri="{FF2B5EF4-FFF2-40B4-BE49-F238E27FC236}">
+                <a16:creationId xmlns:a16="http://schemas.microsoft.com/office/drawing/2014/main" id="{3CFC3D86-72D3-5D4E-FC5A-67EC8D01B851}"/>
+              </a:ext>
+            </a:extLst>
+          </p:cNvPr>
+          <p:cNvSpPr/>
+          <p:nvPr/>
+        </p:nvSpPr>
+        <p:spPr>
+          <a:xfrm>
+            <a:off x="796413" y="925499"/>
+            <a:ext cx="505699" cy="547922"/>
+          </a:xfrm>
+          <a:prstGeom prst="ellipse">
+            <a:avLst/>
+          </a:prstGeom>
+        </p:spPr>
+        <p:style>
+          <a:lnRef idx="2">
+            <a:schemeClr val="accent4">
+              <a:shade val="50000"/>
+            </a:schemeClr>
+          </a:lnRef>
+          <a:fillRef idx="1">
+            <a:schemeClr val="accent4"/>
+          </a:fillRef>
+          <a:effectRef idx="0">
+            <a:schemeClr val="accent4"/>
+          </a:effectRef>
+          <a:fontRef idx="minor">
+            <a:schemeClr val="lt1"/>
+          </a:fontRef>
+        </p:style>
+        <p:txBody>
+          <a:bodyPr rtlCol="0" anchor="ctr"/>
+          <a:lstStyle/>
+          <a:p>
+            <a:pPr algn="ctr"/>
+            <a:r>
+              <a:rPr lang="en-US" altLang="ko-KR" sz="900" dirty="0"/>
+              <a:t>Home</a:t>
+            </a:r>
+          </a:p>
+        </p:txBody>
+      </p:sp>
+    </p:spTree>
+    <p:extLst>
+      <p:ext uri="{BB962C8B-B14F-4D97-AF65-F5344CB8AC3E}">
+        <p14:creationId xmlns:p14="http://schemas.microsoft.com/office/powerpoint/2010/main" val="4032292214"/>
+      </p:ext>
+    </p:extLst>
+  </p:cSld>
+  <p:clrMapOvr>
+    <a:masterClrMapping/>
+  </p:clrMapOvr>
+</p:sld>
+</file>
+
+<file path=ppt/slides/slide6.xml><?xml version="1.0" encoding="utf-8"?>
+<p:sld xmlns:a="http://schemas.openxmlformats.org/drawingml/2006/main" xmlns:r="http://schemas.openxmlformats.org/officeDocument/2006/relationships" xmlns:p="http://schemas.openxmlformats.org/presentationml/2006/main">
+  <p:cSld>
+    <p:spTree>
+      <p:nvGrpSpPr>
+        <p:cNvPr id="1" name=""/>
+        <p:cNvGrpSpPr/>
+        <p:nvPr/>
+      </p:nvGrpSpPr>
+      <p:grpSpPr>
+        <a:xfrm>
+          <a:off x="0" y="0"/>
+          <a:ext cx="0" cy="0"/>
+          <a:chOff x="0" y="0"/>
+          <a:chExt cx="0" cy="0"/>
+        </a:xfrm>
+      </p:grpSpPr>
+      <p:sp>
+        <p:nvSpPr>
+          <p:cNvPr id="4" name="TextBox 3">
+            <a:extLst>
+              <a:ext uri="{FF2B5EF4-FFF2-40B4-BE49-F238E27FC236}">
+                <a16:creationId xmlns:a16="http://schemas.microsoft.com/office/drawing/2014/main" id="{2918DE10-3477-03EB-94D2-1708911DBF39}"/>
+              </a:ext>
+            </a:extLst>
+          </p:cNvPr>
+          <p:cNvSpPr txBox="1"/>
+          <p:nvPr/>
+        </p:nvSpPr>
+        <p:spPr>
+          <a:xfrm>
+            <a:off x="135685" y="147483"/>
+            <a:ext cx="9389412" cy="461665"/>
+          </a:xfrm>
+          <a:prstGeom prst="rect">
+            <a:avLst/>
+          </a:prstGeom>
+          <a:noFill/>
+        </p:spPr>
+        <p:txBody>
+          <a:bodyPr wrap="square" rtlCol="0">
+            <a:spAutoFit/>
+          </a:bodyPr>
+          <a:lstStyle/>
+          <a:p>
+            <a:r>
+              <a:rPr lang="en-US" altLang="ko-KR" sz="1200" dirty="0"/>
+              <a:t>[ Rock Climber Slot Bonus UI ]</a:t>
+            </a:r>
+          </a:p>
+          <a:p>
+            <a:endParaRPr lang="en-US" altLang="ko-KR" sz="1200" dirty="0"/>
+          </a:p>
+        </p:txBody>
+      </p:sp>
+      <p:sp>
+        <p:nvSpPr>
+          <p:cNvPr id="2" name="직사각형 1">
+            <a:extLst>
+              <a:ext uri="{FF2B5EF4-FFF2-40B4-BE49-F238E27FC236}">
+                <a16:creationId xmlns:a16="http://schemas.microsoft.com/office/drawing/2014/main" id="{38D97D2C-275D-1C4D-58F2-E66F4CCF6390}"/>
+              </a:ext>
+            </a:extLst>
+          </p:cNvPr>
+          <p:cNvSpPr/>
+          <p:nvPr/>
+        </p:nvSpPr>
+        <p:spPr>
+          <a:xfrm>
+            <a:off x="784614" y="932098"/>
+            <a:ext cx="7940532" cy="4377321"/>
+          </a:xfrm>
+          <a:prstGeom prst="rect">
+            <a:avLst/>
+          </a:prstGeom>
+        </p:spPr>
+        <p:style>
+          <a:lnRef idx="2">
+            <a:schemeClr val="accent3">
+              <a:shade val="50000"/>
+            </a:schemeClr>
+          </a:lnRef>
+          <a:fillRef idx="1">
+            <a:schemeClr val="accent3"/>
+          </a:fillRef>
+          <a:effectRef idx="0">
+            <a:schemeClr val="accent3"/>
+          </a:effectRef>
+          <a:fontRef idx="minor">
+            <a:schemeClr val="lt1"/>
+          </a:fontRef>
+        </p:style>
+        <p:txBody>
+          <a:bodyPr rtlCol="0" anchor="ctr"/>
+          <a:lstStyle/>
+          <a:p>
+            <a:pPr algn="ctr"/>
+            <a:endParaRPr lang="ko-KR" altLang="en-US"/>
+          </a:p>
+        </p:txBody>
+      </p:sp>
+      <p:sp>
+        <p:nvSpPr>
+          <p:cNvPr id="3" name="타원 2">
+            <a:extLst>
+              <a:ext uri="{FF2B5EF4-FFF2-40B4-BE49-F238E27FC236}">
+                <a16:creationId xmlns:a16="http://schemas.microsoft.com/office/drawing/2014/main" id="{69CBE109-A39E-B0FB-A345-71142350EE85}"/>
+              </a:ext>
+            </a:extLst>
+          </p:cNvPr>
+          <p:cNvSpPr/>
+          <p:nvPr/>
+        </p:nvSpPr>
+        <p:spPr>
+          <a:xfrm>
+            <a:off x="7610168" y="4279982"/>
+            <a:ext cx="1011739" cy="1011739"/>
+          </a:xfrm>
+          <a:prstGeom prst="ellipse">
+            <a:avLst/>
+          </a:prstGeom>
+        </p:spPr>
+        <p:style>
+          <a:lnRef idx="2">
+            <a:schemeClr val="accent5">
+              <a:shade val="50000"/>
+            </a:schemeClr>
+          </a:lnRef>
+          <a:fillRef idx="1">
+            <a:schemeClr val="accent5"/>
+          </a:fillRef>
+          <a:effectRef idx="0">
+            <a:schemeClr val="accent5"/>
+          </a:effectRef>
+          <a:fontRef idx="minor">
+            <a:schemeClr val="lt1"/>
+          </a:fontRef>
+        </p:style>
+        <p:txBody>
+          <a:bodyPr rtlCol="0" anchor="ctr"/>
+          <a:lstStyle/>
+          <a:p>
+            <a:pPr algn="ctr"/>
             <a:r>
               <a:rPr lang="en-US" altLang="ko-KR" sz="1600" dirty="0"/>
               <a:t>5 </a:t>
@@ -8797,7 +8931,7 @@
 </p:sld>
 </file>
 
-<file path=ppt/slides/slide6.xml><?xml version="1.0" encoding="utf-8"?>
+<file path=ppt/slides/slide7.xml><?xml version="1.0" encoding="utf-8"?>
 <p:sld xmlns:a="http://schemas.openxmlformats.org/drawingml/2006/main" xmlns:r="http://schemas.openxmlformats.org/officeDocument/2006/relationships" xmlns:p="http://schemas.openxmlformats.org/presentationml/2006/main">
   <p:cSld>
     <p:spTree>

</xml_diff>

<commit_message>
Uploaded 221107 / Start reels spin
</commit_message>
<xml_diff>
--- a/00_Documents/Proposal_RockCLimber.pptx
+++ b/00_Documents/Proposal_RockCLimber.pptx
@@ -249,7 +249,7 @@
           <a:p>
             <a:fld id="{78E082FD-8515-42F4-9814-5D20EC5E8E6B}" type="datetimeFigureOut">
               <a:rPr lang="ko-KR" altLang="en-US" smtClean="0"/>
-              <a:t>2022-11-01</a:t>
+              <a:t>2022-11-07</a:t>
             </a:fld>
             <a:endParaRPr lang="ko-KR" altLang="en-US"/>
           </a:p>
@@ -419,7 +419,7 @@
           <a:p>
             <a:fld id="{78E082FD-8515-42F4-9814-5D20EC5E8E6B}" type="datetimeFigureOut">
               <a:rPr lang="ko-KR" altLang="en-US" smtClean="0"/>
-              <a:t>2022-11-01</a:t>
+              <a:t>2022-11-07</a:t>
             </a:fld>
             <a:endParaRPr lang="ko-KR" altLang="en-US"/>
           </a:p>
@@ -599,7 +599,7 @@
           <a:p>
             <a:fld id="{78E082FD-8515-42F4-9814-5D20EC5E8E6B}" type="datetimeFigureOut">
               <a:rPr lang="ko-KR" altLang="en-US" smtClean="0"/>
-              <a:t>2022-11-01</a:t>
+              <a:t>2022-11-07</a:t>
             </a:fld>
             <a:endParaRPr lang="ko-KR" altLang="en-US"/>
           </a:p>
@@ -769,7 +769,7 @@
           <a:p>
             <a:fld id="{78E082FD-8515-42F4-9814-5D20EC5E8E6B}" type="datetimeFigureOut">
               <a:rPr lang="ko-KR" altLang="en-US" smtClean="0"/>
-              <a:t>2022-11-01</a:t>
+              <a:t>2022-11-07</a:t>
             </a:fld>
             <a:endParaRPr lang="ko-KR" altLang="en-US"/>
           </a:p>
@@ -1013,7 +1013,7 @@
           <a:p>
             <a:fld id="{78E082FD-8515-42F4-9814-5D20EC5E8E6B}" type="datetimeFigureOut">
               <a:rPr lang="ko-KR" altLang="en-US" smtClean="0"/>
-              <a:t>2022-11-01</a:t>
+              <a:t>2022-11-07</a:t>
             </a:fld>
             <a:endParaRPr lang="ko-KR" altLang="en-US"/>
           </a:p>
@@ -1245,7 +1245,7 @@
           <a:p>
             <a:fld id="{78E082FD-8515-42F4-9814-5D20EC5E8E6B}" type="datetimeFigureOut">
               <a:rPr lang="ko-KR" altLang="en-US" smtClean="0"/>
-              <a:t>2022-11-01</a:t>
+              <a:t>2022-11-07</a:t>
             </a:fld>
             <a:endParaRPr lang="ko-KR" altLang="en-US"/>
           </a:p>
@@ -1612,7 +1612,7 @@
           <a:p>
             <a:fld id="{78E082FD-8515-42F4-9814-5D20EC5E8E6B}" type="datetimeFigureOut">
               <a:rPr lang="ko-KR" altLang="en-US" smtClean="0"/>
-              <a:t>2022-11-01</a:t>
+              <a:t>2022-11-07</a:t>
             </a:fld>
             <a:endParaRPr lang="ko-KR" altLang="en-US"/>
           </a:p>
@@ -1730,7 +1730,7 @@
           <a:p>
             <a:fld id="{78E082FD-8515-42F4-9814-5D20EC5E8E6B}" type="datetimeFigureOut">
               <a:rPr lang="ko-KR" altLang="en-US" smtClean="0"/>
-              <a:t>2022-11-01</a:t>
+              <a:t>2022-11-07</a:t>
             </a:fld>
             <a:endParaRPr lang="ko-KR" altLang="en-US"/>
           </a:p>
@@ -1825,7 +1825,7 @@
           <a:p>
             <a:fld id="{78E082FD-8515-42F4-9814-5D20EC5E8E6B}" type="datetimeFigureOut">
               <a:rPr lang="ko-KR" altLang="en-US" smtClean="0"/>
-              <a:t>2022-11-01</a:t>
+              <a:t>2022-11-07</a:t>
             </a:fld>
             <a:endParaRPr lang="ko-KR" altLang="en-US"/>
           </a:p>
@@ -2102,7 +2102,7 @@
           <a:p>
             <a:fld id="{78E082FD-8515-42F4-9814-5D20EC5E8E6B}" type="datetimeFigureOut">
               <a:rPr lang="ko-KR" altLang="en-US" smtClean="0"/>
-              <a:t>2022-11-01</a:t>
+              <a:t>2022-11-07</a:t>
             </a:fld>
             <a:endParaRPr lang="ko-KR" altLang="en-US"/>
           </a:p>
@@ -2359,7 +2359,7 @@
           <a:p>
             <a:fld id="{78E082FD-8515-42F4-9814-5D20EC5E8E6B}" type="datetimeFigureOut">
               <a:rPr lang="ko-KR" altLang="en-US" smtClean="0"/>
-              <a:t>2022-11-01</a:t>
+              <a:t>2022-11-07</a:t>
             </a:fld>
             <a:endParaRPr lang="ko-KR" altLang="en-US"/>
           </a:p>
@@ -2572,7 +2572,7 @@
           <a:p>
             <a:fld id="{78E082FD-8515-42F4-9814-5D20EC5E8E6B}" type="datetimeFigureOut">
               <a:rPr lang="ko-KR" altLang="en-US" smtClean="0"/>
-              <a:t>2022-11-01</a:t>
+              <a:t>2022-11-07</a:t>
             </a:fld>
             <a:endParaRPr lang="ko-KR" altLang="en-US"/>
           </a:p>
@@ -3738,8 +3738,21 @@
             </a:pPr>
             <a:r>
               <a:rPr lang="en-US" altLang="ko-KR" sz="1000" dirty="0"/>
-              <a:t>Pressing spin button for 2 secs triggers auto spin. Set auto spin count 25, 50 or 100 and click stop button to quit auto spin, or it will be stop after auto spin count.</a:t>
-            </a:r>
+              <a:t>Pressing spin button for 2 secs triggers auto spin. It</a:t>
+            </a:r>
+            <a:r>
+              <a:rPr lang="ko-KR" altLang="en-US" sz="1000" dirty="0"/>
+              <a:t> </a:t>
+            </a:r>
+            <a:r>
+              <a:rPr lang="en-US" altLang="ko-KR" sz="1000" dirty="0"/>
+              <a:t>will be stop </a:t>
+            </a:r>
+            <a:r>
+              <a:rPr lang="en-US" altLang="ko-KR" sz="1000"/>
+              <a:t>with pressing stop button.</a:t>
+            </a:r>
+            <a:endParaRPr lang="en-US" altLang="ko-KR" sz="1000" dirty="0"/>
           </a:p>
           <a:p>
             <a:pPr marL="228600" indent="-228600">

</xml_diff>

<commit_message>
Uploaded 221109 / Main game is completed
</commit_message>
<xml_diff>
--- a/00_Documents/Proposal_RockCLimber.pptx
+++ b/00_Documents/Proposal_RockCLimber.pptx
@@ -12,6 +12,7 @@
     <p:sldId id="258" r:id="rId6"/>
     <p:sldId id="260" r:id="rId7"/>
     <p:sldId id="259" r:id="rId8"/>
+    <p:sldId id="263" r:id="rId9"/>
   </p:sldIdLst>
   <p:sldSz cx="9906000" cy="6858000" type="A4"/>
   <p:notesSz cx="6858000" cy="9144000"/>
@@ -249,7 +250,7 @@
           <a:p>
             <a:fld id="{78E082FD-8515-42F4-9814-5D20EC5E8E6B}" type="datetimeFigureOut">
               <a:rPr lang="ko-KR" altLang="en-US" smtClean="0"/>
-              <a:t>2022-11-07</a:t>
+              <a:t>2022-11-09</a:t>
             </a:fld>
             <a:endParaRPr lang="ko-KR" altLang="en-US"/>
           </a:p>
@@ -419,7 +420,7 @@
           <a:p>
             <a:fld id="{78E082FD-8515-42F4-9814-5D20EC5E8E6B}" type="datetimeFigureOut">
               <a:rPr lang="ko-KR" altLang="en-US" smtClean="0"/>
-              <a:t>2022-11-07</a:t>
+              <a:t>2022-11-09</a:t>
             </a:fld>
             <a:endParaRPr lang="ko-KR" altLang="en-US"/>
           </a:p>
@@ -599,7 +600,7 @@
           <a:p>
             <a:fld id="{78E082FD-8515-42F4-9814-5D20EC5E8E6B}" type="datetimeFigureOut">
               <a:rPr lang="ko-KR" altLang="en-US" smtClean="0"/>
-              <a:t>2022-11-07</a:t>
+              <a:t>2022-11-09</a:t>
             </a:fld>
             <a:endParaRPr lang="ko-KR" altLang="en-US"/>
           </a:p>
@@ -769,7 +770,7 @@
           <a:p>
             <a:fld id="{78E082FD-8515-42F4-9814-5D20EC5E8E6B}" type="datetimeFigureOut">
               <a:rPr lang="ko-KR" altLang="en-US" smtClean="0"/>
-              <a:t>2022-11-07</a:t>
+              <a:t>2022-11-09</a:t>
             </a:fld>
             <a:endParaRPr lang="ko-KR" altLang="en-US"/>
           </a:p>
@@ -1013,7 +1014,7 @@
           <a:p>
             <a:fld id="{78E082FD-8515-42F4-9814-5D20EC5E8E6B}" type="datetimeFigureOut">
               <a:rPr lang="ko-KR" altLang="en-US" smtClean="0"/>
-              <a:t>2022-11-07</a:t>
+              <a:t>2022-11-09</a:t>
             </a:fld>
             <a:endParaRPr lang="ko-KR" altLang="en-US"/>
           </a:p>
@@ -1245,7 +1246,7 @@
           <a:p>
             <a:fld id="{78E082FD-8515-42F4-9814-5D20EC5E8E6B}" type="datetimeFigureOut">
               <a:rPr lang="ko-KR" altLang="en-US" smtClean="0"/>
-              <a:t>2022-11-07</a:t>
+              <a:t>2022-11-09</a:t>
             </a:fld>
             <a:endParaRPr lang="ko-KR" altLang="en-US"/>
           </a:p>
@@ -1612,7 +1613,7 @@
           <a:p>
             <a:fld id="{78E082FD-8515-42F4-9814-5D20EC5E8E6B}" type="datetimeFigureOut">
               <a:rPr lang="ko-KR" altLang="en-US" smtClean="0"/>
-              <a:t>2022-11-07</a:t>
+              <a:t>2022-11-09</a:t>
             </a:fld>
             <a:endParaRPr lang="ko-KR" altLang="en-US"/>
           </a:p>
@@ -1730,7 +1731,7 @@
           <a:p>
             <a:fld id="{78E082FD-8515-42F4-9814-5D20EC5E8E6B}" type="datetimeFigureOut">
               <a:rPr lang="ko-KR" altLang="en-US" smtClean="0"/>
-              <a:t>2022-11-07</a:t>
+              <a:t>2022-11-09</a:t>
             </a:fld>
             <a:endParaRPr lang="ko-KR" altLang="en-US"/>
           </a:p>
@@ -1825,7 +1826,7 @@
           <a:p>
             <a:fld id="{78E082FD-8515-42F4-9814-5D20EC5E8E6B}" type="datetimeFigureOut">
               <a:rPr lang="ko-KR" altLang="en-US" smtClean="0"/>
-              <a:t>2022-11-07</a:t>
+              <a:t>2022-11-09</a:t>
             </a:fld>
             <a:endParaRPr lang="ko-KR" altLang="en-US"/>
           </a:p>
@@ -2102,7 +2103,7 @@
           <a:p>
             <a:fld id="{78E082FD-8515-42F4-9814-5D20EC5E8E6B}" type="datetimeFigureOut">
               <a:rPr lang="ko-KR" altLang="en-US" smtClean="0"/>
-              <a:t>2022-11-07</a:t>
+              <a:t>2022-11-09</a:t>
             </a:fld>
             <a:endParaRPr lang="ko-KR" altLang="en-US"/>
           </a:p>
@@ -2359,7 +2360,7 @@
           <a:p>
             <a:fld id="{78E082FD-8515-42F4-9814-5D20EC5E8E6B}" type="datetimeFigureOut">
               <a:rPr lang="ko-KR" altLang="en-US" smtClean="0"/>
-              <a:t>2022-11-07</a:t>
+              <a:t>2022-11-09</a:t>
             </a:fld>
             <a:endParaRPr lang="ko-KR" altLang="en-US"/>
           </a:p>
@@ -2572,7 +2573,7 @@
           <a:p>
             <a:fld id="{78E082FD-8515-42F4-9814-5D20EC5E8E6B}" type="datetimeFigureOut">
               <a:rPr lang="ko-KR" altLang="en-US" smtClean="0"/>
-              <a:t>2022-11-07</a:t>
+              <a:t>2022-11-09</a:t>
             </a:fld>
             <a:endParaRPr lang="ko-KR" altLang="en-US"/>
           </a:p>
@@ -4064,7 +4065,7 @@
           <p:nvPr>
             <p:extLst>
               <p:ext uri="{D42A27DB-BD31-4B8C-83A1-F6EECF244321}">
-                <p14:modId xmlns:p14="http://schemas.microsoft.com/office/powerpoint/2010/main" val="1829358396"/>
+                <p14:modId xmlns:p14="http://schemas.microsoft.com/office/powerpoint/2010/main" val="308112531"/>
               </p:ext>
             </p:extLst>
           </p:nvPr>
@@ -4227,7 +4228,33 @@
                       <a:pPr algn="ctr" latinLnBrk="1"/>
                       <a:r>
                         <a:rPr lang="en-US" altLang="ko-KR" sz="1000" dirty="0"/>
-                        <a:t>1500</a:t>
+                        <a:t>75</a:t>
+                      </a:r>
+                      <a:endParaRPr lang="ko-KR" altLang="en-US" sz="1000" dirty="0"/>
+                    </a:p>
+                  </a:txBody>
+                  <a:tcPr marL="0" marR="0" marT="0" marB="0" anchor="ctr"/>
+                </a:tc>
+                <a:tc rowSpan="3">
+                  <a:txBody>
+                    <a:bodyPr/>
+                    <a:lstStyle/>
+                    <a:p>
+                      <a:pPr algn="ctr" latinLnBrk="1"/>
+                      <a:endParaRPr lang="ko-KR" altLang="en-US" sz="1000" dirty="0"/>
+                    </a:p>
+                  </a:txBody>
+                  <a:tcPr marL="0" marR="0" marT="0" marB="0" anchor="ctr"/>
+                </a:tc>
+                <a:tc>
+                  <a:txBody>
+                    <a:bodyPr/>
+                    <a:lstStyle/>
+                    <a:p>
+                      <a:pPr algn="ctr" latinLnBrk="1"/>
+                      <a:r>
+                        <a:rPr lang="en-US" altLang="ko-KR" sz="1000"/>
+                        <a:t>60</a:t>
                       </a:r>
                       <a:endParaRPr lang="ko-KR" altLang="en-US" sz="1000" dirty="0"/>
                     </a:p>
@@ -4253,7 +4280,7 @@
                       <a:pPr algn="ctr" latinLnBrk="1"/>
                       <a:r>
                         <a:rPr lang="en-US" altLang="ko-KR" sz="1000" dirty="0"/>
-                        <a:t>1500</a:t>
+                        <a:t>60</a:t>
                       </a:r>
                       <a:endParaRPr lang="ko-KR" altLang="en-US" sz="1000" dirty="0"/>
                     </a:p>
@@ -4279,7 +4306,7 @@
                       <a:pPr algn="ctr" latinLnBrk="1"/>
                       <a:r>
                         <a:rPr lang="en-US" altLang="ko-KR" sz="1000" dirty="0"/>
-                        <a:t>700</a:t>
+                        <a:t>40</a:t>
                       </a:r>
                       <a:endParaRPr lang="ko-KR" altLang="en-US" sz="1000" dirty="0"/>
                     </a:p>
@@ -4305,7 +4332,7 @@
                       <a:pPr algn="ctr" latinLnBrk="1"/>
                       <a:r>
                         <a:rPr lang="en-US" altLang="ko-KR" sz="1000" dirty="0"/>
-                        <a:t>300</a:t>
+                        <a:t>15</a:t>
                       </a:r>
                       <a:endParaRPr lang="ko-KR" altLang="en-US" sz="1000" dirty="0"/>
                     </a:p>
@@ -4331,7 +4358,7 @@
                       <a:pPr algn="ctr" latinLnBrk="1"/>
                       <a:r>
                         <a:rPr lang="en-US" altLang="ko-KR" sz="1000" dirty="0"/>
-                        <a:t>200</a:t>
+                        <a:t>10</a:t>
                       </a:r>
                       <a:endParaRPr lang="ko-KR" altLang="en-US" sz="1000" dirty="0"/>
                     </a:p>
@@ -4357,7 +4384,7 @@
                       <a:pPr algn="ctr" latinLnBrk="1"/>
                       <a:r>
                         <a:rPr lang="en-US" altLang="ko-KR" sz="1000" dirty="0"/>
-                        <a:t>100</a:t>
+                        <a:t>10</a:t>
                       </a:r>
                       <a:endParaRPr lang="ko-KR" altLang="en-US" sz="1000" dirty="0"/>
                     </a:p>
@@ -4383,7 +4410,7 @@
                       <a:pPr algn="ctr" latinLnBrk="1"/>
                       <a:r>
                         <a:rPr lang="en-US" altLang="ko-KR" sz="1000" dirty="0"/>
-                        <a:t>100</a:t>
+                        <a:t>7</a:t>
                       </a:r>
                       <a:endParaRPr lang="ko-KR" altLang="en-US" sz="1000" dirty="0"/>
                     </a:p>
@@ -4409,33 +4436,7 @@
                       <a:pPr algn="ctr" latinLnBrk="1"/>
                       <a:r>
                         <a:rPr lang="en-US" altLang="ko-KR" sz="1000" dirty="0"/>
-                        <a:t>50</a:t>
-                      </a:r>
-                      <a:endParaRPr lang="ko-KR" altLang="en-US" sz="1000" dirty="0"/>
-                    </a:p>
-                  </a:txBody>
-                  <a:tcPr marL="0" marR="0" marT="0" marB="0" anchor="ctr"/>
-                </a:tc>
-                <a:tc rowSpan="3">
-                  <a:txBody>
-                    <a:bodyPr/>
-                    <a:lstStyle/>
-                    <a:p>
-                      <a:pPr algn="ctr" latinLnBrk="1"/>
-                      <a:endParaRPr lang="ko-KR" altLang="en-US" sz="1000" dirty="0"/>
-                    </a:p>
-                  </a:txBody>
-                  <a:tcPr marL="0" marR="0" marT="0" marB="0" anchor="ctr"/>
-                </a:tc>
-                <a:tc>
-                  <a:txBody>
-                    <a:bodyPr/>
-                    <a:lstStyle/>
-                    <a:p>
-                      <a:pPr algn="ctr" latinLnBrk="1"/>
-                      <a:r>
-                        <a:rPr lang="en-US" altLang="ko-KR" sz="1000" dirty="0"/>
-                        <a:t>50</a:t>
+                        <a:t>7</a:t>
                       </a:r>
                       <a:endParaRPr lang="ko-KR" altLang="en-US" sz="1000" dirty="0"/>
                     </a:p>
@@ -4449,188 +4450,6 @@
                 </a:extLst>
               </a:tr>
               <a:tr h="182680">
-                <a:tc vMerge="1">
-                  <a:txBody>
-                    <a:bodyPr/>
-                    <a:lstStyle/>
-                    <a:p>
-                      <a:pPr algn="l" latinLnBrk="1"/>
-                      <a:endParaRPr lang="ko-KR" altLang="en-US" sz="500" dirty="0"/>
-                    </a:p>
-                  </a:txBody>
-                  <a:tcPr anchor="ctr"/>
-                </a:tc>
-                <a:tc>
-                  <a:txBody>
-                    <a:bodyPr/>
-                    <a:lstStyle/>
-                    <a:p>
-                      <a:pPr algn="ctr" latinLnBrk="1"/>
-                      <a:r>
-                        <a:rPr lang="en-US" altLang="ko-KR" sz="1000" dirty="0"/>
-                        <a:t>500</a:t>
-                      </a:r>
-                      <a:endParaRPr lang="ko-KR" altLang="en-US" sz="1000" dirty="0"/>
-                    </a:p>
-                  </a:txBody>
-                  <a:tcPr marL="0" marR="0" marT="0" marB="0" anchor="ctr"/>
-                </a:tc>
-                <a:tc vMerge="1">
-                  <a:txBody>
-                    <a:bodyPr/>
-                    <a:lstStyle/>
-                    <a:p>
-                      <a:pPr algn="l" latinLnBrk="1"/>
-                      <a:endParaRPr lang="ko-KR" altLang="en-US" sz="500" dirty="0"/>
-                    </a:p>
-                  </a:txBody>
-                  <a:tcPr anchor="ctr"/>
-                </a:tc>
-                <a:tc>
-                  <a:txBody>
-                    <a:bodyPr/>
-                    <a:lstStyle/>
-                    <a:p>
-                      <a:pPr algn="ctr" latinLnBrk="1"/>
-                      <a:r>
-                        <a:rPr lang="en-US" altLang="ko-KR" sz="1000" dirty="0"/>
-                        <a:t>500</a:t>
-                      </a:r>
-                      <a:endParaRPr lang="ko-KR" altLang="en-US" sz="1000" dirty="0"/>
-                    </a:p>
-                  </a:txBody>
-                  <a:tcPr marL="0" marR="0" marT="0" marB="0" anchor="ctr"/>
-                </a:tc>
-                <a:tc vMerge="1">
-                  <a:txBody>
-                    <a:bodyPr/>
-                    <a:lstStyle/>
-                    <a:p>
-                      <a:pPr algn="l" latinLnBrk="1"/>
-                      <a:endParaRPr lang="ko-KR" altLang="en-US" sz="500" dirty="0"/>
-                    </a:p>
-                  </a:txBody>
-                  <a:tcPr anchor="ctr"/>
-                </a:tc>
-                <a:tc>
-                  <a:txBody>
-                    <a:bodyPr/>
-                    <a:lstStyle/>
-                    <a:p>
-                      <a:pPr algn="ctr" latinLnBrk="1"/>
-                      <a:r>
-                        <a:rPr lang="en-US" altLang="ko-KR" sz="1000" dirty="0"/>
-                        <a:t>300</a:t>
-                      </a:r>
-                      <a:endParaRPr lang="ko-KR" altLang="en-US" sz="1000" dirty="0"/>
-                    </a:p>
-                  </a:txBody>
-                  <a:tcPr marL="0" marR="0" marT="0" marB="0" anchor="ctr"/>
-                </a:tc>
-                <a:tc vMerge="1">
-                  <a:txBody>
-                    <a:bodyPr/>
-                    <a:lstStyle/>
-                    <a:p>
-                      <a:pPr algn="l" latinLnBrk="1"/>
-                      <a:endParaRPr lang="ko-KR" altLang="en-US" sz="500" dirty="0"/>
-                    </a:p>
-                  </a:txBody>
-                  <a:tcPr anchor="ctr"/>
-                </a:tc>
-                <a:tc>
-                  <a:txBody>
-                    <a:bodyPr/>
-                    <a:lstStyle/>
-                    <a:p>
-                      <a:pPr algn="ctr" latinLnBrk="1"/>
-                      <a:r>
-                        <a:rPr lang="en-US" altLang="ko-KR" sz="1000" dirty="0"/>
-                        <a:t>150</a:t>
-                      </a:r>
-                      <a:endParaRPr lang="ko-KR" altLang="en-US" sz="1000" dirty="0"/>
-                    </a:p>
-                  </a:txBody>
-                  <a:tcPr marL="0" marR="0" marT="0" marB="0" anchor="ctr"/>
-                </a:tc>
-                <a:tc vMerge="1">
-                  <a:txBody>
-                    <a:bodyPr/>
-                    <a:lstStyle/>
-                    <a:p>
-                      <a:pPr algn="l" latinLnBrk="1"/>
-                      <a:endParaRPr lang="ko-KR" altLang="en-US" sz="500" dirty="0"/>
-                    </a:p>
-                  </a:txBody>
-                  <a:tcPr anchor="ctr"/>
-                </a:tc>
-                <a:tc>
-                  <a:txBody>
-                    <a:bodyPr/>
-                    <a:lstStyle/>
-                    <a:p>
-                      <a:pPr algn="ctr" latinLnBrk="1"/>
-                      <a:r>
-                        <a:rPr lang="en-US" altLang="ko-KR" sz="1000" dirty="0"/>
-                        <a:t>100</a:t>
-                      </a:r>
-                      <a:endParaRPr lang="ko-KR" altLang="en-US" sz="1000" dirty="0"/>
-                    </a:p>
-                  </a:txBody>
-                  <a:tcPr marL="0" marR="0" marT="0" marB="0" anchor="ctr"/>
-                </a:tc>
-                <a:tc vMerge="1">
-                  <a:txBody>
-                    <a:bodyPr/>
-                    <a:lstStyle/>
-                    <a:p>
-                      <a:pPr algn="l" latinLnBrk="1"/>
-                      <a:endParaRPr lang="ko-KR" altLang="en-US" sz="500" dirty="0"/>
-                    </a:p>
-                  </a:txBody>
-                  <a:tcPr anchor="ctr"/>
-                </a:tc>
-                <a:tc>
-                  <a:txBody>
-                    <a:bodyPr/>
-                    <a:lstStyle/>
-                    <a:p>
-                      <a:pPr algn="ctr" latinLnBrk="1"/>
-                      <a:r>
-                        <a:rPr lang="en-US" altLang="ko-KR" sz="1000" dirty="0"/>
-                        <a:t>50</a:t>
-                      </a:r>
-                      <a:endParaRPr lang="ko-KR" altLang="en-US" sz="1000" dirty="0"/>
-                    </a:p>
-                  </a:txBody>
-                  <a:tcPr marL="0" marR="0" marT="0" marB="0" anchor="ctr"/>
-                </a:tc>
-                <a:tc vMerge="1">
-                  <a:txBody>
-                    <a:bodyPr/>
-                    <a:lstStyle/>
-                    <a:p>
-                      <a:pPr algn="l" latinLnBrk="1"/>
-                      <a:endParaRPr lang="ko-KR" altLang="en-US" sz="500" dirty="0"/>
-                    </a:p>
-                  </a:txBody>
-                  <a:tcPr anchor="ctr"/>
-                </a:tc>
-                <a:tc>
-                  <a:txBody>
-                    <a:bodyPr/>
-                    <a:lstStyle/>
-                    <a:p>
-                      <a:pPr algn="ctr" latinLnBrk="1"/>
-                      <a:r>
-                        <a:rPr lang="en-US" altLang="ko-KR" sz="1000" dirty="0"/>
-                        <a:t>50</a:t>
-                      </a:r>
-                      <a:endParaRPr lang="ko-KR" altLang="en-US" sz="1000" dirty="0"/>
-                    </a:p>
-                  </a:txBody>
-                  <a:tcPr marL="0" marR="0" marT="0" marB="0" anchor="ctr"/>
-                </a:tc>
                 <a:tc vMerge="1">
                   <a:txBody>
                     <a:bodyPr/>
@@ -4676,7 +4495,189 @@
                       <a:pPr algn="ctr" latinLnBrk="1"/>
                       <a:r>
                         <a:rPr lang="en-US" altLang="ko-KR" sz="1000" dirty="0"/>
-                        <a:t>25</a:t>
+                        <a:t>20</a:t>
+                      </a:r>
+                      <a:endParaRPr lang="ko-KR" altLang="en-US" sz="1000" dirty="0"/>
+                    </a:p>
+                  </a:txBody>
+                  <a:tcPr marL="0" marR="0" marT="0" marB="0" anchor="ctr"/>
+                </a:tc>
+                <a:tc vMerge="1">
+                  <a:txBody>
+                    <a:bodyPr/>
+                    <a:lstStyle/>
+                    <a:p>
+                      <a:pPr algn="l" latinLnBrk="1"/>
+                      <a:endParaRPr lang="ko-KR" altLang="en-US" sz="500" dirty="0"/>
+                    </a:p>
+                  </a:txBody>
+                  <a:tcPr anchor="ctr"/>
+                </a:tc>
+                <a:tc>
+                  <a:txBody>
+                    <a:bodyPr/>
+                    <a:lstStyle/>
+                    <a:p>
+                      <a:pPr algn="ctr" latinLnBrk="1"/>
+                      <a:r>
+                        <a:rPr lang="en-US" altLang="ko-KR" sz="1000" dirty="0"/>
+                        <a:t>20</a:t>
+                      </a:r>
+                      <a:endParaRPr lang="ko-KR" altLang="en-US" sz="1000" dirty="0"/>
+                    </a:p>
+                  </a:txBody>
+                  <a:tcPr marL="0" marR="0" marT="0" marB="0" anchor="ctr"/>
+                </a:tc>
+                <a:tc vMerge="1">
+                  <a:txBody>
+                    <a:bodyPr/>
+                    <a:lstStyle/>
+                    <a:p>
+                      <a:pPr algn="l" latinLnBrk="1"/>
+                      <a:endParaRPr lang="ko-KR" altLang="en-US" sz="500" dirty="0"/>
+                    </a:p>
+                  </a:txBody>
+                  <a:tcPr anchor="ctr"/>
+                </a:tc>
+                <a:tc>
+                  <a:txBody>
+                    <a:bodyPr/>
+                    <a:lstStyle/>
+                    <a:p>
+                      <a:pPr algn="ctr" latinLnBrk="1"/>
+                      <a:r>
+                        <a:rPr lang="en-US" altLang="ko-KR" sz="1000" dirty="0"/>
+                        <a:t>15</a:t>
+                      </a:r>
+                      <a:endParaRPr lang="ko-KR" altLang="en-US" sz="1000" dirty="0"/>
+                    </a:p>
+                  </a:txBody>
+                  <a:tcPr marL="0" marR="0" marT="0" marB="0" anchor="ctr"/>
+                </a:tc>
+                <a:tc vMerge="1">
+                  <a:txBody>
+                    <a:bodyPr/>
+                    <a:lstStyle/>
+                    <a:p>
+                      <a:pPr algn="l" latinLnBrk="1"/>
+                      <a:endParaRPr lang="ko-KR" altLang="en-US" sz="500" dirty="0"/>
+                    </a:p>
+                  </a:txBody>
+                  <a:tcPr anchor="ctr"/>
+                </a:tc>
+                <a:tc>
+                  <a:txBody>
+                    <a:bodyPr/>
+                    <a:lstStyle/>
+                    <a:p>
+                      <a:pPr algn="ctr" latinLnBrk="1"/>
+                      <a:r>
+                        <a:rPr lang="en-US" altLang="ko-KR" sz="1000" dirty="0"/>
+                        <a:t>8</a:t>
+                      </a:r>
+                      <a:endParaRPr lang="ko-KR" altLang="en-US" sz="1000" dirty="0"/>
+                    </a:p>
+                  </a:txBody>
+                  <a:tcPr marL="0" marR="0" marT="0" marB="0" anchor="ctr"/>
+                </a:tc>
+                <a:tc vMerge="1">
+                  <a:txBody>
+                    <a:bodyPr/>
+                    <a:lstStyle/>
+                    <a:p>
+                      <a:pPr algn="l" latinLnBrk="1"/>
+                      <a:endParaRPr lang="ko-KR" altLang="en-US" sz="500" dirty="0"/>
+                    </a:p>
+                  </a:txBody>
+                  <a:tcPr anchor="ctr"/>
+                </a:tc>
+                <a:tc>
+                  <a:txBody>
+                    <a:bodyPr/>
+                    <a:lstStyle/>
+                    <a:p>
+                      <a:pPr algn="ctr" latinLnBrk="1"/>
+                      <a:r>
+                        <a:rPr lang="en-US" altLang="ko-KR" sz="1000" dirty="0"/>
+                        <a:t>4</a:t>
+                      </a:r>
+                      <a:endParaRPr lang="ko-KR" altLang="en-US" sz="1000" dirty="0"/>
+                    </a:p>
+                  </a:txBody>
+                  <a:tcPr marL="0" marR="0" marT="0" marB="0" anchor="ctr"/>
+                </a:tc>
+                <a:tc vMerge="1">
+                  <a:txBody>
+                    <a:bodyPr/>
+                    <a:lstStyle/>
+                    <a:p>
+                      <a:pPr algn="l" latinLnBrk="1"/>
+                      <a:endParaRPr lang="ko-KR" altLang="en-US" sz="500" dirty="0"/>
+                    </a:p>
+                  </a:txBody>
+                  <a:tcPr anchor="ctr"/>
+                </a:tc>
+                <a:tc>
+                  <a:txBody>
+                    <a:bodyPr/>
+                    <a:lstStyle/>
+                    <a:p>
+                      <a:pPr algn="ctr" latinLnBrk="1"/>
+                      <a:r>
+                        <a:rPr lang="en-US" altLang="ko-KR" sz="1000" dirty="0"/>
+                        <a:t>4</a:t>
+                      </a:r>
+                      <a:endParaRPr lang="ko-KR" altLang="en-US" sz="1000" dirty="0"/>
+                    </a:p>
+                  </a:txBody>
+                  <a:tcPr marL="0" marR="0" marT="0" marB="0" anchor="ctr"/>
+                </a:tc>
+                <a:tc vMerge="1">
+                  <a:txBody>
+                    <a:bodyPr/>
+                    <a:lstStyle/>
+                    <a:p>
+                      <a:pPr algn="l" latinLnBrk="1"/>
+                      <a:endParaRPr lang="ko-KR" altLang="en-US" sz="500" dirty="0"/>
+                    </a:p>
+                  </a:txBody>
+                  <a:tcPr anchor="ctr"/>
+                </a:tc>
+                <a:tc>
+                  <a:txBody>
+                    <a:bodyPr/>
+                    <a:lstStyle/>
+                    <a:p>
+                      <a:pPr algn="ctr" latinLnBrk="1"/>
+                      <a:r>
+                        <a:rPr lang="en-US" altLang="ko-KR" sz="1000" dirty="0"/>
+                        <a:t>3</a:t>
+                      </a:r>
+                      <a:endParaRPr lang="ko-KR" altLang="en-US" sz="1000" dirty="0"/>
+                    </a:p>
+                  </a:txBody>
+                  <a:tcPr marL="0" marR="0" marT="0" marB="0" anchor="ctr"/>
+                </a:tc>
+                <a:tc vMerge="1">
+                  <a:txBody>
+                    <a:bodyPr/>
+                    <a:lstStyle/>
+                    <a:p>
+                      <a:pPr algn="l" latinLnBrk="1"/>
+                      <a:endParaRPr lang="ko-KR" altLang="en-US" sz="500" dirty="0"/>
+                    </a:p>
+                  </a:txBody>
+                  <a:tcPr anchor="ctr"/>
+                </a:tc>
+                <a:tc>
+                  <a:txBody>
+                    <a:bodyPr/>
+                    <a:lstStyle/>
+                    <a:p>
+                      <a:pPr algn="ctr" latinLnBrk="1"/>
+                      <a:r>
+                        <a:rPr lang="en-US" altLang="ko-KR" sz="1000" dirty="0"/>
+                        <a:t>3</a:t>
                       </a:r>
                       <a:endParaRPr lang="ko-KR" altLang="en-US" sz="1000" dirty="0"/>
                     </a:p>
@@ -4709,111 +4710,7 @@
                       <a:pPr algn="ctr" latinLnBrk="1"/>
                       <a:r>
                         <a:rPr lang="en-US" altLang="ko-KR" sz="1000" dirty="0"/>
-                        <a:t>75</a:t>
-                      </a:r>
-                      <a:endParaRPr lang="ko-KR" altLang="en-US" sz="1000" dirty="0"/>
-                    </a:p>
-                  </a:txBody>
-                  <a:tcPr marL="0" marR="0" marT="0" marB="0" anchor="ctr"/>
-                </a:tc>
-                <a:tc vMerge="1">
-                  <a:txBody>
-                    <a:bodyPr/>
-                    <a:lstStyle/>
-                    <a:p>
-                      <a:pPr algn="l" latinLnBrk="1"/>
-                      <a:endParaRPr lang="ko-KR" altLang="en-US" sz="500" dirty="0"/>
-                    </a:p>
-                  </a:txBody>
-                  <a:tcPr anchor="ctr"/>
-                </a:tc>
-                <a:tc>
-                  <a:txBody>
-                    <a:bodyPr/>
-                    <a:lstStyle/>
-                    <a:p>
-                      <a:pPr algn="ctr" latinLnBrk="1"/>
-                      <a:r>
-                        <a:rPr lang="en-US" altLang="ko-KR" sz="1000" dirty="0"/>
-                        <a:t>75</a:t>
-                      </a:r>
-                      <a:endParaRPr lang="ko-KR" altLang="en-US" sz="1000" dirty="0"/>
-                    </a:p>
-                  </a:txBody>
-                  <a:tcPr marL="0" marR="0" marT="0" marB="0" anchor="ctr"/>
-                </a:tc>
-                <a:tc vMerge="1">
-                  <a:txBody>
-                    <a:bodyPr/>
-                    <a:lstStyle/>
-                    <a:p>
-                      <a:pPr algn="l" latinLnBrk="1"/>
-                      <a:endParaRPr lang="ko-KR" altLang="en-US" sz="500" dirty="0"/>
-                    </a:p>
-                  </a:txBody>
-                  <a:tcPr anchor="ctr"/>
-                </a:tc>
-                <a:tc>
-                  <a:txBody>
-                    <a:bodyPr/>
-                    <a:lstStyle/>
-                    <a:p>
-                      <a:pPr algn="ctr" latinLnBrk="1"/>
-                      <a:r>
-                        <a:rPr lang="en-US" altLang="ko-KR" sz="1000" dirty="0"/>
-                        <a:t>50</a:t>
-                      </a:r>
-                      <a:endParaRPr lang="ko-KR" altLang="en-US" sz="1000" dirty="0"/>
-                    </a:p>
-                  </a:txBody>
-                  <a:tcPr marL="0" marR="0" marT="0" marB="0" anchor="ctr"/>
-                </a:tc>
-                <a:tc vMerge="1">
-                  <a:txBody>
-                    <a:bodyPr/>
-                    <a:lstStyle/>
-                    <a:p>
-                      <a:pPr algn="l" latinLnBrk="1"/>
-                      <a:endParaRPr lang="ko-KR" altLang="en-US" sz="500" dirty="0"/>
-                    </a:p>
-                  </a:txBody>
-                  <a:tcPr anchor="ctr"/>
-                </a:tc>
-                <a:tc>
-                  <a:txBody>
-                    <a:bodyPr/>
-                    <a:lstStyle/>
-                    <a:p>
-                      <a:pPr algn="ctr" latinLnBrk="1"/>
-                      <a:r>
-                        <a:rPr lang="en-US" altLang="ko-KR" sz="1000" dirty="0"/>
-                        <a:t>30</a:t>
-                      </a:r>
-                      <a:endParaRPr lang="ko-KR" altLang="en-US" sz="1000" dirty="0"/>
-                    </a:p>
-                  </a:txBody>
-                  <a:tcPr marL="0" marR="0" marT="0" marB="0" anchor="ctr"/>
-                </a:tc>
-                <a:tc vMerge="1">
-                  <a:txBody>
-                    <a:bodyPr/>
-                    <a:lstStyle/>
-                    <a:p>
-                      <a:pPr algn="l" latinLnBrk="1"/>
-                      <a:endParaRPr lang="ko-KR" altLang="en-US" sz="500" dirty="0"/>
-                    </a:p>
-                  </a:txBody>
-                  <a:tcPr anchor="ctr"/>
-                </a:tc>
-                <a:tc>
-                  <a:txBody>
-                    <a:bodyPr/>
-                    <a:lstStyle/>
-                    <a:p>
-                      <a:pPr algn="ctr" latinLnBrk="1"/>
-                      <a:r>
-                        <a:rPr lang="en-US" altLang="ko-KR" sz="1000" dirty="0"/>
-                        <a:t>20</a:t>
+                        <a:t>12</a:t>
                       </a:r>
                       <a:endParaRPr lang="ko-KR" altLang="en-US" sz="1000" dirty="0"/>
                     </a:p>
@@ -4891,7 +4788,7 @@
                       <a:pPr algn="ctr" latinLnBrk="1"/>
                       <a:r>
                         <a:rPr lang="en-US" altLang="ko-KR" sz="1000" dirty="0"/>
-                        <a:t>5</a:t>
+                        <a:t>8</a:t>
                       </a:r>
                       <a:endParaRPr lang="ko-KR" altLang="en-US" sz="1000" dirty="0"/>
                     </a:p>
@@ -4917,7 +4814,111 @@
                       <a:pPr algn="ctr" latinLnBrk="1"/>
                       <a:r>
                         <a:rPr lang="en-US" altLang="ko-KR" sz="1000" dirty="0"/>
-                        <a:t>5</a:t>
+                        <a:t>4</a:t>
+                      </a:r>
+                      <a:endParaRPr lang="ko-KR" altLang="en-US" sz="1000" dirty="0"/>
+                    </a:p>
+                  </a:txBody>
+                  <a:tcPr marL="0" marR="0" marT="0" marB="0" anchor="ctr"/>
+                </a:tc>
+                <a:tc vMerge="1">
+                  <a:txBody>
+                    <a:bodyPr/>
+                    <a:lstStyle/>
+                    <a:p>
+                      <a:pPr algn="l" latinLnBrk="1"/>
+                      <a:endParaRPr lang="ko-KR" altLang="en-US" sz="500" dirty="0"/>
+                    </a:p>
+                  </a:txBody>
+                  <a:tcPr anchor="ctr"/>
+                </a:tc>
+                <a:tc>
+                  <a:txBody>
+                    <a:bodyPr/>
+                    <a:lstStyle/>
+                    <a:p>
+                      <a:pPr algn="ctr" latinLnBrk="1"/>
+                      <a:r>
+                        <a:rPr lang="en-US" altLang="ko-KR" sz="1000" dirty="0"/>
+                        <a:t>2</a:t>
+                      </a:r>
+                      <a:endParaRPr lang="ko-KR" altLang="en-US" sz="1000" dirty="0"/>
+                    </a:p>
+                  </a:txBody>
+                  <a:tcPr marL="0" marR="0" marT="0" marB="0" anchor="ctr"/>
+                </a:tc>
+                <a:tc vMerge="1">
+                  <a:txBody>
+                    <a:bodyPr/>
+                    <a:lstStyle/>
+                    <a:p>
+                      <a:pPr algn="l" latinLnBrk="1"/>
+                      <a:endParaRPr lang="ko-KR" altLang="en-US" sz="500" dirty="0"/>
+                    </a:p>
+                  </a:txBody>
+                  <a:tcPr anchor="ctr"/>
+                </a:tc>
+                <a:tc>
+                  <a:txBody>
+                    <a:bodyPr/>
+                    <a:lstStyle/>
+                    <a:p>
+                      <a:pPr algn="ctr" latinLnBrk="1"/>
+                      <a:r>
+                        <a:rPr lang="en-US" altLang="ko-KR" sz="1000" dirty="0"/>
+                        <a:t>2</a:t>
+                      </a:r>
+                      <a:endParaRPr lang="ko-KR" altLang="en-US" sz="1000" dirty="0"/>
+                    </a:p>
+                  </a:txBody>
+                  <a:tcPr marL="0" marR="0" marT="0" marB="0" anchor="ctr"/>
+                </a:tc>
+                <a:tc vMerge="1">
+                  <a:txBody>
+                    <a:bodyPr/>
+                    <a:lstStyle/>
+                    <a:p>
+                      <a:pPr algn="l" latinLnBrk="1"/>
+                      <a:endParaRPr lang="ko-KR" altLang="en-US" sz="500" dirty="0"/>
+                    </a:p>
+                  </a:txBody>
+                  <a:tcPr anchor="ctr"/>
+                </a:tc>
+                <a:tc>
+                  <a:txBody>
+                    <a:bodyPr/>
+                    <a:lstStyle/>
+                    <a:p>
+                      <a:pPr algn="ctr" latinLnBrk="1"/>
+                      <a:r>
+                        <a:rPr lang="en-US" altLang="ko-KR" sz="1000" dirty="0"/>
+                        <a:t>1</a:t>
+                      </a:r>
+                      <a:endParaRPr lang="ko-KR" altLang="en-US" sz="1000" dirty="0"/>
+                    </a:p>
+                  </a:txBody>
+                  <a:tcPr marL="0" marR="0" marT="0" marB="0" anchor="ctr"/>
+                </a:tc>
+                <a:tc vMerge="1">
+                  <a:txBody>
+                    <a:bodyPr/>
+                    <a:lstStyle/>
+                    <a:p>
+                      <a:pPr algn="l" latinLnBrk="1"/>
+                      <a:endParaRPr lang="ko-KR" altLang="en-US" sz="500" dirty="0"/>
+                    </a:p>
+                  </a:txBody>
+                  <a:tcPr anchor="ctr"/>
+                </a:tc>
+                <a:tc>
+                  <a:txBody>
+                    <a:bodyPr/>
+                    <a:lstStyle/>
+                    <a:p>
+                      <a:pPr algn="ctr" latinLnBrk="1"/>
+                      <a:r>
+                        <a:rPr lang="en-US" altLang="ko-KR" sz="1000" dirty="0"/>
+                        <a:t>1</a:t>
                       </a:r>
                       <a:endParaRPr lang="ko-KR" altLang="en-US" sz="1000" dirty="0"/>
                     </a:p>
@@ -6112,11 +6113,7 @@
             </a:pPr>
             <a:r>
               <a:rPr lang="en-US" altLang="ko-KR" sz="1000" dirty="0"/>
-              <a:t>Z : Set Special Bonus Time </a:t>
-            </a:r>
-            <a:r>
-              <a:rPr lang="en-US" altLang="ko-KR" sz="1000"/>
-              <a:t>to remain 10 secs</a:t>
+              <a:t>Z : Set Special Bonus Time to remain 10 secs</a:t>
             </a:r>
             <a:endParaRPr lang="ko-KR" altLang="en-US" sz="1000" dirty="0"/>
           </a:p>
@@ -9979,6 +9976,139 @@
     <p:extLst>
       <p:ext uri="{BB962C8B-B14F-4D97-AF65-F5344CB8AC3E}">
         <p14:creationId xmlns:p14="http://schemas.microsoft.com/office/powerpoint/2010/main" val="256026930"/>
+      </p:ext>
+    </p:extLst>
+  </p:cSld>
+  <p:clrMapOvr>
+    <a:masterClrMapping/>
+  </p:clrMapOvr>
+</p:sld>
+</file>
+
+<file path=ppt/slides/slide8.xml><?xml version="1.0" encoding="utf-8"?>
+<p:sld xmlns:a="http://schemas.openxmlformats.org/drawingml/2006/main" xmlns:r="http://schemas.openxmlformats.org/officeDocument/2006/relationships" xmlns:p="http://schemas.openxmlformats.org/presentationml/2006/main">
+  <p:cSld>
+    <p:spTree>
+      <p:nvGrpSpPr>
+        <p:cNvPr id="1" name=""/>
+        <p:cNvGrpSpPr/>
+        <p:nvPr/>
+      </p:nvGrpSpPr>
+      <p:grpSpPr>
+        <a:xfrm>
+          <a:off x="0" y="0"/>
+          <a:ext cx="0" cy="0"/>
+          <a:chOff x="0" y="0"/>
+          <a:chExt cx="0" cy="0"/>
+        </a:xfrm>
+      </p:grpSpPr>
+      <p:sp>
+        <p:nvSpPr>
+          <p:cNvPr id="4" name="TextBox 3">
+            <a:extLst>
+              <a:ext uri="{FF2B5EF4-FFF2-40B4-BE49-F238E27FC236}">
+                <a16:creationId xmlns:a16="http://schemas.microsoft.com/office/drawing/2014/main" id="{1E3CF6E8-6678-8DE1-3793-946AACFED0E7}"/>
+              </a:ext>
+            </a:extLst>
+          </p:cNvPr>
+          <p:cNvSpPr txBox="1"/>
+          <p:nvPr/>
+        </p:nvSpPr>
+        <p:spPr>
+          <a:xfrm>
+            <a:off x="135685" y="147483"/>
+            <a:ext cx="9389412" cy="615553"/>
+          </a:xfrm>
+          <a:prstGeom prst="rect">
+            <a:avLst/>
+          </a:prstGeom>
+          <a:noFill/>
+        </p:spPr>
+        <p:txBody>
+          <a:bodyPr wrap="square" rtlCol="0">
+            <a:spAutoFit/>
+          </a:bodyPr>
+          <a:lstStyle/>
+          <a:p>
+            <a:r>
+              <a:rPr lang="en-US" altLang="ko-KR" sz="1200" dirty="0"/>
+              <a:t>[ Sound List ]</a:t>
+            </a:r>
+          </a:p>
+          <a:p>
+            <a:endParaRPr lang="en-US" altLang="ko-KR" sz="1200" dirty="0"/>
+          </a:p>
+          <a:p>
+            <a:pPr marL="228600" indent="-228600">
+              <a:buFont typeface="+mj-lt"/>
+              <a:buAutoNum type="arabicPeriod"/>
+            </a:pPr>
+            <a:r>
+              <a:rPr lang="en-US" altLang="ko-KR" sz="1000" dirty="0"/>
+              <a:t>Lobby</a:t>
+            </a:r>
+            <a:r>
+              <a:rPr lang="ko-KR" altLang="en-US" sz="1000" dirty="0"/>
+              <a:t> </a:t>
+            </a:r>
+            <a:r>
+              <a:rPr lang="en-US" altLang="ko-KR" sz="1000" dirty="0"/>
+              <a:t>BG</a:t>
+            </a:r>
+            <a:r>
+              <a:rPr lang="ko-KR" altLang="en-US" sz="1000" dirty="0"/>
+              <a:t> </a:t>
+            </a:r>
+            <a:r>
+              <a:rPr lang="en-US" altLang="ko-KR" sz="1000" dirty="0"/>
+              <a:t>:</a:t>
+            </a:r>
+            <a:r>
+              <a:rPr lang="ko-KR" altLang="en-US" sz="1000" dirty="0"/>
+              <a:t> </a:t>
+            </a:r>
+            <a:r>
+              <a:rPr lang="ja-JP" altLang="en-US" sz="1000" b="1" i="0" dirty="0">
+                <a:solidFill>
+                  <a:srgbClr val="3B4754"/>
+                </a:solidFill>
+                <a:effectLst/>
+                <a:latin typeface="メイリオ" panose="020B0400000000000000" pitchFamily="34" charset="-128"/>
+                <a:ea typeface="メイリオ" panose="020B0400000000000000" pitchFamily="34" charset="-128"/>
+              </a:rPr>
+              <a:t>カジノ </a:t>
+            </a:r>
+            <a:r>
+              <a:rPr lang="en-US" altLang="ko-KR" sz="1000" b="0" i="0" dirty="0">
+                <a:solidFill>
+                  <a:srgbClr val="3B4754"/>
+                </a:solidFill>
+                <a:effectLst/>
+                <a:latin typeface="メイリオ" panose="020B0400000000000000" pitchFamily="34" charset="-128"/>
+                <a:ea typeface="メイリオ" panose="020B0400000000000000" pitchFamily="34" charset="-128"/>
+              </a:rPr>
+              <a:t>written by </a:t>
+            </a:r>
+            <a:r>
+              <a:rPr lang="en-US" altLang="ko-KR" sz="1000" b="0" i="0" u="none" strike="noStrike" dirty="0" err="1">
+                <a:solidFill>
+                  <a:srgbClr val="3B4754"/>
+                </a:solidFill>
+                <a:effectLst/>
+                <a:latin typeface="メイリオ" panose="020B0400000000000000" pitchFamily="34" charset="-128"/>
+                <a:ea typeface="メイリオ" panose="020B0400000000000000" pitchFamily="34" charset="-128"/>
+                <a:hlinkClick r:id="rId2"/>
+              </a:rPr>
+              <a:t>shimtone</a:t>
+            </a:r>
+            <a:endParaRPr lang="ko-KR" altLang="en-US" sz="1000" dirty="0"/>
+          </a:p>
+        </p:txBody>
+      </p:sp>
+    </p:spTree>
+    <p:extLst>
+      <p:ext uri="{BB962C8B-B14F-4D97-AF65-F5344CB8AC3E}">
+        <p14:creationId xmlns:p14="http://schemas.microsoft.com/office/powerpoint/2010/main" val="2901100772"/>
       </p:ext>
     </p:extLst>
   </p:cSld>

</xml_diff>

<commit_message>
221110 Uploaded / Five of a kind is added
</commit_message>
<xml_diff>
--- a/00_Documents/Proposal_RockCLimber.pptx
+++ b/00_Documents/Proposal_RockCLimber.pptx
@@ -250,7 +250,7 @@
           <a:p>
             <a:fld id="{78E082FD-8515-42F4-9814-5D20EC5E8E6B}" type="datetimeFigureOut">
               <a:rPr lang="ko-KR" altLang="en-US" smtClean="0"/>
-              <a:t>2022-11-09</a:t>
+              <a:t>2022-11-10</a:t>
             </a:fld>
             <a:endParaRPr lang="ko-KR" altLang="en-US"/>
           </a:p>
@@ -420,7 +420,7 @@
           <a:p>
             <a:fld id="{78E082FD-8515-42F4-9814-5D20EC5E8E6B}" type="datetimeFigureOut">
               <a:rPr lang="ko-KR" altLang="en-US" smtClean="0"/>
-              <a:t>2022-11-09</a:t>
+              <a:t>2022-11-10</a:t>
             </a:fld>
             <a:endParaRPr lang="ko-KR" altLang="en-US"/>
           </a:p>
@@ -600,7 +600,7 @@
           <a:p>
             <a:fld id="{78E082FD-8515-42F4-9814-5D20EC5E8E6B}" type="datetimeFigureOut">
               <a:rPr lang="ko-KR" altLang="en-US" smtClean="0"/>
-              <a:t>2022-11-09</a:t>
+              <a:t>2022-11-10</a:t>
             </a:fld>
             <a:endParaRPr lang="ko-KR" altLang="en-US"/>
           </a:p>
@@ -770,7 +770,7 @@
           <a:p>
             <a:fld id="{78E082FD-8515-42F4-9814-5D20EC5E8E6B}" type="datetimeFigureOut">
               <a:rPr lang="ko-KR" altLang="en-US" smtClean="0"/>
-              <a:t>2022-11-09</a:t>
+              <a:t>2022-11-10</a:t>
             </a:fld>
             <a:endParaRPr lang="ko-KR" altLang="en-US"/>
           </a:p>
@@ -1014,7 +1014,7 @@
           <a:p>
             <a:fld id="{78E082FD-8515-42F4-9814-5D20EC5E8E6B}" type="datetimeFigureOut">
               <a:rPr lang="ko-KR" altLang="en-US" smtClean="0"/>
-              <a:t>2022-11-09</a:t>
+              <a:t>2022-11-10</a:t>
             </a:fld>
             <a:endParaRPr lang="ko-KR" altLang="en-US"/>
           </a:p>
@@ -1246,7 +1246,7 @@
           <a:p>
             <a:fld id="{78E082FD-8515-42F4-9814-5D20EC5E8E6B}" type="datetimeFigureOut">
               <a:rPr lang="ko-KR" altLang="en-US" smtClean="0"/>
-              <a:t>2022-11-09</a:t>
+              <a:t>2022-11-10</a:t>
             </a:fld>
             <a:endParaRPr lang="ko-KR" altLang="en-US"/>
           </a:p>
@@ -1613,7 +1613,7 @@
           <a:p>
             <a:fld id="{78E082FD-8515-42F4-9814-5D20EC5E8E6B}" type="datetimeFigureOut">
               <a:rPr lang="ko-KR" altLang="en-US" smtClean="0"/>
-              <a:t>2022-11-09</a:t>
+              <a:t>2022-11-10</a:t>
             </a:fld>
             <a:endParaRPr lang="ko-KR" altLang="en-US"/>
           </a:p>
@@ -1731,7 +1731,7 @@
           <a:p>
             <a:fld id="{78E082FD-8515-42F4-9814-5D20EC5E8E6B}" type="datetimeFigureOut">
               <a:rPr lang="ko-KR" altLang="en-US" smtClean="0"/>
-              <a:t>2022-11-09</a:t>
+              <a:t>2022-11-10</a:t>
             </a:fld>
             <a:endParaRPr lang="ko-KR" altLang="en-US"/>
           </a:p>
@@ -1826,7 +1826,7 @@
           <a:p>
             <a:fld id="{78E082FD-8515-42F4-9814-5D20EC5E8E6B}" type="datetimeFigureOut">
               <a:rPr lang="ko-KR" altLang="en-US" smtClean="0"/>
-              <a:t>2022-11-09</a:t>
+              <a:t>2022-11-10</a:t>
             </a:fld>
             <a:endParaRPr lang="ko-KR" altLang="en-US"/>
           </a:p>
@@ -2103,7 +2103,7 @@
           <a:p>
             <a:fld id="{78E082FD-8515-42F4-9814-5D20EC5E8E6B}" type="datetimeFigureOut">
               <a:rPr lang="ko-KR" altLang="en-US" smtClean="0"/>
-              <a:t>2022-11-09</a:t>
+              <a:t>2022-11-10</a:t>
             </a:fld>
             <a:endParaRPr lang="ko-KR" altLang="en-US"/>
           </a:p>
@@ -2360,7 +2360,7 @@
           <a:p>
             <a:fld id="{78E082FD-8515-42F4-9814-5D20EC5E8E6B}" type="datetimeFigureOut">
               <a:rPr lang="ko-KR" altLang="en-US" smtClean="0"/>
-              <a:t>2022-11-09</a:t>
+              <a:t>2022-11-10</a:t>
             </a:fld>
             <a:endParaRPr lang="ko-KR" altLang="en-US"/>
           </a:p>
@@ -2573,7 +2573,7 @@
           <a:p>
             <a:fld id="{78E082FD-8515-42F4-9814-5D20EC5E8E6B}" type="datetimeFigureOut">
               <a:rPr lang="ko-KR" altLang="en-US" smtClean="0"/>
-              <a:t>2022-11-09</a:t>
+              <a:t>2022-11-10</a:t>
             </a:fld>
             <a:endParaRPr lang="ko-KR" altLang="en-US"/>
           </a:p>
@@ -5933,7 +5933,15 @@
             </a:pPr>
             <a:r>
               <a:rPr lang="en-US" altLang="ko-KR" sz="1000" dirty="0"/>
-              <a:t>W : No scatters</a:t>
+              <a:t>W : 5 of</a:t>
+            </a:r>
+            <a:r>
+              <a:rPr lang="ko-KR" altLang="en-US" sz="1000" dirty="0"/>
+              <a:t> </a:t>
+            </a:r>
+            <a:r>
+              <a:rPr lang="en-US" altLang="ko-KR" sz="1000" dirty="0"/>
+              <a:t>kinds</a:t>
             </a:r>
           </a:p>
           <a:p>
@@ -6103,7 +6111,7 @@
             </a:pPr>
             <a:r>
               <a:rPr lang="en-US" altLang="ko-KR" sz="1000" dirty="0"/>
-              <a:t>L : Subtract money</a:t>
+              <a:t>L : Reset money</a:t>
             </a:r>
           </a:p>
           <a:p>
@@ -10017,7 +10025,7 @@
         <p:spPr>
           <a:xfrm>
             <a:off x="135685" y="147483"/>
-            <a:ext cx="9389412" cy="615553"/>
+            <a:ext cx="9389412" cy="769441"/>
           </a:xfrm>
           <a:prstGeom prst="rect">
             <a:avLst/>
@@ -10073,7 +10081,6 @@
                   <a:srgbClr val="3B4754"/>
                 </a:solidFill>
                 <a:effectLst/>
-                <a:latin typeface="メイリオ" panose="020B0400000000000000" pitchFamily="34" charset="-128"/>
                 <a:ea typeface="メイリオ" panose="020B0400000000000000" pitchFamily="34" charset="-128"/>
               </a:rPr>
               <a:t>カジノ </a:t>
@@ -10084,7 +10091,6 @@
                   <a:srgbClr val="3B4754"/>
                 </a:solidFill>
                 <a:effectLst/>
-                <a:latin typeface="メイリオ" panose="020B0400000000000000" pitchFamily="34" charset="-128"/>
                 <a:ea typeface="メイリオ" panose="020B0400000000000000" pitchFamily="34" charset="-128"/>
               </a:rPr>
               <a:t>written by </a:t>
@@ -10095,11 +10101,73 @@
                   <a:srgbClr val="3B4754"/>
                 </a:solidFill>
                 <a:effectLst/>
-                <a:latin typeface="メイリオ" panose="020B0400000000000000" pitchFamily="34" charset="-128"/>
                 <a:ea typeface="メイリオ" panose="020B0400000000000000" pitchFamily="34" charset="-128"/>
                 <a:hlinkClick r:id="rId2"/>
               </a:rPr>
               <a:t>shimtone</a:t>
+            </a:r>
+            <a:endParaRPr lang="en-US" altLang="ko-KR" sz="1000" b="0" i="0" u="none" strike="noStrike" dirty="0">
+              <a:solidFill>
+                <a:srgbClr val="3B4754"/>
+              </a:solidFill>
+              <a:effectLst/>
+              <a:ea typeface="メイリオ" panose="020B0400000000000000" pitchFamily="34" charset="-128"/>
+            </a:endParaRPr>
+          </a:p>
+          <a:p>
+            <a:pPr marL="228600" indent="-228600">
+              <a:buFont typeface="+mj-lt"/>
+              <a:buAutoNum type="arabicPeriod"/>
+            </a:pPr>
+            <a:r>
+              <a:rPr lang="en-US" altLang="ko-KR" sz="1000" dirty="0">
+                <a:solidFill>
+                  <a:srgbClr val="3B4754"/>
+                </a:solidFill>
+                <a:ea typeface="メイリオ" panose="020B0400000000000000" pitchFamily="34" charset="-128"/>
+              </a:rPr>
+              <a:t>Game BG : </a:t>
+            </a:r>
+            <a:r>
+              <a:rPr lang="ja-JP" altLang="en-US" sz="1000" b="1" i="0" dirty="0">
+                <a:solidFill>
+                  <a:srgbClr val="3B4754"/>
+                </a:solidFill>
+                <a:effectLst/>
+                <a:ea typeface="メイリオ" panose="020B0604030504040204" pitchFamily="34" charset="-128"/>
+              </a:rPr>
+              <a:t>おばけの</a:t>
+            </a:r>
+            <a:r>
+              <a:rPr lang="ko-KR" altLang="en-US" sz="1000" b="1" i="0" dirty="0">
+                <a:solidFill>
+                  <a:srgbClr val="3B4754"/>
+                </a:solidFill>
+                <a:effectLst/>
+                <a:ea typeface="メイリオ" panose="020B0604030504040204" pitchFamily="34" charset="-128"/>
+              </a:rPr>
+              <a:t>冒険 </a:t>
+            </a:r>
+            <a:r>
+              <a:rPr lang="en-US" altLang="ko-KR" sz="1000" b="0" i="0" dirty="0">
+                <a:solidFill>
+                  <a:srgbClr val="3B4754"/>
+                </a:solidFill>
+                <a:effectLst/>
+                <a:ea typeface="メイリオ" panose="020B0604030504040204" pitchFamily="34" charset="-128"/>
+              </a:rPr>
+              <a:t>written by </a:t>
+            </a:r>
+            <a:r>
+              <a:rPr lang="ja-JP" altLang="en-US" sz="1000" b="0" i="0" u="none" strike="noStrike" dirty="0">
+                <a:solidFill>
+                  <a:srgbClr val="3B4754"/>
+                </a:solidFill>
+                <a:effectLst/>
+                <a:ea typeface="メイリオ" panose="020B0604030504040204" pitchFamily="34" charset="-128"/>
+                <a:hlinkClick r:id="rId3"/>
+              </a:rPr>
+              <a:t>のる</a:t>
             </a:r>
             <a:endParaRPr lang="ko-KR" altLang="en-US" sz="1000" dirty="0"/>
           </a:p>

</xml_diff>

<commit_message>
221110 Uploaded_2 / Winable bonus check is done
</commit_message>
<xml_diff>
--- a/00_Documents/Proposal_RockCLimber.pptx
+++ b/00_Documents/Proposal_RockCLimber.pptx
@@ -10025,7 +10025,7 @@
         <p:spPr>
           <a:xfrm>
             <a:off x="135685" y="147483"/>
-            <a:ext cx="9389412" cy="769441"/>
+            <a:ext cx="9389412" cy="1077218"/>
           </a:xfrm>
           <a:prstGeom prst="rect">
             <a:avLst/>
@@ -10168,6 +10168,170 @@
                 <a:hlinkClick r:id="rId3"/>
               </a:rPr>
               <a:t>のる</a:t>
+            </a:r>
+            <a:endParaRPr lang="en-US" altLang="ja-JP" sz="1000" b="0" i="0" u="none" strike="noStrike" dirty="0">
+              <a:solidFill>
+                <a:srgbClr val="3B4754"/>
+              </a:solidFill>
+              <a:effectLst/>
+              <a:ea typeface="メイリオ" panose="020B0604030504040204" pitchFamily="34" charset="-128"/>
+            </a:endParaRPr>
+          </a:p>
+          <a:p>
+            <a:pPr marL="228600" indent="-228600">
+              <a:buFont typeface="+mj-lt"/>
+              <a:buAutoNum type="arabicPeriod"/>
+            </a:pPr>
+            <a:r>
+              <a:rPr lang="en-US" altLang="ko-KR" sz="1000" dirty="0">
+                <a:solidFill>
+                  <a:srgbClr val="3B4754"/>
+                </a:solidFill>
+              </a:rPr>
+              <a:t>Game</a:t>
+            </a:r>
+            <a:r>
+              <a:rPr lang="ko-KR" altLang="en-US" sz="1000" dirty="0">
+                <a:solidFill>
+                  <a:srgbClr val="3B4754"/>
+                </a:solidFill>
+              </a:rPr>
+              <a:t> </a:t>
+            </a:r>
+            <a:r>
+              <a:rPr lang="en-US" altLang="ko-KR" sz="1000" dirty="0">
+                <a:solidFill>
+                  <a:srgbClr val="3B4754"/>
+                </a:solidFill>
+              </a:rPr>
+              <a:t>BG</a:t>
+            </a:r>
+            <a:r>
+              <a:rPr lang="ko-KR" altLang="en-US" sz="1000" dirty="0">
+                <a:solidFill>
+                  <a:srgbClr val="3B4754"/>
+                </a:solidFill>
+              </a:rPr>
+              <a:t> </a:t>
+            </a:r>
+            <a:r>
+              <a:rPr lang="en-US" altLang="ko-KR" sz="1000" dirty="0">
+                <a:solidFill>
+                  <a:srgbClr val="3B4754"/>
+                </a:solidFill>
+              </a:rPr>
+              <a:t>:</a:t>
+            </a:r>
+            <a:r>
+              <a:rPr lang="ko-KR" altLang="en-US" sz="1000" dirty="0">
+                <a:solidFill>
+                  <a:srgbClr val="3B4754"/>
+                </a:solidFill>
+              </a:rPr>
+              <a:t> </a:t>
+            </a:r>
+            <a:r>
+              <a:rPr lang="ko-KR" altLang="en-US" sz="1000" b="1" i="0" dirty="0">
+                <a:solidFill>
+                  <a:srgbClr val="3B4754"/>
+                </a:solidFill>
+                <a:effectLst/>
+                <a:latin typeface="メイリオ" panose="020B0604030504040204" pitchFamily="34" charset="-128"/>
+                <a:ea typeface="メイリオ" panose="020B0604030504040204" pitchFamily="34" charset="-128"/>
+              </a:rPr>
+              <a:t>不気味</a:t>
+            </a:r>
+            <a:r>
+              <a:rPr lang="ja-JP" altLang="en-US" sz="1000" b="1" i="0" dirty="0">
+                <a:solidFill>
+                  <a:srgbClr val="3B4754"/>
+                </a:solidFill>
+                <a:effectLst/>
+                <a:latin typeface="メイリオ" panose="020B0604030504040204" pitchFamily="34" charset="-128"/>
+                <a:ea typeface="メイリオ" panose="020B0604030504040204" pitchFamily="34" charset="-128"/>
+              </a:rPr>
+              <a:t>なランタン </a:t>
+            </a:r>
+            <a:r>
+              <a:rPr lang="en-US" altLang="ko-KR" sz="1000" b="0" i="0" dirty="0">
+                <a:solidFill>
+                  <a:srgbClr val="3B4754"/>
+                </a:solidFill>
+                <a:effectLst/>
+                <a:latin typeface="メイリオ" panose="020B0604030504040204" pitchFamily="34" charset="-128"/>
+                <a:ea typeface="メイリオ" panose="020B0604030504040204" pitchFamily="34" charset="-128"/>
+              </a:rPr>
+              <a:t>written by </a:t>
+            </a:r>
+            <a:r>
+              <a:rPr lang="en-US" altLang="ko-KR" sz="1000" b="0" i="0" u="none" strike="noStrike" dirty="0">
+                <a:solidFill>
+                  <a:srgbClr val="3B4754"/>
+                </a:solidFill>
+                <a:effectLst/>
+                <a:latin typeface="メイリオ" panose="020B0604030504040204" pitchFamily="34" charset="-128"/>
+                <a:ea typeface="メイリオ" panose="020B0604030504040204" pitchFamily="34" charset="-128"/>
+                <a:hlinkClick r:id="rId4"/>
+              </a:rPr>
+              <a:t>MATSU</a:t>
+            </a:r>
+            <a:endParaRPr lang="en-US" altLang="ko-KR" sz="1000" b="0" i="0" u="none" strike="noStrike" dirty="0">
+              <a:solidFill>
+                <a:srgbClr val="3B4754"/>
+              </a:solidFill>
+              <a:effectLst/>
+              <a:latin typeface="メイリオ" panose="020B0604030504040204" pitchFamily="34" charset="-128"/>
+              <a:ea typeface="メイリオ" panose="020B0604030504040204" pitchFamily="34" charset="-128"/>
+            </a:endParaRPr>
+          </a:p>
+          <a:p>
+            <a:pPr marL="228600" indent="-228600">
+              <a:buFont typeface="+mj-lt"/>
+              <a:buAutoNum type="arabicPeriod"/>
+            </a:pPr>
+            <a:r>
+              <a:rPr lang="en-US" altLang="ko-KR" sz="1000" dirty="0">
+                <a:solidFill>
+                  <a:srgbClr val="3B4754"/>
+                </a:solidFill>
+                <a:latin typeface="メイリオ" panose="020B0604030504040204" pitchFamily="34" charset="-128"/>
+                <a:ea typeface="メイリオ" panose="020B0604030504040204" pitchFamily="34" charset="-128"/>
+              </a:rPr>
+              <a:t>Game BG : </a:t>
+            </a:r>
+            <a:r>
+              <a:rPr lang="ja-JP" altLang="en-US" sz="1000" b="1" i="0" dirty="0">
+                <a:solidFill>
+                  <a:srgbClr val="3B4754"/>
+                </a:solidFill>
+                <a:effectLst/>
+                <a:latin typeface="メイリオ" panose="020B0604030504040204" pitchFamily="34" charset="-128"/>
+                <a:ea typeface="メイリオ" panose="020B0604030504040204" pitchFamily="34" charset="-128"/>
+              </a:rPr>
+              <a:t>お化けのワルツ </a:t>
+            </a:r>
+            <a:r>
+              <a:rPr lang="en-US" altLang="ja-JP" sz="1000" b="0" i="0" dirty="0">
+                <a:solidFill>
+                  <a:srgbClr val="3B4754"/>
+                </a:solidFill>
+                <a:effectLst/>
+                <a:latin typeface="メイリオ" panose="020B0604030504040204" pitchFamily="34" charset="-128"/>
+                <a:ea typeface="メイリオ" panose="020B0604030504040204" pitchFamily="34" charset="-128"/>
+              </a:rPr>
+              <a:t>written by </a:t>
+            </a:r>
+            <a:r>
+              <a:rPr lang="ja-JP" altLang="en-US" sz="1000" b="0" i="0" u="none" strike="noStrike">
+                <a:solidFill>
+                  <a:srgbClr val="3B4754"/>
+                </a:solidFill>
+                <a:effectLst/>
+                <a:latin typeface="メイリオ" panose="020B0604030504040204" pitchFamily="34" charset="-128"/>
+                <a:ea typeface="メイリオ" panose="020B0604030504040204" pitchFamily="34" charset="-128"/>
+                <a:hlinkClick r:id="rId5"/>
+              </a:rPr>
+              <a:t>カピバラっ子</a:t>
             </a:r>
             <a:endParaRPr lang="ko-KR" altLang="en-US" sz="1000" dirty="0"/>
           </a:p>

</xml_diff>

<commit_message>
221111 Uploaded / Bonus Game is on-going
</commit_message>
<xml_diff>
--- a/00_Documents/Proposal_RockCLimber.pptx
+++ b/00_Documents/Proposal_RockCLimber.pptx
@@ -250,7 +250,7 @@
           <a:p>
             <a:fld id="{78E082FD-8515-42F4-9814-5D20EC5E8E6B}" type="datetimeFigureOut">
               <a:rPr lang="ko-KR" altLang="en-US" smtClean="0"/>
-              <a:t>2022-11-10</a:t>
+              <a:t>2022-11-11</a:t>
             </a:fld>
             <a:endParaRPr lang="ko-KR" altLang="en-US"/>
           </a:p>
@@ -420,7 +420,7 @@
           <a:p>
             <a:fld id="{78E082FD-8515-42F4-9814-5D20EC5E8E6B}" type="datetimeFigureOut">
               <a:rPr lang="ko-KR" altLang="en-US" smtClean="0"/>
-              <a:t>2022-11-10</a:t>
+              <a:t>2022-11-11</a:t>
             </a:fld>
             <a:endParaRPr lang="ko-KR" altLang="en-US"/>
           </a:p>
@@ -600,7 +600,7 @@
           <a:p>
             <a:fld id="{78E082FD-8515-42F4-9814-5D20EC5E8E6B}" type="datetimeFigureOut">
               <a:rPr lang="ko-KR" altLang="en-US" smtClean="0"/>
-              <a:t>2022-11-10</a:t>
+              <a:t>2022-11-11</a:t>
             </a:fld>
             <a:endParaRPr lang="ko-KR" altLang="en-US"/>
           </a:p>
@@ -770,7 +770,7 @@
           <a:p>
             <a:fld id="{78E082FD-8515-42F4-9814-5D20EC5E8E6B}" type="datetimeFigureOut">
               <a:rPr lang="ko-KR" altLang="en-US" smtClean="0"/>
-              <a:t>2022-11-10</a:t>
+              <a:t>2022-11-11</a:t>
             </a:fld>
             <a:endParaRPr lang="ko-KR" altLang="en-US"/>
           </a:p>
@@ -1014,7 +1014,7 @@
           <a:p>
             <a:fld id="{78E082FD-8515-42F4-9814-5D20EC5E8E6B}" type="datetimeFigureOut">
               <a:rPr lang="ko-KR" altLang="en-US" smtClean="0"/>
-              <a:t>2022-11-10</a:t>
+              <a:t>2022-11-11</a:t>
             </a:fld>
             <a:endParaRPr lang="ko-KR" altLang="en-US"/>
           </a:p>
@@ -1246,7 +1246,7 @@
           <a:p>
             <a:fld id="{78E082FD-8515-42F4-9814-5D20EC5E8E6B}" type="datetimeFigureOut">
               <a:rPr lang="ko-KR" altLang="en-US" smtClean="0"/>
-              <a:t>2022-11-10</a:t>
+              <a:t>2022-11-11</a:t>
             </a:fld>
             <a:endParaRPr lang="ko-KR" altLang="en-US"/>
           </a:p>
@@ -1613,7 +1613,7 @@
           <a:p>
             <a:fld id="{78E082FD-8515-42F4-9814-5D20EC5E8E6B}" type="datetimeFigureOut">
               <a:rPr lang="ko-KR" altLang="en-US" smtClean="0"/>
-              <a:t>2022-11-10</a:t>
+              <a:t>2022-11-11</a:t>
             </a:fld>
             <a:endParaRPr lang="ko-KR" altLang="en-US"/>
           </a:p>
@@ -1731,7 +1731,7 @@
           <a:p>
             <a:fld id="{78E082FD-8515-42F4-9814-5D20EC5E8E6B}" type="datetimeFigureOut">
               <a:rPr lang="ko-KR" altLang="en-US" smtClean="0"/>
-              <a:t>2022-11-10</a:t>
+              <a:t>2022-11-11</a:t>
             </a:fld>
             <a:endParaRPr lang="ko-KR" altLang="en-US"/>
           </a:p>
@@ -1826,7 +1826,7 @@
           <a:p>
             <a:fld id="{78E082FD-8515-42F4-9814-5D20EC5E8E6B}" type="datetimeFigureOut">
               <a:rPr lang="ko-KR" altLang="en-US" smtClean="0"/>
-              <a:t>2022-11-10</a:t>
+              <a:t>2022-11-11</a:t>
             </a:fld>
             <a:endParaRPr lang="ko-KR" altLang="en-US"/>
           </a:p>
@@ -2103,7 +2103,7 @@
           <a:p>
             <a:fld id="{78E082FD-8515-42F4-9814-5D20EC5E8E6B}" type="datetimeFigureOut">
               <a:rPr lang="ko-KR" altLang="en-US" smtClean="0"/>
-              <a:t>2022-11-10</a:t>
+              <a:t>2022-11-11</a:t>
             </a:fld>
             <a:endParaRPr lang="ko-KR" altLang="en-US"/>
           </a:p>
@@ -2360,7 +2360,7 @@
           <a:p>
             <a:fld id="{78E082FD-8515-42F4-9814-5D20EC5E8E6B}" type="datetimeFigureOut">
               <a:rPr lang="ko-KR" altLang="en-US" smtClean="0"/>
-              <a:t>2022-11-10</a:t>
+              <a:t>2022-11-11</a:t>
             </a:fld>
             <a:endParaRPr lang="ko-KR" altLang="en-US"/>
           </a:p>
@@ -2573,7 +2573,7 @@
           <a:p>
             <a:fld id="{78E082FD-8515-42F4-9814-5D20EC5E8E6B}" type="datetimeFigureOut">
               <a:rPr lang="ko-KR" altLang="en-US" smtClean="0"/>
-              <a:t>2022-11-10</a:t>
+              <a:t>2022-11-11</a:t>
             </a:fld>
             <a:endParaRPr lang="ko-KR" altLang="en-US"/>
           </a:p>
@@ -3747,13 +3747,8 @@
             </a:r>
             <a:r>
               <a:rPr lang="en-US" altLang="ko-KR" sz="1000" dirty="0"/>
-              <a:t>will be stop </a:t>
-            </a:r>
-            <a:r>
-              <a:rPr lang="en-US" altLang="ko-KR" sz="1000"/>
-              <a:t>with pressing stop button.</a:t>
-            </a:r>
-            <a:endParaRPr lang="en-US" altLang="ko-KR" sz="1000" dirty="0"/>
+              <a:t>will be stop with pressing stop button.</a:t>
+            </a:r>
           </a:p>
           <a:p>
             <a:pPr marL="228600" indent="-228600">
@@ -4000,7 +3995,7 @@
             </a:pPr>
             <a:r>
               <a:rPr lang="en-US" altLang="ko-KR" sz="1000" dirty="0"/>
-              <a:t>Jackpot gem rewards like this : Grand – X 300, Major – X 100, Minor – X 25, Mini – X 10.</a:t>
+              <a:t>Jackpot gem rewards like this : Grand – X 50, Major – X 30, Minor – X 20, Mini – X 10.</a:t>
             </a:r>
           </a:p>
           <a:p>
@@ -5736,25 +5731,25 @@
           <p:nvPr>
             <p:extLst>
               <p:ext uri="{D42A27DB-BD31-4B8C-83A1-F6EECF244321}">
-                <p14:modId xmlns:p14="http://schemas.microsoft.com/office/powerpoint/2010/main" val="3953094259"/>
+                <p14:modId xmlns:p14="http://schemas.microsoft.com/office/powerpoint/2010/main" val="2798183093"/>
               </p:ext>
             </p:extLst>
           </p:nvPr>
         </p:nvGraphicFramePr>
         <p:xfrm>
-          <a:off x="1831975" y="5945803"/>
-          <a:ext cx="2363788" cy="295275"/>
+          <a:off x="1831975" y="5945188"/>
+          <a:ext cx="3778250" cy="295275"/>
         </p:xfrm>
         <a:graphic>
           <a:graphicData uri="http://schemas.openxmlformats.org/presentationml/2006/ole">
             <mc:AlternateContent xmlns:mc="http://schemas.openxmlformats.org/markup-compatibility/2006">
               <mc:Choice xmlns:v="urn:schemas-microsoft-com:vml" Requires="v">
-                <p:oleObj name="Worksheet" r:id="rId16" imgW="3438563" imgH="428625" progId="Excel.Sheet.12">
+                <p:oleObj name="Worksheet" r:id="rId16" imgW="5495832" imgH="428625" progId="Excel.Sheet.12">
                   <p:embed/>
                 </p:oleObj>
               </mc:Choice>
               <mc:Fallback>
-                <p:oleObj name="Worksheet" r:id="rId16" imgW="3438563" imgH="428625" progId="Excel.Sheet.12">
+                <p:oleObj name="Worksheet" r:id="rId16" imgW="5495832" imgH="428625" progId="Excel.Sheet.12">
                   <p:embed/>
                   <p:pic>
                     <p:nvPicPr>
@@ -5776,8 +5771,8 @@
                     </p:blipFill>
                     <p:spPr>
                       <a:xfrm>
-                        <a:off x="1831975" y="5945803"/>
-                        <a:ext cx="2363788" cy="295275"/>
+                        <a:off x="1831975" y="5945188"/>
+                        <a:ext cx="3778250" cy="295275"/>
                       </a:xfrm>
                       <a:prstGeom prst="rect">
                         <a:avLst/>
@@ -10025,7 +10020,7 @@
         <p:spPr>
           <a:xfrm>
             <a:off x="135685" y="147483"/>
-            <a:ext cx="9389412" cy="1077218"/>
+            <a:ext cx="9389412" cy="1231106"/>
           </a:xfrm>
           <a:prstGeom prst="rect">
             <a:avLst/>
@@ -10322,7 +10317,7 @@
               <a:t>written by </a:t>
             </a:r>
             <a:r>
-              <a:rPr lang="ja-JP" altLang="en-US" sz="1000" b="0" i="0" u="none" strike="noStrike">
+              <a:rPr lang="ja-JP" altLang="en-US" sz="1000" b="0" i="0" u="none" strike="noStrike" dirty="0">
                 <a:solidFill>
                   <a:srgbClr val="3B4754"/>
                 </a:solidFill>
@@ -10332,6 +10327,130 @@
                 <a:hlinkClick r:id="rId5"/>
               </a:rPr>
               <a:t>カピバラっ子</a:t>
+            </a:r>
+            <a:endParaRPr lang="en-US" altLang="ja-JP" sz="1000" b="0" i="0" u="none" strike="noStrike" dirty="0">
+              <a:solidFill>
+                <a:srgbClr val="3B4754"/>
+              </a:solidFill>
+              <a:effectLst/>
+              <a:latin typeface="メイリオ" panose="020B0604030504040204" pitchFamily="34" charset="-128"/>
+              <a:ea typeface="メイリオ" panose="020B0604030504040204" pitchFamily="34" charset="-128"/>
+            </a:endParaRPr>
+          </a:p>
+          <a:p>
+            <a:pPr marL="228600" indent="-228600">
+              <a:buFont typeface="+mj-lt"/>
+              <a:buAutoNum type="arabicPeriod"/>
+            </a:pPr>
+            <a:r>
+              <a:rPr lang="en-US" altLang="ko-KR" sz="1000" dirty="0">
+                <a:solidFill>
+                  <a:srgbClr val="3B4754"/>
+                </a:solidFill>
+                <a:latin typeface="メイリオ" panose="020B0604030504040204" pitchFamily="34" charset="-128"/>
+              </a:rPr>
+              <a:t>Bonus</a:t>
+            </a:r>
+            <a:r>
+              <a:rPr lang="ko-KR" altLang="en-US" sz="1000" dirty="0">
+                <a:solidFill>
+                  <a:srgbClr val="3B4754"/>
+                </a:solidFill>
+                <a:latin typeface="メイリオ" panose="020B0604030504040204" pitchFamily="34" charset="-128"/>
+              </a:rPr>
+              <a:t> </a:t>
+            </a:r>
+            <a:r>
+              <a:rPr lang="en-US" altLang="ko-KR" sz="1000" dirty="0">
+                <a:solidFill>
+                  <a:srgbClr val="3B4754"/>
+                </a:solidFill>
+                <a:latin typeface="メイリオ" panose="020B0604030504040204" pitchFamily="34" charset="-128"/>
+              </a:rPr>
+              <a:t>BG</a:t>
+            </a:r>
+            <a:r>
+              <a:rPr lang="ko-KR" altLang="en-US" sz="1000" dirty="0">
+                <a:solidFill>
+                  <a:srgbClr val="3B4754"/>
+                </a:solidFill>
+                <a:latin typeface="メイリオ" panose="020B0604030504040204" pitchFamily="34" charset="-128"/>
+              </a:rPr>
+              <a:t> </a:t>
+            </a:r>
+            <a:r>
+              <a:rPr lang="en-US" altLang="ko-KR" sz="1000" dirty="0">
+                <a:solidFill>
+                  <a:srgbClr val="3B4754"/>
+                </a:solidFill>
+                <a:latin typeface="メイリオ" panose="020B0604030504040204" pitchFamily="34" charset="-128"/>
+              </a:rPr>
+              <a:t>:</a:t>
+            </a:r>
+            <a:r>
+              <a:rPr lang="ko-KR" altLang="en-US" sz="1000" dirty="0">
+                <a:solidFill>
+                  <a:srgbClr val="3B4754"/>
+                </a:solidFill>
+                <a:latin typeface="メイリオ" panose="020B0604030504040204" pitchFamily="34" charset="-128"/>
+              </a:rPr>
+              <a:t> </a:t>
+            </a:r>
+            <a:r>
+              <a:rPr lang="ko-KR" altLang="en-US" sz="1000" b="1" i="0" dirty="0">
+                <a:solidFill>
+                  <a:srgbClr val="3B4754"/>
+                </a:solidFill>
+                <a:effectLst/>
+                <a:latin typeface="メイリオ" panose="020B0604030504040204" pitchFamily="34" charset="-128"/>
+                <a:ea typeface="メイリオ" panose="020B0604030504040204" pitchFamily="34" charset="-128"/>
+              </a:rPr>
+              <a:t>邪悪</a:t>
+            </a:r>
+            <a:r>
+              <a:rPr lang="ja-JP" altLang="en-US" sz="1000" b="1" i="0" dirty="0">
+                <a:solidFill>
+                  <a:srgbClr val="3B4754"/>
+                </a:solidFill>
+                <a:effectLst/>
+                <a:latin typeface="メイリオ" panose="020B0604030504040204" pitchFamily="34" charset="-128"/>
+                <a:ea typeface="メイリオ" panose="020B0604030504040204" pitchFamily="34" charset="-128"/>
+              </a:rPr>
+              <a:t>なる</a:t>
+            </a:r>
+            <a:r>
+              <a:rPr lang="ko-KR" altLang="en-US" sz="1000" b="1" i="0" dirty="0">
+                <a:solidFill>
+                  <a:srgbClr val="3B4754"/>
+                </a:solidFill>
+                <a:effectLst/>
+                <a:latin typeface="メイリオ" panose="020B0604030504040204" pitchFamily="34" charset="-128"/>
+                <a:ea typeface="メイリオ" panose="020B0604030504040204" pitchFamily="34" charset="-128"/>
+              </a:rPr>
+              <a:t>者 </a:t>
+            </a:r>
+            <a:r>
+              <a:rPr lang="en-US" altLang="ko-KR" sz="1000" b="0" i="0" dirty="0">
+                <a:solidFill>
+                  <a:srgbClr val="3B4754"/>
+                </a:solidFill>
+                <a:effectLst/>
+                <a:latin typeface="メイリオ" panose="020B0604030504040204" pitchFamily="34" charset="-128"/>
+                <a:ea typeface="メイリオ" panose="020B0604030504040204" pitchFamily="34" charset="-128"/>
+              </a:rPr>
+              <a:t>written by </a:t>
+            </a:r>
+            <a:r>
+              <a:rPr lang="en-US" altLang="ko-KR" sz="1000" b="0" i="0" u="none" strike="noStrike">
+                <a:solidFill>
+                  <a:srgbClr val="3B4754"/>
+                </a:solidFill>
+                <a:effectLst/>
+                <a:latin typeface="メイリオ" panose="020B0604030504040204" pitchFamily="34" charset="-128"/>
+                <a:ea typeface="メイリオ" panose="020B0604030504040204" pitchFamily="34" charset="-128"/>
+                <a:hlinkClick r:id="rId6"/>
+              </a:rPr>
+              <a:t>motomuge</a:t>
             </a:r>
             <a:endParaRPr lang="ko-KR" altLang="en-US" sz="1000" dirty="0"/>
           </a:p>

</xml_diff>

<commit_message>
Uploaded 221114 / Bonus game is completed. Outro is started.
</commit_message>
<xml_diff>
--- a/00_Documents/Proposal_RockCLimber.pptx
+++ b/00_Documents/Proposal_RockCLimber.pptx
@@ -250,7 +250,7 @@
           <a:p>
             <a:fld id="{78E082FD-8515-42F4-9814-5D20EC5E8E6B}" type="datetimeFigureOut">
               <a:rPr lang="ko-KR" altLang="en-US" smtClean="0"/>
-              <a:t>2022-11-11</a:t>
+              <a:t>2022-11-14</a:t>
             </a:fld>
             <a:endParaRPr lang="ko-KR" altLang="en-US"/>
           </a:p>
@@ -420,7 +420,7 @@
           <a:p>
             <a:fld id="{78E082FD-8515-42F4-9814-5D20EC5E8E6B}" type="datetimeFigureOut">
               <a:rPr lang="ko-KR" altLang="en-US" smtClean="0"/>
-              <a:t>2022-11-11</a:t>
+              <a:t>2022-11-14</a:t>
             </a:fld>
             <a:endParaRPr lang="ko-KR" altLang="en-US"/>
           </a:p>
@@ -600,7 +600,7 @@
           <a:p>
             <a:fld id="{78E082FD-8515-42F4-9814-5D20EC5E8E6B}" type="datetimeFigureOut">
               <a:rPr lang="ko-KR" altLang="en-US" smtClean="0"/>
-              <a:t>2022-11-11</a:t>
+              <a:t>2022-11-14</a:t>
             </a:fld>
             <a:endParaRPr lang="ko-KR" altLang="en-US"/>
           </a:p>
@@ -770,7 +770,7 @@
           <a:p>
             <a:fld id="{78E082FD-8515-42F4-9814-5D20EC5E8E6B}" type="datetimeFigureOut">
               <a:rPr lang="ko-KR" altLang="en-US" smtClean="0"/>
-              <a:t>2022-11-11</a:t>
+              <a:t>2022-11-14</a:t>
             </a:fld>
             <a:endParaRPr lang="ko-KR" altLang="en-US"/>
           </a:p>
@@ -1014,7 +1014,7 @@
           <a:p>
             <a:fld id="{78E082FD-8515-42F4-9814-5D20EC5E8E6B}" type="datetimeFigureOut">
               <a:rPr lang="ko-KR" altLang="en-US" smtClean="0"/>
-              <a:t>2022-11-11</a:t>
+              <a:t>2022-11-14</a:t>
             </a:fld>
             <a:endParaRPr lang="ko-KR" altLang="en-US"/>
           </a:p>
@@ -1246,7 +1246,7 @@
           <a:p>
             <a:fld id="{78E082FD-8515-42F4-9814-5D20EC5E8E6B}" type="datetimeFigureOut">
               <a:rPr lang="ko-KR" altLang="en-US" smtClean="0"/>
-              <a:t>2022-11-11</a:t>
+              <a:t>2022-11-14</a:t>
             </a:fld>
             <a:endParaRPr lang="ko-KR" altLang="en-US"/>
           </a:p>
@@ -1613,7 +1613,7 @@
           <a:p>
             <a:fld id="{78E082FD-8515-42F4-9814-5D20EC5E8E6B}" type="datetimeFigureOut">
               <a:rPr lang="ko-KR" altLang="en-US" smtClean="0"/>
-              <a:t>2022-11-11</a:t>
+              <a:t>2022-11-14</a:t>
             </a:fld>
             <a:endParaRPr lang="ko-KR" altLang="en-US"/>
           </a:p>
@@ -1731,7 +1731,7 @@
           <a:p>
             <a:fld id="{78E082FD-8515-42F4-9814-5D20EC5E8E6B}" type="datetimeFigureOut">
               <a:rPr lang="ko-KR" altLang="en-US" smtClean="0"/>
-              <a:t>2022-11-11</a:t>
+              <a:t>2022-11-14</a:t>
             </a:fld>
             <a:endParaRPr lang="ko-KR" altLang="en-US"/>
           </a:p>
@@ -1826,7 +1826,7 @@
           <a:p>
             <a:fld id="{78E082FD-8515-42F4-9814-5D20EC5E8E6B}" type="datetimeFigureOut">
               <a:rPr lang="ko-KR" altLang="en-US" smtClean="0"/>
-              <a:t>2022-11-11</a:t>
+              <a:t>2022-11-14</a:t>
             </a:fld>
             <a:endParaRPr lang="ko-KR" altLang="en-US"/>
           </a:p>
@@ -2103,7 +2103,7 @@
           <a:p>
             <a:fld id="{78E082FD-8515-42F4-9814-5D20EC5E8E6B}" type="datetimeFigureOut">
               <a:rPr lang="ko-KR" altLang="en-US" smtClean="0"/>
-              <a:t>2022-11-11</a:t>
+              <a:t>2022-11-14</a:t>
             </a:fld>
             <a:endParaRPr lang="ko-KR" altLang="en-US"/>
           </a:p>
@@ -2360,7 +2360,7 @@
           <a:p>
             <a:fld id="{78E082FD-8515-42F4-9814-5D20EC5E8E6B}" type="datetimeFigureOut">
               <a:rPr lang="ko-KR" altLang="en-US" smtClean="0"/>
-              <a:t>2022-11-11</a:t>
+              <a:t>2022-11-14</a:t>
             </a:fld>
             <a:endParaRPr lang="ko-KR" altLang="en-US"/>
           </a:p>
@@ -2573,7 +2573,7 @@
           <a:p>
             <a:fld id="{78E082FD-8515-42F4-9814-5D20EC5E8E6B}" type="datetimeFigureOut">
               <a:rPr lang="ko-KR" altLang="en-US" smtClean="0"/>
-              <a:t>2022-11-11</a:t>
+              <a:t>2022-11-14</a:t>
             </a:fld>
             <a:endParaRPr lang="ko-KR" altLang="en-US"/>
           </a:p>
@@ -3995,7 +3995,7 @@
             </a:pPr>
             <a:r>
               <a:rPr lang="en-US" altLang="ko-KR" sz="1000" dirty="0"/>
-              <a:t>Jackpot gem rewards like this : Grand – X 50, Major – X 30, Minor – X 20, Mini – X 10.</a:t>
+              <a:t>Jackpot gem rewards like this : Grand – X 1000, Major – X 500, Minor – X 200, Mini – X 100.</a:t>
             </a:r>
           </a:p>
           <a:p>
@@ -5530,7 +5530,7 @@
           <p:nvPr>
             <p:extLst>
               <p:ext uri="{D42A27DB-BD31-4B8C-83A1-F6EECF244321}">
-                <p14:modId xmlns:p14="http://schemas.microsoft.com/office/powerpoint/2010/main" val="3170398040"/>
+                <p14:modId xmlns:p14="http://schemas.microsoft.com/office/powerpoint/2010/main" val="1145987895"/>
               </p:ext>
             </p:extLst>
           </p:nvPr>
@@ -5731,7 +5731,7 @@
           <p:nvPr>
             <p:extLst>
               <p:ext uri="{D42A27DB-BD31-4B8C-83A1-F6EECF244321}">
-                <p14:modId xmlns:p14="http://schemas.microsoft.com/office/powerpoint/2010/main" val="2798183093"/>
+                <p14:modId xmlns:p14="http://schemas.microsoft.com/office/powerpoint/2010/main" val="2215600289"/>
               </p:ext>
             </p:extLst>
           </p:nvPr>

</xml_diff>

<commit_message>
Uploaded 221116 / Bonus game is finished
</commit_message>
<xml_diff>
--- a/00_Documents/Proposal_RockCLimber.pptx
+++ b/00_Documents/Proposal_RockCLimber.pptx
@@ -250,7 +250,7 @@
           <a:p>
             <a:fld id="{78E082FD-8515-42F4-9814-5D20EC5E8E6B}" type="datetimeFigureOut">
               <a:rPr lang="ko-KR" altLang="en-US" smtClean="0"/>
-              <a:t>2022-11-14</a:t>
+              <a:t>2022-11-16</a:t>
             </a:fld>
             <a:endParaRPr lang="ko-KR" altLang="en-US"/>
           </a:p>
@@ -420,7 +420,7 @@
           <a:p>
             <a:fld id="{78E082FD-8515-42F4-9814-5D20EC5E8E6B}" type="datetimeFigureOut">
               <a:rPr lang="ko-KR" altLang="en-US" smtClean="0"/>
-              <a:t>2022-11-14</a:t>
+              <a:t>2022-11-16</a:t>
             </a:fld>
             <a:endParaRPr lang="ko-KR" altLang="en-US"/>
           </a:p>
@@ -600,7 +600,7 @@
           <a:p>
             <a:fld id="{78E082FD-8515-42F4-9814-5D20EC5E8E6B}" type="datetimeFigureOut">
               <a:rPr lang="ko-KR" altLang="en-US" smtClean="0"/>
-              <a:t>2022-11-14</a:t>
+              <a:t>2022-11-16</a:t>
             </a:fld>
             <a:endParaRPr lang="ko-KR" altLang="en-US"/>
           </a:p>
@@ -770,7 +770,7 @@
           <a:p>
             <a:fld id="{78E082FD-8515-42F4-9814-5D20EC5E8E6B}" type="datetimeFigureOut">
               <a:rPr lang="ko-KR" altLang="en-US" smtClean="0"/>
-              <a:t>2022-11-14</a:t>
+              <a:t>2022-11-16</a:t>
             </a:fld>
             <a:endParaRPr lang="ko-KR" altLang="en-US"/>
           </a:p>
@@ -1014,7 +1014,7 @@
           <a:p>
             <a:fld id="{78E082FD-8515-42F4-9814-5D20EC5E8E6B}" type="datetimeFigureOut">
               <a:rPr lang="ko-KR" altLang="en-US" smtClean="0"/>
-              <a:t>2022-11-14</a:t>
+              <a:t>2022-11-16</a:t>
             </a:fld>
             <a:endParaRPr lang="ko-KR" altLang="en-US"/>
           </a:p>
@@ -1246,7 +1246,7 @@
           <a:p>
             <a:fld id="{78E082FD-8515-42F4-9814-5D20EC5E8E6B}" type="datetimeFigureOut">
               <a:rPr lang="ko-KR" altLang="en-US" smtClean="0"/>
-              <a:t>2022-11-14</a:t>
+              <a:t>2022-11-16</a:t>
             </a:fld>
             <a:endParaRPr lang="ko-KR" altLang="en-US"/>
           </a:p>
@@ -1613,7 +1613,7 @@
           <a:p>
             <a:fld id="{78E082FD-8515-42F4-9814-5D20EC5E8E6B}" type="datetimeFigureOut">
               <a:rPr lang="ko-KR" altLang="en-US" smtClean="0"/>
-              <a:t>2022-11-14</a:t>
+              <a:t>2022-11-16</a:t>
             </a:fld>
             <a:endParaRPr lang="ko-KR" altLang="en-US"/>
           </a:p>
@@ -1731,7 +1731,7 @@
           <a:p>
             <a:fld id="{78E082FD-8515-42F4-9814-5D20EC5E8E6B}" type="datetimeFigureOut">
               <a:rPr lang="ko-KR" altLang="en-US" smtClean="0"/>
-              <a:t>2022-11-14</a:t>
+              <a:t>2022-11-16</a:t>
             </a:fld>
             <a:endParaRPr lang="ko-KR" altLang="en-US"/>
           </a:p>
@@ -1826,7 +1826,7 @@
           <a:p>
             <a:fld id="{78E082FD-8515-42F4-9814-5D20EC5E8E6B}" type="datetimeFigureOut">
               <a:rPr lang="ko-KR" altLang="en-US" smtClean="0"/>
-              <a:t>2022-11-14</a:t>
+              <a:t>2022-11-16</a:t>
             </a:fld>
             <a:endParaRPr lang="ko-KR" altLang="en-US"/>
           </a:p>
@@ -2103,7 +2103,7 @@
           <a:p>
             <a:fld id="{78E082FD-8515-42F4-9814-5D20EC5E8E6B}" type="datetimeFigureOut">
               <a:rPr lang="ko-KR" altLang="en-US" smtClean="0"/>
-              <a:t>2022-11-14</a:t>
+              <a:t>2022-11-16</a:t>
             </a:fld>
             <a:endParaRPr lang="ko-KR" altLang="en-US"/>
           </a:p>
@@ -2360,7 +2360,7 @@
           <a:p>
             <a:fld id="{78E082FD-8515-42F4-9814-5D20EC5E8E6B}" type="datetimeFigureOut">
               <a:rPr lang="ko-KR" altLang="en-US" smtClean="0"/>
-              <a:t>2022-11-14</a:t>
+              <a:t>2022-11-16</a:t>
             </a:fld>
             <a:endParaRPr lang="ko-KR" altLang="en-US"/>
           </a:p>
@@ -2573,7 +2573,7 @@
           <a:p>
             <a:fld id="{78E082FD-8515-42F4-9814-5D20EC5E8E6B}" type="datetimeFigureOut">
               <a:rPr lang="ko-KR" altLang="en-US" smtClean="0"/>
-              <a:t>2022-11-14</a:t>
+              <a:t>2022-11-16</a:t>
             </a:fld>
             <a:endParaRPr lang="ko-KR" altLang="en-US"/>
           </a:p>
@@ -3995,7 +3995,7 @@
             </a:pPr>
             <a:r>
               <a:rPr lang="en-US" altLang="ko-KR" sz="1000" dirty="0"/>
-              <a:t>Jackpot gem rewards like this : Grand – X 1000, Major – X 500, Minor – X 200, Mini – X 100.</a:t>
+              <a:t>Jackpot gem rewards like this : Grand – X 5000, Major – X 3000, Minor – X 1000, Mini – X 500.</a:t>
             </a:r>
           </a:p>
           <a:p>
@@ -5731,7 +5731,7 @@
           <p:nvPr>
             <p:extLst>
               <p:ext uri="{D42A27DB-BD31-4B8C-83A1-F6EECF244321}">
-                <p14:modId xmlns:p14="http://schemas.microsoft.com/office/powerpoint/2010/main" val="2215600289"/>
+                <p14:modId xmlns:p14="http://schemas.microsoft.com/office/powerpoint/2010/main" val="1839829061"/>
               </p:ext>
             </p:extLst>
           </p:nvPr>
@@ -6056,7 +6056,15 @@
             </a:pPr>
             <a:r>
               <a:rPr lang="en-US" altLang="ko-KR" sz="1000" dirty="0"/>
-              <a:t>F : Grand in bonus</a:t>
+              <a:t>F : Big</a:t>
+            </a:r>
+            <a:r>
+              <a:rPr lang="ko-KR" altLang="en-US" sz="1000" dirty="0"/>
+              <a:t> </a:t>
+            </a:r>
+            <a:r>
+              <a:rPr lang="en-US" altLang="ko-KR" sz="1000" dirty="0"/>
+              <a:t>bonus</a:t>
             </a:r>
           </a:p>
           <a:p>
@@ -6066,7 +6074,7 @@
             </a:pPr>
             <a:r>
               <a:rPr lang="en-US" altLang="ko-KR" sz="1000" dirty="0"/>
-              <a:t>G : Major in bonus</a:t>
+              <a:t>G :</a:t>
             </a:r>
           </a:p>
           <a:p>
@@ -6076,7 +6084,7 @@
             </a:pPr>
             <a:r>
               <a:rPr lang="en-US" altLang="ko-KR" sz="1000" dirty="0"/>
-              <a:t>H : Minor in bonus</a:t>
+              <a:t>H :</a:t>
             </a:r>
           </a:p>
           <a:p>
@@ -6086,7 +6094,7 @@
             </a:pPr>
             <a:r>
               <a:rPr lang="en-US" altLang="ko-KR" sz="1000" dirty="0"/>
-              <a:t>J : Mini in bonus</a:t>
+              <a:t>J :</a:t>
             </a:r>
           </a:p>
           <a:p>
@@ -6096,7 +6104,7 @@
             </a:pPr>
             <a:r>
               <a:rPr lang="en-US" altLang="ko-KR" sz="1000" dirty="0"/>
-              <a:t>K : Add money</a:t>
+              <a:t>K :</a:t>
             </a:r>
           </a:p>
           <a:p>

</xml_diff>

<commit_message>
221118_Uploaded / BigWheel is done. Free is on going
</commit_message>
<xml_diff>
--- a/00_Documents/Proposal_RockCLimber.pptx
+++ b/00_Documents/Proposal_RockCLimber.pptx
@@ -250,7 +250,7 @@
           <a:p>
             <a:fld id="{78E082FD-8515-42F4-9814-5D20EC5E8E6B}" type="datetimeFigureOut">
               <a:rPr lang="ko-KR" altLang="en-US" smtClean="0"/>
-              <a:t>2022-11-16</a:t>
+              <a:t>2022-11-18</a:t>
             </a:fld>
             <a:endParaRPr lang="ko-KR" altLang="en-US"/>
           </a:p>
@@ -420,7 +420,7 @@
           <a:p>
             <a:fld id="{78E082FD-8515-42F4-9814-5D20EC5E8E6B}" type="datetimeFigureOut">
               <a:rPr lang="ko-KR" altLang="en-US" smtClean="0"/>
-              <a:t>2022-11-16</a:t>
+              <a:t>2022-11-18</a:t>
             </a:fld>
             <a:endParaRPr lang="ko-KR" altLang="en-US"/>
           </a:p>
@@ -600,7 +600,7 @@
           <a:p>
             <a:fld id="{78E082FD-8515-42F4-9814-5D20EC5E8E6B}" type="datetimeFigureOut">
               <a:rPr lang="ko-KR" altLang="en-US" smtClean="0"/>
-              <a:t>2022-11-16</a:t>
+              <a:t>2022-11-18</a:t>
             </a:fld>
             <a:endParaRPr lang="ko-KR" altLang="en-US"/>
           </a:p>
@@ -770,7 +770,7 @@
           <a:p>
             <a:fld id="{78E082FD-8515-42F4-9814-5D20EC5E8E6B}" type="datetimeFigureOut">
               <a:rPr lang="ko-KR" altLang="en-US" smtClean="0"/>
-              <a:t>2022-11-16</a:t>
+              <a:t>2022-11-18</a:t>
             </a:fld>
             <a:endParaRPr lang="ko-KR" altLang="en-US"/>
           </a:p>
@@ -1014,7 +1014,7 @@
           <a:p>
             <a:fld id="{78E082FD-8515-42F4-9814-5D20EC5E8E6B}" type="datetimeFigureOut">
               <a:rPr lang="ko-KR" altLang="en-US" smtClean="0"/>
-              <a:t>2022-11-16</a:t>
+              <a:t>2022-11-18</a:t>
             </a:fld>
             <a:endParaRPr lang="ko-KR" altLang="en-US"/>
           </a:p>
@@ -1246,7 +1246,7 @@
           <a:p>
             <a:fld id="{78E082FD-8515-42F4-9814-5D20EC5E8E6B}" type="datetimeFigureOut">
               <a:rPr lang="ko-KR" altLang="en-US" smtClean="0"/>
-              <a:t>2022-11-16</a:t>
+              <a:t>2022-11-18</a:t>
             </a:fld>
             <a:endParaRPr lang="ko-KR" altLang="en-US"/>
           </a:p>
@@ -1613,7 +1613,7 @@
           <a:p>
             <a:fld id="{78E082FD-8515-42F4-9814-5D20EC5E8E6B}" type="datetimeFigureOut">
               <a:rPr lang="ko-KR" altLang="en-US" smtClean="0"/>
-              <a:t>2022-11-16</a:t>
+              <a:t>2022-11-18</a:t>
             </a:fld>
             <a:endParaRPr lang="ko-KR" altLang="en-US"/>
           </a:p>
@@ -1731,7 +1731,7 @@
           <a:p>
             <a:fld id="{78E082FD-8515-42F4-9814-5D20EC5E8E6B}" type="datetimeFigureOut">
               <a:rPr lang="ko-KR" altLang="en-US" smtClean="0"/>
-              <a:t>2022-11-16</a:t>
+              <a:t>2022-11-18</a:t>
             </a:fld>
             <a:endParaRPr lang="ko-KR" altLang="en-US"/>
           </a:p>
@@ -1826,7 +1826,7 @@
           <a:p>
             <a:fld id="{78E082FD-8515-42F4-9814-5D20EC5E8E6B}" type="datetimeFigureOut">
               <a:rPr lang="ko-KR" altLang="en-US" smtClean="0"/>
-              <a:t>2022-11-16</a:t>
+              <a:t>2022-11-18</a:t>
             </a:fld>
             <a:endParaRPr lang="ko-KR" altLang="en-US"/>
           </a:p>
@@ -2103,7 +2103,7 @@
           <a:p>
             <a:fld id="{78E082FD-8515-42F4-9814-5D20EC5E8E6B}" type="datetimeFigureOut">
               <a:rPr lang="ko-KR" altLang="en-US" smtClean="0"/>
-              <a:t>2022-11-16</a:t>
+              <a:t>2022-11-18</a:t>
             </a:fld>
             <a:endParaRPr lang="ko-KR" altLang="en-US"/>
           </a:p>
@@ -2360,7 +2360,7 @@
           <a:p>
             <a:fld id="{78E082FD-8515-42F4-9814-5D20EC5E8E6B}" type="datetimeFigureOut">
               <a:rPr lang="ko-KR" altLang="en-US" smtClean="0"/>
-              <a:t>2022-11-16</a:t>
+              <a:t>2022-11-18</a:t>
             </a:fld>
             <a:endParaRPr lang="ko-KR" altLang="en-US"/>
           </a:p>
@@ -2573,7 +2573,7 @@
           <a:p>
             <a:fld id="{78E082FD-8515-42F4-9814-5D20EC5E8E6B}" type="datetimeFigureOut">
               <a:rPr lang="ko-KR" altLang="en-US" smtClean="0"/>
-              <a:t>2022-11-16</a:t>
+              <a:t>2022-11-18</a:t>
             </a:fld>
             <a:endParaRPr lang="ko-KR" altLang="en-US"/>
           </a:p>
@@ -5662,7 +5662,7 @@
           <p:nvPr>
             <p:extLst>
               <p:ext uri="{D42A27DB-BD31-4B8C-83A1-F6EECF244321}">
-                <p14:modId xmlns:p14="http://schemas.microsoft.com/office/powerpoint/2010/main" val="935818955"/>
+                <p14:modId xmlns:p14="http://schemas.microsoft.com/office/powerpoint/2010/main" val="1727198332"/>
               </p:ext>
             </p:extLst>
           </p:nvPr>
@@ -10028,7 +10028,7 @@
         <p:spPr>
           <a:xfrm>
             <a:off x="135685" y="147483"/>
-            <a:ext cx="9389412" cy="1231106"/>
+            <a:ext cx="9389412" cy="1384995"/>
           </a:xfrm>
           <a:prstGeom prst="rect">
             <a:avLst/>
@@ -10449,7 +10449,7 @@
               <a:t>written by </a:t>
             </a:r>
             <a:r>
-              <a:rPr lang="en-US" altLang="ko-KR" sz="1000" b="0" i="0" u="none" strike="noStrike">
+              <a:rPr lang="en-US" altLang="ko-KR" sz="1000" b="0" i="0" u="none" strike="noStrike" dirty="0" err="1">
                 <a:solidFill>
                   <a:srgbClr val="3B4754"/>
                 </a:solidFill>
@@ -10459,6 +10459,62 @@
                 <a:hlinkClick r:id="rId6"/>
               </a:rPr>
               <a:t>motomuge</a:t>
+            </a:r>
+            <a:endParaRPr lang="en-US" altLang="ko-KR" sz="1000" b="0" i="0" u="none" strike="noStrike" dirty="0">
+              <a:solidFill>
+                <a:srgbClr val="3B4754"/>
+              </a:solidFill>
+              <a:effectLst/>
+              <a:latin typeface="メイリオ" panose="020B0604030504040204" pitchFamily="34" charset="-128"/>
+              <a:ea typeface="メイリオ" panose="020B0604030504040204" pitchFamily="34" charset="-128"/>
+            </a:endParaRPr>
+          </a:p>
+          <a:p>
+            <a:pPr marL="228600" indent="-228600">
+              <a:buFont typeface="+mj-lt"/>
+              <a:buAutoNum type="arabicPeriod"/>
+            </a:pPr>
+            <a:r>
+              <a:rPr lang="en-US" altLang="ko-KR" sz="1000" dirty="0" err="1"/>
+              <a:t>BigWheel</a:t>
+            </a:r>
+            <a:r>
+              <a:rPr lang="en-US" altLang="ko-KR" sz="1000"/>
+              <a:t> BG : </a:t>
+            </a:r>
+            <a:r>
+              <a:rPr lang="en-US" altLang="ko-KR" sz="1000" b="1" i="0">
+                <a:solidFill>
+                  <a:srgbClr val="3B4754"/>
+                </a:solidFill>
+                <a:effectLst/>
+                <a:latin typeface="メイリオ" panose="020B0604030504040204" pitchFamily="34" charset="-128"/>
+                <a:ea typeface="メイリオ" panose="020B0604030504040204" pitchFamily="34" charset="-128"/>
+              </a:rPr>
+              <a:t>Disco Digital </a:t>
+            </a:r>
+            <a:r>
+              <a:rPr lang="en-US" altLang="ko-KR" sz="1000" b="0" i="0">
+                <a:solidFill>
+                  <a:srgbClr val="3B4754"/>
+                </a:solidFill>
+                <a:effectLst/>
+                <a:latin typeface="メイリオ" panose="020B0604030504040204" pitchFamily="34" charset="-128"/>
+                <a:ea typeface="メイリオ" panose="020B0604030504040204" pitchFamily="34" charset="-128"/>
+              </a:rPr>
+              <a:t>written by </a:t>
+            </a:r>
+            <a:r>
+              <a:rPr lang="en-US" altLang="ko-KR" sz="1000" b="0" i="0" u="none" strike="noStrike">
+                <a:solidFill>
+                  <a:srgbClr val="3B4754"/>
+                </a:solidFill>
+                <a:effectLst/>
+                <a:latin typeface="メイリオ" panose="020B0604030504040204" pitchFamily="34" charset="-128"/>
+                <a:ea typeface="メイリオ" panose="020B0604030504040204" pitchFamily="34" charset="-128"/>
+                <a:hlinkClick r:id="rId7"/>
+              </a:rPr>
+              <a:t>MFP</a:t>
             </a:r>
             <a:endParaRPr lang="ko-KR" altLang="en-US" sz="1000" dirty="0"/>
           </a:p>

</xml_diff>